<commit_message>
Added favicon and logo.
</commit_message>
<xml_diff>
--- a/hangrr.pptx
+++ b/hangrr.pptx
@@ -122,7 +122,7 @@
 <file path=ppt/revisionInfo.xml><?xml version="1.0" encoding="utf-8"?>
 <p1510:revInfo xmlns:a="http://schemas.openxmlformats.org/drawingml/2006/main" xmlns:r="http://schemas.openxmlformats.org/officeDocument/2006/relationships" xmlns:p1510="http://schemas.microsoft.com/office/powerpoint/2015/10/main">
   <p1510:revLst>
-    <p1510:client id="{9ED0FA34-102E-4ED2-A2E0-D1B28392056F}" v="91" dt="2020-04-04T19:11:12.390"/>
+    <p1510:client id="{9ED0FA34-102E-4ED2-A2E0-D1B28392056F}" v="92" dt="2020-04-12T05:59:12.640"/>
   </p1510:revLst>
 </p1510:revInfo>
 </file>
@@ -132,12 +132,12 @@
   <pc:docChgLst>
     <pc:chgData name="wilson calil" userId="242df245c821da1d" providerId="LiveId" clId="{9ED0FA34-102E-4ED2-A2E0-D1B28392056F}"/>
     <pc:docChg chg="undo custSel mod addSld delSld modSld sldOrd">
-      <pc:chgData name="wilson calil" userId="242df245c821da1d" providerId="LiveId" clId="{9ED0FA34-102E-4ED2-A2E0-D1B28392056F}" dt="2020-04-04T19:11:19.838" v="2328" actId="20577"/>
+      <pc:chgData name="wilson calil" userId="242df245c821da1d" providerId="LiveId" clId="{9ED0FA34-102E-4ED2-A2E0-D1B28392056F}" dt="2020-04-12T05:59:19.025" v="2333" actId="478"/>
       <pc:docMkLst>
         <pc:docMk/>
       </pc:docMkLst>
       <pc:sldChg chg="addSp delSp modSp mod">
-        <pc:chgData name="wilson calil" userId="242df245c821da1d" providerId="LiveId" clId="{9ED0FA34-102E-4ED2-A2E0-D1B28392056F}" dt="2020-04-04T15:56:44.041" v="1421" actId="1076"/>
+        <pc:chgData name="wilson calil" userId="242df245c821da1d" providerId="LiveId" clId="{9ED0FA34-102E-4ED2-A2E0-D1B28392056F}" dt="2020-04-12T05:59:19.025" v="2333" actId="478"/>
         <pc:sldMkLst>
           <pc:docMk/>
           <pc:sldMk cId="1412674545" sldId="256"/>
@@ -174,6 +174,14 @@
             <ac:spMk id="9" creationId="{1C0155F3-C5A0-4BC0-AA2F-2B85AE5E027A}"/>
           </ac:spMkLst>
         </pc:spChg>
+        <pc:picChg chg="add del mod">
+          <ac:chgData name="wilson calil" userId="242df245c821da1d" providerId="LiveId" clId="{9ED0FA34-102E-4ED2-A2E0-D1B28392056F}" dt="2020-04-12T05:59:19.025" v="2333" actId="478"/>
+          <ac:picMkLst>
+            <pc:docMk/>
+            <pc:sldMk cId="1412674545" sldId="256"/>
+            <ac:picMk id="4" creationId="{1F811A47-B620-4404-A984-D9EEA5EA5104}"/>
+          </ac:picMkLst>
+        </pc:picChg>
         <pc:picChg chg="add del mod">
           <ac:chgData name="wilson calil" userId="242df245c821da1d" providerId="LiveId" clId="{9ED0FA34-102E-4ED2-A2E0-D1B28392056F}" dt="2020-04-04T15:21:36.799" v="1276"/>
           <ac:picMkLst>
@@ -1364,7 +1372,7 @@
           <a:p>
             <a:fld id="{27F46EFC-FBDD-4E48-ADB1-5377E48E6790}" type="datetimeFigureOut">
               <a:rPr lang="en-US" smtClean="0"/>
-              <a:t>4/5/2020</a:t>
+              <a:t>4/12/2020</a:t>
             </a:fld>
             <a:endParaRPr lang="en-US"/>
           </a:p>
@@ -1562,7 +1570,7 @@
           <a:p>
             <a:fld id="{27F46EFC-FBDD-4E48-ADB1-5377E48E6790}" type="datetimeFigureOut">
               <a:rPr lang="en-US" smtClean="0"/>
-              <a:t>4/5/2020</a:t>
+              <a:t>4/12/2020</a:t>
             </a:fld>
             <a:endParaRPr lang="en-US"/>
           </a:p>
@@ -1770,7 +1778,7 @@
           <a:p>
             <a:fld id="{27F46EFC-FBDD-4E48-ADB1-5377E48E6790}" type="datetimeFigureOut">
               <a:rPr lang="en-US" smtClean="0"/>
-              <a:t>4/5/2020</a:t>
+              <a:t>4/12/2020</a:t>
             </a:fld>
             <a:endParaRPr lang="en-US"/>
           </a:p>
@@ -1968,7 +1976,7 @@
           <a:p>
             <a:fld id="{27F46EFC-FBDD-4E48-ADB1-5377E48E6790}" type="datetimeFigureOut">
               <a:rPr lang="en-US" smtClean="0"/>
-              <a:t>4/5/2020</a:t>
+              <a:t>4/12/2020</a:t>
             </a:fld>
             <a:endParaRPr lang="en-US"/>
           </a:p>
@@ -2243,7 +2251,7 @@
           <a:p>
             <a:fld id="{27F46EFC-FBDD-4E48-ADB1-5377E48E6790}" type="datetimeFigureOut">
               <a:rPr lang="en-US" smtClean="0"/>
-              <a:t>4/5/2020</a:t>
+              <a:t>4/12/2020</a:t>
             </a:fld>
             <a:endParaRPr lang="en-US"/>
           </a:p>
@@ -2508,7 +2516,7 @@
           <a:p>
             <a:fld id="{27F46EFC-FBDD-4E48-ADB1-5377E48E6790}" type="datetimeFigureOut">
               <a:rPr lang="en-US" smtClean="0"/>
-              <a:t>4/5/2020</a:t>
+              <a:t>4/12/2020</a:t>
             </a:fld>
             <a:endParaRPr lang="en-US"/>
           </a:p>
@@ -2920,7 +2928,7 @@
           <a:p>
             <a:fld id="{27F46EFC-FBDD-4E48-ADB1-5377E48E6790}" type="datetimeFigureOut">
               <a:rPr lang="en-US" smtClean="0"/>
-              <a:t>4/5/2020</a:t>
+              <a:t>4/12/2020</a:t>
             </a:fld>
             <a:endParaRPr lang="en-US"/>
           </a:p>
@@ -3061,7 +3069,7 @@
           <a:p>
             <a:fld id="{27F46EFC-FBDD-4E48-ADB1-5377E48E6790}" type="datetimeFigureOut">
               <a:rPr lang="en-US" smtClean="0"/>
-              <a:t>4/5/2020</a:t>
+              <a:t>4/12/2020</a:t>
             </a:fld>
             <a:endParaRPr lang="en-US"/>
           </a:p>
@@ -3174,7 +3182,7 @@
           <a:p>
             <a:fld id="{27F46EFC-FBDD-4E48-ADB1-5377E48E6790}" type="datetimeFigureOut">
               <a:rPr lang="en-US" smtClean="0"/>
-              <a:t>4/5/2020</a:t>
+              <a:t>4/12/2020</a:t>
             </a:fld>
             <a:endParaRPr lang="en-US"/>
           </a:p>
@@ -3485,7 +3493,7 @@
           <a:p>
             <a:fld id="{27F46EFC-FBDD-4E48-ADB1-5377E48E6790}" type="datetimeFigureOut">
               <a:rPr lang="en-US" smtClean="0"/>
-              <a:t>4/5/2020</a:t>
+              <a:t>4/12/2020</a:t>
             </a:fld>
             <a:endParaRPr lang="en-US"/>
           </a:p>
@@ -3773,7 +3781,7 @@
           <a:p>
             <a:fld id="{27F46EFC-FBDD-4E48-ADB1-5377E48E6790}" type="datetimeFigureOut">
               <a:rPr lang="en-US" smtClean="0"/>
-              <a:t>4/5/2020</a:t>
+              <a:t>4/12/2020</a:t>
             </a:fld>
             <a:endParaRPr lang="en-US"/>
           </a:p>
@@ -4014,7 +4022,7 @@
           <a:p>
             <a:fld id="{27F46EFC-FBDD-4E48-ADB1-5377E48E6790}" type="datetimeFigureOut">
               <a:rPr lang="en-US" smtClean="0"/>
-              <a:t>4/5/2020</a:t>
+              <a:t>4/12/2020</a:t>
             </a:fld>
             <a:endParaRPr lang="en-US"/>
           </a:p>

</xml_diff>

<commit_message>
Adding a basic readme file and updating the presentation.
</commit_message>
<xml_diff>
--- a/hangrr.pptx
+++ b/hangrr.pptx
@@ -10,9 +10,7 @@
     <p:sldId id="258" r:id="rId4"/>
     <p:sldId id="259" r:id="rId5"/>
     <p:sldId id="261" r:id="rId6"/>
-    <p:sldId id="265" r:id="rId7"/>
-    <p:sldId id="263" r:id="rId8"/>
-    <p:sldId id="264" r:id="rId9"/>
+    <p:sldId id="263" r:id="rId7"/>
   </p:sldIdLst>
   <p:sldSz cx="12192000" cy="6858000"/>
   <p:notesSz cx="6858000" cy="9144000"/>
@@ -122,13 +120,294 @@
 <file path=ppt/revisionInfo.xml><?xml version="1.0" encoding="utf-8"?>
 <p1510:revInfo xmlns:a="http://schemas.openxmlformats.org/drawingml/2006/main" xmlns:r="http://schemas.openxmlformats.org/officeDocument/2006/relationships" xmlns:p1510="http://schemas.microsoft.com/office/powerpoint/2015/10/main">
   <p1510:revLst>
-    <p1510:client id="{9ED0FA34-102E-4ED2-A2E0-D1B28392056F}" v="92" dt="2020-04-12T05:59:12.640"/>
+    <p1510:client id="{1E3C70F6-6071-472A-B5AB-629E848A8143}" v="31" dt="2020-04-14T19:41:01.283"/>
   </p1510:revLst>
 </p1510:revInfo>
 </file>
 
 <file path=ppt/changesInfos/changesInfo1.xml><?xml version="1.0" encoding="utf-8"?>
 <pc:chgInfo xmlns:a="http://schemas.openxmlformats.org/drawingml/2006/main" xmlns:r="http://schemas.openxmlformats.org/officeDocument/2006/relationships" xmlns:ac="http://schemas.microsoft.com/office/drawing/2013/main/command" xmlns:pc="http://schemas.microsoft.com/office/powerpoint/2013/main/command">
+  <pc:docChgLst>
+    <pc:chgData name="wilson calil" userId="242df245c821da1d" providerId="LiveId" clId="{1E3C70F6-6071-472A-B5AB-629E848A8143}"/>
+    <pc:docChg chg="undo custSel addSld delSld modSld modMainMaster">
+      <pc:chgData name="wilson calil" userId="242df245c821da1d" providerId="LiveId" clId="{1E3C70F6-6071-472A-B5AB-629E848A8143}" dt="2020-04-14T19:41:48.422" v="712" actId="404"/>
+      <pc:docMkLst>
+        <pc:docMk/>
+      </pc:docMkLst>
+      <pc:sldChg chg="modSp mod setBg">
+        <pc:chgData name="wilson calil" userId="242df245c821da1d" providerId="LiveId" clId="{1E3C70F6-6071-472A-B5AB-629E848A8143}" dt="2020-04-14T19:39:46.051" v="677"/>
+        <pc:sldMkLst>
+          <pc:docMk/>
+          <pc:sldMk cId="4038621370" sldId="257"/>
+        </pc:sldMkLst>
+        <pc:spChg chg="mod">
+          <ac:chgData name="wilson calil" userId="242df245c821da1d" providerId="LiveId" clId="{1E3C70F6-6071-472A-B5AB-629E848A8143}" dt="2020-04-14T19:38:45.170" v="675" actId="404"/>
+          <ac:spMkLst>
+            <pc:docMk/>
+            <pc:sldMk cId="4038621370" sldId="257"/>
+            <ac:spMk id="2" creationId="{00FA5CB1-B905-4BF4-A2C5-16F61202CDD3}"/>
+          </ac:spMkLst>
+        </pc:spChg>
+        <pc:spChg chg="mod">
+          <ac:chgData name="wilson calil" userId="242df245c821da1d" providerId="LiveId" clId="{1E3C70F6-6071-472A-B5AB-629E848A8143}" dt="2020-04-14T19:20:54.340" v="18" actId="20577"/>
+          <ac:spMkLst>
+            <pc:docMk/>
+            <pc:sldMk cId="4038621370" sldId="257"/>
+            <ac:spMk id="3" creationId="{54C1B9D5-0C45-4DE7-AA44-B1B1BB5A047E}"/>
+          </ac:spMkLst>
+        </pc:spChg>
+      </pc:sldChg>
+      <pc:sldChg chg="modSp mod">
+        <pc:chgData name="wilson calil" userId="242df245c821da1d" providerId="LiveId" clId="{1E3C70F6-6071-472A-B5AB-629E848A8143}" dt="2020-04-14T19:40:53.173" v="687"/>
+        <pc:sldMkLst>
+          <pc:docMk/>
+          <pc:sldMk cId="3042189317" sldId="258"/>
+        </pc:sldMkLst>
+        <pc:spChg chg="mod">
+          <ac:chgData name="wilson calil" userId="242df245c821da1d" providerId="LiveId" clId="{1E3C70F6-6071-472A-B5AB-629E848A8143}" dt="2020-04-14T19:40:53.173" v="687"/>
+          <ac:spMkLst>
+            <pc:docMk/>
+            <pc:sldMk cId="3042189317" sldId="258"/>
+            <ac:spMk id="2" creationId="{00FA5CB1-B905-4BF4-A2C5-16F61202CDD3}"/>
+          </ac:spMkLst>
+        </pc:spChg>
+        <pc:spChg chg="mod">
+          <ac:chgData name="wilson calil" userId="242df245c821da1d" providerId="LiveId" clId="{1E3C70F6-6071-472A-B5AB-629E848A8143}" dt="2020-04-14T19:25:20.514" v="574" actId="20577"/>
+          <ac:spMkLst>
+            <pc:docMk/>
+            <pc:sldMk cId="3042189317" sldId="258"/>
+            <ac:spMk id="3" creationId="{54C1B9D5-0C45-4DE7-AA44-B1B1BB5A047E}"/>
+          </ac:spMkLst>
+        </pc:spChg>
+      </pc:sldChg>
+      <pc:sldChg chg="addSp delSp modSp mod">
+        <pc:chgData name="wilson calil" userId="242df245c821da1d" providerId="LiveId" clId="{1E3C70F6-6071-472A-B5AB-629E848A8143}" dt="2020-04-14T19:41:03.481" v="695" actId="20577"/>
+        <pc:sldMkLst>
+          <pc:docMk/>
+          <pc:sldMk cId="1706431902" sldId="259"/>
+        </pc:sldMkLst>
+        <pc:spChg chg="mod">
+          <ac:chgData name="wilson calil" userId="242df245c821da1d" providerId="LiveId" clId="{1E3C70F6-6071-472A-B5AB-629E848A8143}" dt="2020-04-14T19:41:03.481" v="695" actId="20577"/>
+          <ac:spMkLst>
+            <pc:docMk/>
+            <pc:sldMk cId="1706431902" sldId="259"/>
+            <ac:spMk id="2" creationId="{8B1A416B-49D7-4C91-9506-1FE2440AD40C}"/>
+          </ac:spMkLst>
+        </pc:spChg>
+        <pc:spChg chg="add mod">
+          <ac:chgData name="wilson calil" userId="242df245c821da1d" providerId="LiveId" clId="{1E3C70F6-6071-472A-B5AB-629E848A8143}" dt="2020-04-14T19:38:14.063" v="666" actId="1036"/>
+          <ac:spMkLst>
+            <pc:docMk/>
+            <pc:sldMk cId="1706431902" sldId="259"/>
+            <ac:spMk id="10" creationId="{D56FC82D-4FE8-4D2B-B73E-CB48171E661F}"/>
+          </ac:spMkLst>
+        </pc:spChg>
+        <pc:graphicFrameChg chg="add del">
+          <ac:chgData name="wilson calil" userId="242df245c821da1d" providerId="LiveId" clId="{1E3C70F6-6071-472A-B5AB-629E848A8143}" dt="2020-04-14T19:35:16.079" v="580"/>
+          <ac:graphicFrameMkLst>
+            <pc:docMk/>
+            <pc:sldMk cId="1706431902" sldId="259"/>
+            <ac:graphicFrameMk id="3" creationId="{AF3B4608-CBA0-441F-865C-6D1B63250475}"/>
+          </ac:graphicFrameMkLst>
+        </pc:graphicFrameChg>
+        <pc:graphicFrameChg chg="add del mod modGraphic">
+          <ac:chgData name="wilson calil" userId="242df245c821da1d" providerId="LiveId" clId="{1E3C70F6-6071-472A-B5AB-629E848A8143}" dt="2020-04-14T19:35:45.085" v="586" actId="21"/>
+          <ac:graphicFrameMkLst>
+            <pc:docMk/>
+            <pc:sldMk cId="1706431902" sldId="259"/>
+            <ac:graphicFrameMk id="4" creationId="{BC5848D4-169D-4752-B7BE-B9D6BA64633D}"/>
+          </ac:graphicFrameMkLst>
+        </pc:graphicFrameChg>
+        <pc:graphicFrameChg chg="add del mod">
+          <ac:chgData name="wilson calil" userId="242df245c821da1d" providerId="LiveId" clId="{1E3C70F6-6071-472A-B5AB-629E848A8143}" dt="2020-04-14T19:35:48.265" v="587" actId="478"/>
+          <ac:graphicFrameMkLst>
+            <pc:docMk/>
+            <pc:sldMk cId="1706431902" sldId="259"/>
+            <ac:graphicFrameMk id="5" creationId="{5FA8BF09-DFE0-4673-9919-CE71C6F44386}"/>
+          </ac:graphicFrameMkLst>
+        </pc:graphicFrameChg>
+        <pc:picChg chg="add del">
+          <ac:chgData name="wilson calil" userId="242df245c821da1d" providerId="LiveId" clId="{1E3C70F6-6071-472A-B5AB-629E848A8143}" dt="2020-04-14T19:35:53.018" v="589" actId="478"/>
+          <ac:picMkLst>
+            <pc:docMk/>
+            <pc:sldMk cId="1706431902" sldId="259"/>
+            <ac:picMk id="6" creationId="{1FC1E606-2B27-4E8D-8ECA-DB968DD41BA6}"/>
+          </ac:picMkLst>
+        </pc:picChg>
+        <pc:picChg chg="add mod">
+          <ac:chgData name="wilson calil" userId="242df245c821da1d" providerId="LiveId" clId="{1E3C70F6-6071-472A-B5AB-629E848A8143}" dt="2020-04-14T19:37:34.644" v="615" actId="1076"/>
+          <ac:picMkLst>
+            <pc:docMk/>
+            <pc:sldMk cId="1706431902" sldId="259"/>
+            <ac:picMk id="8" creationId="{B4CEAA96-6A82-4391-807B-83C543957134}"/>
+          </ac:picMkLst>
+        </pc:picChg>
+        <pc:picChg chg="add mod">
+          <ac:chgData name="wilson calil" userId="242df245c821da1d" providerId="LiveId" clId="{1E3C70F6-6071-472A-B5AB-629E848A8143}" dt="2020-04-14T19:38:06.033" v="622" actId="1076"/>
+          <ac:picMkLst>
+            <pc:docMk/>
+            <pc:sldMk cId="1706431902" sldId="259"/>
+            <ac:picMk id="9" creationId="{80682850-4A93-40C8-9D2E-7D5BAA8008C7}"/>
+          </ac:picMkLst>
+        </pc:picChg>
+        <pc:picChg chg="del">
+          <ac:chgData name="wilson calil" userId="242df245c821da1d" providerId="LiveId" clId="{1E3C70F6-6071-472A-B5AB-629E848A8143}" dt="2020-04-14T19:35:12.350" v="576" actId="478"/>
+          <ac:picMkLst>
+            <pc:docMk/>
+            <pc:sldMk cId="1706431902" sldId="259"/>
+            <ac:picMk id="17" creationId="{C0211FF5-C466-457F-AC3C-CB11190C8ABB}"/>
+          </ac:picMkLst>
+        </pc:picChg>
+      </pc:sldChg>
+      <pc:sldChg chg="modSp mod">
+        <pc:chgData name="wilson calil" userId="242df245c821da1d" providerId="LiveId" clId="{1E3C70F6-6071-472A-B5AB-629E848A8143}" dt="2020-04-14T19:41:48.422" v="712" actId="404"/>
+        <pc:sldMkLst>
+          <pc:docMk/>
+          <pc:sldMk cId="110317900" sldId="261"/>
+        </pc:sldMkLst>
+        <pc:spChg chg="mod">
+          <ac:chgData name="wilson calil" userId="242df245c821da1d" providerId="LiveId" clId="{1E3C70F6-6071-472A-B5AB-629E848A8143}" dt="2020-04-14T19:41:48.422" v="712" actId="404"/>
+          <ac:spMkLst>
+            <pc:docMk/>
+            <pc:sldMk cId="110317900" sldId="261"/>
+            <ac:spMk id="17" creationId="{07877AFB-5028-44C5-928C-733BF4CC3253}"/>
+          </ac:spMkLst>
+        </pc:spChg>
+        <pc:picChg chg="mod">
+          <ac:chgData name="wilson calil" userId="242df245c821da1d" providerId="LiveId" clId="{1E3C70F6-6071-472A-B5AB-629E848A8143}" dt="2020-04-14T19:41:28.780" v="699" actId="1076"/>
+          <ac:picMkLst>
+            <pc:docMk/>
+            <pc:sldMk cId="110317900" sldId="261"/>
+            <ac:picMk id="14" creationId="{377BE9C6-40B7-4E8E-9D44-61D3EC736FF3}"/>
+          </ac:picMkLst>
+        </pc:picChg>
+      </pc:sldChg>
+      <pc:sldChg chg="del">
+        <pc:chgData name="wilson calil" userId="242df245c821da1d" providerId="LiveId" clId="{1E3C70F6-6071-472A-B5AB-629E848A8143}" dt="2020-04-14T19:26:41.534" v="575" actId="47"/>
+        <pc:sldMkLst>
+          <pc:docMk/>
+          <pc:sldMk cId="2414628719" sldId="264"/>
+        </pc:sldMkLst>
+      </pc:sldChg>
+      <pc:sldChg chg="del setBg">
+        <pc:chgData name="wilson calil" userId="242df245c821da1d" providerId="LiveId" clId="{1E3C70F6-6071-472A-B5AB-629E848A8143}" dt="2020-04-14T19:40:34.106" v="685" actId="47"/>
+        <pc:sldMkLst>
+          <pc:docMk/>
+          <pc:sldMk cId="959754174" sldId="265"/>
+        </pc:sldMkLst>
+      </pc:sldChg>
+      <pc:sldChg chg="addSp modSp add del mod">
+        <pc:chgData name="wilson calil" userId="242df245c821da1d" providerId="LiveId" clId="{1E3C70F6-6071-472A-B5AB-629E848A8143}" dt="2020-04-14T19:40:33.423" v="684" actId="47"/>
+        <pc:sldMkLst>
+          <pc:docMk/>
+          <pc:sldMk cId="1201632153" sldId="266"/>
+        </pc:sldMkLst>
+        <pc:picChg chg="add mod">
+          <ac:chgData name="wilson calil" userId="242df245c821da1d" providerId="LiveId" clId="{1E3C70F6-6071-472A-B5AB-629E848A8143}" dt="2020-04-14T19:40:30.436" v="683" actId="1076"/>
+          <ac:picMkLst>
+            <pc:docMk/>
+            <pc:sldMk cId="1201632153" sldId="266"/>
+            <ac:picMk id="4" creationId="{5E058F9E-F934-460B-B9DA-9D50DC1EEFF4}"/>
+          </ac:picMkLst>
+        </pc:picChg>
+      </pc:sldChg>
+      <pc:sldMasterChg chg="setBg modSldLayout">
+        <pc:chgData name="wilson calil" userId="242df245c821da1d" providerId="LiveId" clId="{1E3C70F6-6071-472A-B5AB-629E848A8143}" dt="2020-04-14T19:39:46.051" v="677"/>
+        <pc:sldMasterMkLst>
+          <pc:docMk/>
+          <pc:sldMasterMk cId="1593677570" sldId="2147483648"/>
+        </pc:sldMasterMkLst>
+        <pc:sldLayoutChg chg="setBg">
+          <pc:chgData name="wilson calil" userId="242df245c821da1d" providerId="LiveId" clId="{1E3C70F6-6071-472A-B5AB-629E848A8143}" dt="2020-04-14T19:39:46.051" v="677"/>
+          <pc:sldLayoutMkLst>
+            <pc:docMk/>
+            <pc:sldMasterMk cId="1593677570" sldId="2147483648"/>
+            <pc:sldLayoutMk cId="830594113" sldId="2147483649"/>
+          </pc:sldLayoutMkLst>
+        </pc:sldLayoutChg>
+        <pc:sldLayoutChg chg="setBg">
+          <pc:chgData name="wilson calil" userId="242df245c821da1d" providerId="LiveId" clId="{1E3C70F6-6071-472A-B5AB-629E848A8143}" dt="2020-04-14T19:39:46.051" v="677"/>
+          <pc:sldLayoutMkLst>
+            <pc:docMk/>
+            <pc:sldMasterMk cId="1593677570" sldId="2147483648"/>
+            <pc:sldLayoutMk cId="2423916401" sldId="2147483650"/>
+          </pc:sldLayoutMkLst>
+        </pc:sldLayoutChg>
+        <pc:sldLayoutChg chg="setBg">
+          <pc:chgData name="wilson calil" userId="242df245c821da1d" providerId="LiveId" clId="{1E3C70F6-6071-472A-B5AB-629E848A8143}" dt="2020-04-14T19:39:46.051" v="677"/>
+          <pc:sldLayoutMkLst>
+            <pc:docMk/>
+            <pc:sldMasterMk cId="1593677570" sldId="2147483648"/>
+            <pc:sldLayoutMk cId="1373885200" sldId="2147483651"/>
+          </pc:sldLayoutMkLst>
+        </pc:sldLayoutChg>
+        <pc:sldLayoutChg chg="setBg">
+          <pc:chgData name="wilson calil" userId="242df245c821da1d" providerId="LiveId" clId="{1E3C70F6-6071-472A-B5AB-629E848A8143}" dt="2020-04-14T19:39:46.051" v="677"/>
+          <pc:sldLayoutMkLst>
+            <pc:docMk/>
+            <pc:sldMasterMk cId="1593677570" sldId="2147483648"/>
+            <pc:sldLayoutMk cId="1377872774" sldId="2147483652"/>
+          </pc:sldLayoutMkLst>
+        </pc:sldLayoutChg>
+        <pc:sldLayoutChg chg="setBg">
+          <pc:chgData name="wilson calil" userId="242df245c821da1d" providerId="LiveId" clId="{1E3C70F6-6071-472A-B5AB-629E848A8143}" dt="2020-04-14T19:39:46.051" v="677"/>
+          <pc:sldLayoutMkLst>
+            <pc:docMk/>
+            <pc:sldMasterMk cId="1593677570" sldId="2147483648"/>
+            <pc:sldLayoutMk cId="566293595" sldId="2147483653"/>
+          </pc:sldLayoutMkLst>
+        </pc:sldLayoutChg>
+        <pc:sldLayoutChg chg="setBg">
+          <pc:chgData name="wilson calil" userId="242df245c821da1d" providerId="LiveId" clId="{1E3C70F6-6071-472A-B5AB-629E848A8143}" dt="2020-04-14T19:39:46.051" v="677"/>
+          <pc:sldLayoutMkLst>
+            <pc:docMk/>
+            <pc:sldMasterMk cId="1593677570" sldId="2147483648"/>
+            <pc:sldLayoutMk cId="3823353677" sldId="2147483654"/>
+          </pc:sldLayoutMkLst>
+        </pc:sldLayoutChg>
+        <pc:sldLayoutChg chg="setBg">
+          <pc:chgData name="wilson calil" userId="242df245c821da1d" providerId="LiveId" clId="{1E3C70F6-6071-472A-B5AB-629E848A8143}" dt="2020-04-14T19:39:46.051" v="677"/>
+          <pc:sldLayoutMkLst>
+            <pc:docMk/>
+            <pc:sldMasterMk cId="1593677570" sldId="2147483648"/>
+            <pc:sldLayoutMk cId="3862450665" sldId="2147483655"/>
+          </pc:sldLayoutMkLst>
+        </pc:sldLayoutChg>
+        <pc:sldLayoutChg chg="setBg">
+          <pc:chgData name="wilson calil" userId="242df245c821da1d" providerId="LiveId" clId="{1E3C70F6-6071-472A-B5AB-629E848A8143}" dt="2020-04-14T19:39:46.051" v="677"/>
+          <pc:sldLayoutMkLst>
+            <pc:docMk/>
+            <pc:sldMasterMk cId="1593677570" sldId="2147483648"/>
+            <pc:sldLayoutMk cId="978211616" sldId="2147483656"/>
+          </pc:sldLayoutMkLst>
+        </pc:sldLayoutChg>
+        <pc:sldLayoutChg chg="setBg">
+          <pc:chgData name="wilson calil" userId="242df245c821da1d" providerId="LiveId" clId="{1E3C70F6-6071-472A-B5AB-629E848A8143}" dt="2020-04-14T19:39:46.051" v="677"/>
+          <pc:sldLayoutMkLst>
+            <pc:docMk/>
+            <pc:sldMasterMk cId="1593677570" sldId="2147483648"/>
+            <pc:sldLayoutMk cId="2702938910" sldId="2147483657"/>
+          </pc:sldLayoutMkLst>
+        </pc:sldLayoutChg>
+        <pc:sldLayoutChg chg="setBg">
+          <pc:chgData name="wilson calil" userId="242df245c821da1d" providerId="LiveId" clId="{1E3C70F6-6071-472A-B5AB-629E848A8143}" dt="2020-04-14T19:39:46.051" v="677"/>
+          <pc:sldLayoutMkLst>
+            <pc:docMk/>
+            <pc:sldMasterMk cId="1593677570" sldId="2147483648"/>
+            <pc:sldLayoutMk cId="3032141443" sldId="2147483658"/>
+          </pc:sldLayoutMkLst>
+        </pc:sldLayoutChg>
+        <pc:sldLayoutChg chg="setBg">
+          <pc:chgData name="wilson calil" userId="242df245c821da1d" providerId="LiveId" clId="{1E3C70F6-6071-472A-B5AB-629E848A8143}" dt="2020-04-14T19:39:46.051" v="677"/>
+          <pc:sldLayoutMkLst>
+            <pc:docMk/>
+            <pc:sldMasterMk cId="1593677570" sldId="2147483648"/>
+            <pc:sldLayoutMk cId="1495412687" sldId="2147483659"/>
+          </pc:sldLayoutMkLst>
+        </pc:sldLayoutChg>
+      </pc:sldMasterChg>
+    </pc:docChg>
+  </pc:docChgLst>
   <pc:docChgLst>
     <pc:chgData name="wilson calil" userId="242df245c821da1d" providerId="LiveId" clId="{9ED0FA34-102E-4ED2-A2E0-D1B28392056F}"/>
     <pc:docChg chg="undo custSel mod addSld delSld modSld sldOrd">
@@ -1372,7 +1651,7 @@
           <a:p>
             <a:fld id="{27F46EFC-FBDD-4E48-ADB1-5377E48E6790}" type="datetimeFigureOut">
               <a:rPr lang="en-US" smtClean="0"/>
-              <a:t>4/12/2020</a:t>
+              <a:t>4/14/2020</a:t>
             </a:fld>
             <a:endParaRPr lang="en-US"/>
           </a:p>
@@ -1570,7 +1849,7 @@
           <a:p>
             <a:fld id="{27F46EFC-FBDD-4E48-ADB1-5377E48E6790}" type="datetimeFigureOut">
               <a:rPr lang="en-US" smtClean="0"/>
-              <a:t>4/12/2020</a:t>
+              <a:t>4/14/2020</a:t>
             </a:fld>
             <a:endParaRPr lang="en-US"/>
           </a:p>
@@ -1778,7 +2057,7 @@
           <a:p>
             <a:fld id="{27F46EFC-FBDD-4E48-ADB1-5377E48E6790}" type="datetimeFigureOut">
               <a:rPr lang="en-US" smtClean="0"/>
-              <a:t>4/12/2020</a:t>
+              <a:t>4/14/2020</a:t>
             </a:fld>
             <a:endParaRPr lang="en-US"/>
           </a:p>
@@ -1976,7 +2255,7 @@
           <a:p>
             <a:fld id="{27F46EFC-FBDD-4E48-ADB1-5377E48E6790}" type="datetimeFigureOut">
               <a:rPr lang="en-US" smtClean="0"/>
-              <a:t>4/12/2020</a:t>
+              <a:t>4/14/2020</a:t>
             </a:fld>
             <a:endParaRPr lang="en-US"/>
           </a:p>
@@ -2251,7 +2530,7 @@
           <a:p>
             <a:fld id="{27F46EFC-FBDD-4E48-ADB1-5377E48E6790}" type="datetimeFigureOut">
               <a:rPr lang="en-US" smtClean="0"/>
-              <a:t>4/12/2020</a:t>
+              <a:t>4/14/2020</a:t>
             </a:fld>
             <a:endParaRPr lang="en-US"/>
           </a:p>
@@ -2516,7 +2795,7 @@
           <a:p>
             <a:fld id="{27F46EFC-FBDD-4E48-ADB1-5377E48E6790}" type="datetimeFigureOut">
               <a:rPr lang="en-US" smtClean="0"/>
-              <a:t>4/12/2020</a:t>
+              <a:t>4/14/2020</a:t>
             </a:fld>
             <a:endParaRPr lang="en-US"/>
           </a:p>
@@ -2928,7 +3207,7 @@
           <a:p>
             <a:fld id="{27F46EFC-FBDD-4E48-ADB1-5377E48E6790}" type="datetimeFigureOut">
               <a:rPr lang="en-US" smtClean="0"/>
-              <a:t>4/12/2020</a:t>
+              <a:t>4/14/2020</a:t>
             </a:fld>
             <a:endParaRPr lang="en-US"/>
           </a:p>
@@ -3069,7 +3348,7 @@
           <a:p>
             <a:fld id="{27F46EFC-FBDD-4E48-ADB1-5377E48E6790}" type="datetimeFigureOut">
               <a:rPr lang="en-US" smtClean="0"/>
-              <a:t>4/12/2020</a:t>
+              <a:t>4/14/2020</a:t>
             </a:fld>
             <a:endParaRPr lang="en-US"/>
           </a:p>
@@ -3182,7 +3461,7 @@
           <a:p>
             <a:fld id="{27F46EFC-FBDD-4E48-ADB1-5377E48E6790}" type="datetimeFigureOut">
               <a:rPr lang="en-US" smtClean="0"/>
-              <a:t>4/12/2020</a:t>
+              <a:t>4/14/2020</a:t>
             </a:fld>
             <a:endParaRPr lang="en-US"/>
           </a:p>
@@ -3493,7 +3772,7 @@
           <a:p>
             <a:fld id="{27F46EFC-FBDD-4E48-ADB1-5377E48E6790}" type="datetimeFigureOut">
               <a:rPr lang="en-US" smtClean="0"/>
-              <a:t>4/12/2020</a:t>
+              <a:t>4/14/2020</a:t>
             </a:fld>
             <a:endParaRPr lang="en-US"/>
           </a:p>
@@ -3781,7 +4060,7 @@
           <a:p>
             <a:fld id="{27F46EFC-FBDD-4E48-ADB1-5377E48E6790}" type="datetimeFigureOut">
               <a:rPr lang="en-US" smtClean="0"/>
-              <a:t>4/12/2020</a:t>
+              <a:t>4/14/2020</a:t>
             </a:fld>
             <a:endParaRPr lang="en-US"/>
           </a:p>
@@ -3858,9 +4137,12 @@
 <p:sldMaster xmlns:a="http://schemas.openxmlformats.org/drawingml/2006/main" xmlns:r="http://schemas.openxmlformats.org/officeDocument/2006/relationships" xmlns:p="http://schemas.openxmlformats.org/presentationml/2006/main">
   <p:cSld>
     <p:bg>
-      <p:bgRef idx="1001">
-        <a:schemeClr val="bg1"/>
-      </p:bgRef>
+      <p:bgPr>
+        <a:solidFill>
+          <a:srgbClr val="FDF7E3"/>
+        </a:solidFill>
+        <a:effectLst/>
+      </p:bgPr>
     </p:bg>
     <p:spTree>
       <p:nvGrpSpPr>
@@ -4022,7 +4304,7 @@
           <a:p>
             <a:fld id="{27F46EFC-FBDD-4E48-ADB1-5377E48E6790}" type="datetimeFigureOut">
               <a:rPr lang="en-US" smtClean="0"/>
-              <a:t>4/12/2020</a:t>
+              <a:t>4/14/2020</a:t>
             </a:fld>
             <a:endParaRPr lang="en-US"/>
           </a:p>
@@ -4557,14 +4839,21 @@
             <p:ph type="title"/>
           </p:nvPr>
         </p:nvSpPr>
-        <p:spPr/>
-        <p:txBody>
-          <a:bodyPr/>
+        <p:spPr>
+          <a:xfrm>
+            <a:off x="838200" y="291152"/>
+            <a:ext cx="10515600" cy="1181172"/>
+          </a:xfrm>
+        </p:spPr>
+        <p:txBody>
+          <a:bodyPr>
+            <a:normAutofit/>
+          </a:bodyPr>
           <a:lstStyle/>
           <a:p>
             <a:r>
-              <a:rPr lang="en-US" dirty="0"/>
-              <a:t>The bro time</a:t>
+              <a:rPr lang="en-US" sz="2800" b="1" dirty="0"/>
+              <a:t>Hangrr</a:t>
             </a:r>
           </a:p>
         </p:txBody>
@@ -4592,7 +4881,7 @@
           <a:p>
             <a:r>
               <a:rPr lang="en-US" dirty="0"/>
-              <a:t>App that will connect people that want to do the same thing in the same location using Google API.</a:t>
+              <a:t>App that connects people who want to do same things in the same location using Google API.</a:t>
             </a:r>
           </a:p>
           <a:p>
@@ -4729,9 +5018,14 @@
           <a:lstStyle/>
           <a:p>
             <a:r>
-              <a:rPr lang="en-US" dirty="0"/>
-              <a:t>The bro time</a:t>
-            </a:r>
+              <a:rPr lang="en-US" sz="2800" b="1" dirty="0">
+                <a:solidFill>
+                  <a:prstClr val="black"/>
+                </a:solidFill>
+              </a:rPr>
+              <a:t>Hangrr</a:t>
+            </a:r>
+            <a:endParaRPr lang="en-US" dirty="0"/>
           </a:p>
         </p:txBody>
       </p:sp>
@@ -4753,12 +5047,14 @@
         </p:nvSpPr>
         <p:spPr/>
         <p:txBody>
-          <a:bodyPr/>
+          <a:bodyPr>
+            <a:normAutofit lnSpcReduction="10000"/>
+          </a:bodyPr>
           <a:lstStyle/>
           <a:p>
             <a:r>
               <a:rPr lang="en-US" dirty="0"/>
-              <a:t>User will have chosen the things they are willing to do in a certain time and the app will match with someone who is close to his / her location.</a:t>
+              <a:t>User post what they are willing to do adding date and location and the app posts it in a newsfeed for other users to join</a:t>
             </a:r>
           </a:p>
           <a:p>
@@ -4767,15 +5063,25 @@
           <a:p>
             <a:r>
               <a:rPr lang="en-US" dirty="0"/>
-              <a:t>For example, if user 1 sets “</a:t>
-            </a:r>
-            <a:r>
-              <a:rPr lang="en-US" dirty="0" err="1"/>
-              <a:t>starbucks</a:t>
-            </a:r>
+              <a:t>They can click on join button and the newsfeed will show them as attendees of this hangout.</a:t>
+            </a:r>
+          </a:p>
+          <a:p>
+            <a:endParaRPr lang="en-US" dirty="0"/>
+          </a:p>
+          <a:p>
             <a:r>
               <a:rPr lang="en-US" dirty="0"/>
-              <a:t>” + “every evening” and user 2 decides to set Starbucks “now”, and it’s Thursday evening,  then the application will look for user 1 and send back to user 2. Then, user 2 can send an invite.</a:t>
+              <a:t>Users are able to post hangout that will be displayed on their profiles and will also be displayed on the Newsfeed.</a:t>
+            </a:r>
+          </a:p>
+          <a:p>
+            <a:endParaRPr lang="en-US" dirty="0"/>
+          </a:p>
+          <a:p>
+            <a:r>
+              <a:rPr lang="en-US" dirty="0"/>
+              <a:t>They can delete their hangouts from the profile.</a:t>
             </a:r>
           </a:p>
         </p:txBody>
@@ -4868,9 +5174,14 @@
           <a:lstStyle/>
           <a:p>
             <a:r>
-              <a:rPr lang="en-US" dirty="0"/>
-              <a:t>Proposed Tables</a:t>
-            </a:r>
+              <a:rPr lang="en-US" sz="2800" b="1" dirty="0">
+                <a:solidFill>
+                  <a:prstClr val="black"/>
+                </a:solidFill>
+              </a:rPr>
+              <a:t>Tables</a:t>
+            </a:r>
+            <a:endParaRPr lang="en-US" dirty="0"/>
           </a:p>
         </p:txBody>
       </p:sp>
@@ -4912,10 +5223,10 @@
       </p:pic>
       <p:pic>
         <p:nvPicPr>
-          <p:cNvPr id="17" name="Picture 16">
-            <a:extLst>
-              <a:ext uri="{FF2B5EF4-FFF2-40B4-BE49-F238E27FC236}">
-                <a16:creationId xmlns:a16="http://schemas.microsoft.com/office/drawing/2014/main" id="{C0211FF5-C466-457F-AC3C-CB11190C8ABB}"/>
+          <p:cNvPr id="8" name="Picture 7">
+            <a:extLst>
+              <a:ext uri="{FF2B5EF4-FFF2-40B4-BE49-F238E27FC236}">
+                <a16:creationId xmlns:a16="http://schemas.microsoft.com/office/drawing/2014/main" id="{B4CEAA96-6A82-4391-807B-83C543957134}"/>
               </a:ext>
             </a:extLst>
           </p:cNvPr>
@@ -4932,14 +5243,90 @@
         </p:blipFill>
         <p:spPr>
           <a:xfrm>
-            <a:off x="430590" y="2737056"/>
-            <a:ext cx="11567886" cy="1882155"/>
+            <a:off x="3783472" y="1526498"/>
+            <a:ext cx="4305103" cy="1292567"/>
           </a:xfrm>
           <a:prstGeom prst="rect">
             <a:avLst/>
           </a:prstGeom>
         </p:spPr>
       </p:pic>
+      <p:pic>
+        <p:nvPicPr>
+          <p:cNvPr id="9" name="Picture 8">
+            <a:extLst>
+              <a:ext uri="{FF2B5EF4-FFF2-40B4-BE49-F238E27FC236}">
+                <a16:creationId xmlns:a16="http://schemas.microsoft.com/office/drawing/2014/main" id="{80682850-4A93-40C8-9D2E-7D5BAA8008C7}"/>
+              </a:ext>
+            </a:extLst>
+          </p:cNvPr>
+          <p:cNvPicPr>
+            <a:picLocks noChangeAspect="1"/>
+          </p:cNvPicPr>
+          <p:nvPr/>
+        </p:nvPicPr>
+        <p:blipFill>
+          <a:blip r:embed="rId4"/>
+          <a:stretch>
+            <a:fillRect/>
+          </a:stretch>
+        </p:blipFill>
+        <p:spPr>
+          <a:xfrm>
+            <a:off x="2288759" y="4399127"/>
+            <a:ext cx="7294527" cy="1555811"/>
+          </a:xfrm>
+          <a:prstGeom prst="rect">
+            <a:avLst/>
+          </a:prstGeom>
+        </p:spPr>
+      </p:pic>
+      <p:sp>
+        <p:nvSpPr>
+          <p:cNvPr id="10" name="Arrow: Right 9">
+            <a:extLst>
+              <a:ext uri="{FF2B5EF4-FFF2-40B4-BE49-F238E27FC236}">
+                <a16:creationId xmlns:a16="http://schemas.microsoft.com/office/drawing/2014/main" id="{D56FC82D-4FE8-4D2B-B73E-CB48171E661F}"/>
+              </a:ext>
+            </a:extLst>
+          </p:cNvPr>
+          <p:cNvSpPr/>
+          <p:nvPr/>
+        </p:nvSpPr>
+        <p:spPr>
+          <a:xfrm rot="5400000">
+            <a:off x="5285664" y="3574978"/>
+            <a:ext cx="1215788" cy="313899"/>
+          </a:xfrm>
+          <a:prstGeom prst="rightArrow">
+            <a:avLst/>
+          </a:prstGeom>
+        </p:spPr>
+        <p:style>
+          <a:lnRef idx="2">
+            <a:schemeClr val="accent1">
+              <a:shade val="50000"/>
+            </a:schemeClr>
+          </a:lnRef>
+          <a:fillRef idx="1">
+            <a:schemeClr val="accent1"/>
+          </a:fillRef>
+          <a:effectRef idx="0">
+            <a:schemeClr val="accent1"/>
+          </a:effectRef>
+          <a:fontRef idx="minor">
+            <a:schemeClr val="lt1"/>
+          </a:fontRef>
+        </p:style>
+        <p:txBody>
+          <a:bodyPr rtlCol="0" anchor="ctr"/>
+          <a:lstStyle/>
+          <a:p>
+            <a:pPr algn="ctr"/>
+            <a:endParaRPr lang="en-US"/>
+          </a:p>
+        </p:txBody>
+      </p:sp>
     </p:spTree>
     <p:extLst>
       <p:ext uri="{BB962C8B-B14F-4D97-AF65-F5344CB8AC3E}">
@@ -4998,8 +5385,8 @@
         </p:blipFill>
         <p:spPr>
           <a:xfrm>
-            <a:off x="10481481" y="219562"/>
-            <a:ext cx="1306936" cy="1306936"/>
+            <a:off x="5184473" y="2750397"/>
+            <a:ext cx="1823053" cy="1823053"/>
           </a:xfrm>
           <a:prstGeom prst="rect">
             <a:avLst/>
@@ -5024,19 +5411,20 @@
         </p:nvSpPr>
         <p:spPr>
           <a:xfrm>
-            <a:off x="838200" y="365125"/>
-            <a:ext cx="10515600" cy="1325563"/>
+            <a:off x="533400" y="2999143"/>
+            <a:ext cx="7236725" cy="1325563"/>
           </a:xfrm>
         </p:spPr>
         <p:txBody>
-          <a:bodyPr/>
+          <a:bodyPr>
+            <a:normAutofit/>
+          </a:bodyPr>
           <a:lstStyle/>
           <a:p>
             <a:r>
-              <a:rPr lang="en-US"/>
-              <a:t>Wireframes</a:t>
-            </a:r>
-            <a:endParaRPr lang="en-US" dirty="0"/>
+              <a:rPr lang="en-US" sz="3600" b="1" dirty="0"/>
+              <a:t>Proposed Wireframes</a:t>
+            </a:r>
           </a:p>
         </p:txBody>
       </p:sp>
@@ -5056,14 +5444,6 @@
 <file path=ppt/slides/slide6.xml><?xml version="1.0" encoding="utf-8"?>
 <p:sld xmlns:a="http://schemas.openxmlformats.org/drawingml/2006/main" xmlns:r="http://schemas.openxmlformats.org/officeDocument/2006/relationships" xmlns:p="http://schemas.openxmlformats.org/presentationml/2006/main">
   <p:cSld>
-    <p:bg>
-      <p:bgPr>
-        <a:solidFill>
-          <a:schemeClr val="bg1"/>
-        </a:solidFill>
-        <a:effectLst/>
-      </p:bgPr>
-    </p:bg>
     <p:spTree>
       <p:nvGrpSpPr>
         <p:cNvPr id="1" name=""/>
@@ -5080,64 +5460,75 @@
       </p:grpSpPr>
       <p:sp>
         <p:nvSpPr>
-          <p:cNvPr id="52" name="Rectangle 18">
-            <a:extLst>
-              <a:ext uri="{FF2B5EF4-FFF2-40B4-BE49-F238E27FC236}">
-                <a16:creationId xmlns:a16="http://schemas.microsoft.com/office/drawing/2014/main" id="{49CD2D09-B1BB-4DF5-9E1C-3D21B21EDEFD}"/>
-              </a:ext>
-              <a:ext uri="{C183D7F6-B498-43B3-948B-1728B52AA6E4}">
-                <adec:decorative xmlns:adec="http://schemas.microsoft.com/office/drawing/2017/decorative" val="1"/>
+          <p:cNvPr id="3" name="Content Placeholder 2">
+            <a:extLst>
+              <a:ext uri="{FF2B5EF4-FFF2-40B4-BE49-F238E27FC236}">
+                <a16:creationId xmlns:a16="http://schemas.microsoft.com/office/drawing/2014/main" id="{285AC9F9-9C27-4D2C-880D-269BA992FE23}"/>
               </a:ext>
             </a:extLst>
           </p:cNvPr>
           <p:cNvSpPr>
-            <a:spLocks noGrp="1" noRot="1" noChangeAspect="1" noMove="1" noResize="1" noEditPoints="1" noAdjustHandles="1" noChangeArrowheads="1" noChangeShapeType="1" noTextEdit="1"/>
+            <a:spLocks noGrp="1"/>
           </p:cNvSpPr>
           <p:nvPr>
-            <p:extLst>
-              <p:ext uri="{386F3935-93C4-4BCD-93E2-E3B085C9AB24}">
-                <p16:designElem xmlns:p16="http://schemas.microsoft.com/office/powerpoint/2015/main" val="1"/>
-              </p:ext>
-            </p:extLst>
+            <p:ph idx="1"/>
           </p:nvPr>
         </p:nvSpPr>
         <p:spPr>
           <a:xfrm>
-            <a:off x="5920431" y="0"/>
-            <a:ext cx="6271569" cy="6858000"/>
+            <a:off x="2846029" y="535650"/>
+            <a:ext cx="6994658" cy="588518"/>
           </a:xfrm>
-          <a:prstGeom prst="rect">
+          <a:solidFill>
+            <a:schemeClr val="accent3">
+              <a:lumMod val="40000"/>
+              <a:lumOff val="60000"/>
+            </a:schemeClr>
+          </a:solidFill>
+          <a:ln>
+            <a:solidFill>
+              <a:schemeClr val="accent1">
+                <a:lumMod val="75000"/>
+              </a:schemeClr>
+            </a:solidFill>
+          </a:ln>
+        </p:spPr>
+        <p:txBody>
+          <a:bodyPr>
+            <a:normAutofit/>
+          </a:bodyPr>
+          <a:lstStyle/>
+          <a:p>
+            <a:pPr marL="0" indent="0" algn="ctr">
+              <a:buNone/>
+            </a:pPr>
+            <a:r>
+              <a:rPr lang="en-US" dirty="0"/>
+              <a:t>Search: Type Your Hang Out</a:t>
+            </a:r>
+          </a:p>
+        </p:txBody>
+      </p:sp>
+      <p:sp>
+        <p:nvSpPr>
+          <p:cNvPr id="4" name="Oval 3">
+            <a:extLst>
+              <a:ext uri="{FF2B5EF4-FFF2-40B4-BE49-F238E27FC236}">
+                <a16:creationId xmlns:a16="http://schemas.microsoft.com/office/drawing/2014/main" id="{D35BAA18-EF98-42F5-A8F2-639C78A446A5}"/>
+              </a:ext>
+            </a:extLst>
+          </p:cNvPr>
+          <p:cNvSpPr/>
+          <p:nvPr/>
+        </p:nvSpPr>
+        <p:spPr>
+          <a:xfrm>
+            <a:off x="403583" y="409936"/>
+            <a:ext cx="1414818" cy="1428465"/>
+          </a:xfrm>
+          <a:prstGeom prst="ellipse">
             <a:avLst/>
           </a:prstGeom>
-          <a:gradFill>
-            <a:gsLst>
-              <a:gs pos="0">
-                <a:schemeClr val="accent1">
-                  <a:lumMod val="100000"/>
-                  <a:alpha val="82000"/>
-                </a:schemeClr>
-              </a:gs>
-              <a:gs pos="25000">
-                <a:schemeClr val="accent1">
-                  <a:alpha val="60000"/>
-                </a:schemeClr>
-              </a:gs>
-              <a:gs pos="94000">
-                <a:schemeClr val="bg2">
-                  <a:lumMod val="75000"/>
-                </a:schemeClr>
-              </a:gs>
-              <a:gs pos="100000">
-                <a:schemeClr val="bg2">
-                  <a:lumMod val="75000"/>
-                </a:schemeClr>
-              </a:gs>
-            </a:gsLst>
-            <a:lin ang="4200000" scaled="0"/>
-          </a:gradFill>
-          <a:ln>
-            <a:noFill/>
-          </a:ln>
         </p:spPr>
         <p:style>
           <a:lnRef idx="2">
@@ -5164,28 +5555,54 @@
           </a:p>
         </p:txBody>
       </p:sp>
+      <p:sp>
+        <p:nvSpPr>
+          <p:cNvPr id="6" name="Rectangle 5">
+            <a:extLst>
+              <a:ext uri="{FF2B5EF4-FFF2-40B4-BE49-F238E27FC236}">
+                <a16:creationId xmlns:a16="http://schemas.microsoft.com/office/drawing/2014/main" id="{66E5A009-5410-4DF7-A074-65BB07B79FE1}"/>
+              </a:ext>
+            </a:extLst>
+          </p:cNvPr>
+          <p:cNvSpPr/>
+          <p:nvPr/>
+        </p:nvSpPr>
+        <p:spPr>
+          <a:xfrm>
+            <a:off x="552698" y="755514"/>
+            <a:ext cx="1116589" cy="646331"/>
+          </a:xfrm>
+          <a:prstGeom prst="rect">
+            <a:avLst/>
+          </a:prstGeom>
+        </p:spPr>
+        <p:txBody>
+          <a:bodyPr wrap="square">
+            <a:spAutoFit/>
+          </a:bodyPr>
+          <a:lstStyle/>
+          <a:p>
+            <a:pPr algn="ctr"/>
+            <a:r>
+              <a:rPr lang="en-US" dirty="0"/>
+              <a:t>Profile Picture</a:t>
+            </a:r>
+          </a:p>
+        </p:txBody>
+      </p:sp>
       <p:pic>
         <p:nvPicPr>
-          <p:cNvPr id="53" name="Picture 20">
-            <a:extLst>
-              <a:ext uri="{FF2B5EF4-FFF2-40B4-BE49-F238E27FC236}">
-                <a16:creationId xmlns:a16="http://schemas.microsoft.com/office/drawing/2014/main" id="{83355637-BA71-4F63-94C9-E77BF81BDFC0}"/>
-              </a:ext>
-              <a:ext uri="{C183D7F6-B498-43B3-948B-1728B52AA6E4}">
-                <adec:decorative xmlns:adec="http://schemas.microsoft.com/office/drawing/2017/decorative" val="1"/>
+          <p:cNvPr id="7" name="Picture 6" descr="A close up of a cable&#10;&#10;Description automatically generated">
+            <a:extLst>
+              <a:ext uri="{FF2B5EF4-FFF2-40B4-BE49-F238E27FC236}">
+                <a16:creationId xmlns:a16="http://schemas.microsoft.com/office/drawing/2014/main" id="{ED084E3A-4BB7-4D97-BD71-7DC45AC783B5}"/>
               </a:ext>
             </a:extLst>
           </p:cNvPr>
           <p:cNvPicPr>
-            <a:picLocks noGrp="1" noRot="1" noChangeAspect="1" noMove="1" noResize="1" noEditPoints="1" noAdjustHandles="1" noChangeArrowheads="1" noChangeShapeType="1" noCrop="1"/>
+            <a:picLocks noChangeAspect="1"/>
           </p:cNvPicPr>
-          <p:nvPr>
-            <p:extLst>
-              <p:ext uri="{386F3935-93C4-4BCD-93E2-E3B085C9AB24}">
-                <p16:designElem xmlns:p16="http://schemas.microsoft.com/office/powerpoint/2015/main" val="1"/>
-              </p:ext>
-            </p:extLst>
-          </p:nvPr>
+          <p:nvPr/>
         </p:nvPicPr>
         <p:blipFill>
           <a:blip r:embed="rId2">
@@ -5200,9 +5617,9 @@
           </a:stretch>
         </p:blipFill>
         <p:spPr>
-          <a:xfrm flipH="1">
-            <a:off x="0" y="0"/>
-            <a:ext cx="12192000" cy="6858000"/>
+          <a:xfrm>
+            <a:off x="10130249" y="301908"/>
+            <a:ext cx="1536493" cy="1536493"/>
           </a:xfrm>
           <a:prstGeom prst="rect">
             <a:avLst/>
@@ -5211,318 +5628,29 @@
       </p:pic>
       <p:sp>
         <p:nvSpPr>
-          <p:cNvPr id="54" name="Freeform 49">
-            <a:extLst>
-              <a:ext uri="{FF2B5EF4-FFF2-40B4-BE49-F238E27FC236}">
-                <a16:creationId xmlns:a16="http://schemas.microsoft.com/office/drawing/2014/main" id="{967C29FE-FD32-4AFB-AD20-DBDF5864B2D8}"/>
-              </a:ext>
-              <a:ext uri="{C183D7F6-B498-43B3-948B-1728B52AA6E4}">
-                <adec:decorative xmlns:adec="http://schemas.microsoft.com/office/drawing/2017/decorative" val="1"/>
-              </a:ext>
-            </a:extLst>
-          </p:cNvPr>
-          <p:cNvSpPr>
-            <a:spLocks noGrp="1" noRot="1" noChangeAspect="1" noMove="1" noResize="1" noEditPoints="1" noAdjustHandles="1" noChangeArrowheads="1" noChangeShapeType="1" noTextEdit="1"/>
-          </p:cNvSpPr>
-          <p:nvPr>
-            <p:extLst>
-              <p:ext uri="{386F3935-93C4-4BCD-93E2-E3B085C9AB24}">
-                <p16:designElem xmlns:p16="http://schemas.microsoft.com/office/powerpoint/2015/main" val="1"/>
-              </p:ext>
-            </p:extLst>
-          </p:nvPr>
-        </p:nvSpPr>
-        <p:spPr>
-          <a:xfrm flipH="1">
-            <a:off x="6713915" y="590635"/>
-            <a:ext cx="5478085" cy="6276841"/>
-          </a:xfrm>
-          <a:custGeom>
-            <a:avLst/>
-            <a:gdLst>
-              <a:gd name="connsiteX0" fmla="*/ 2178155 w 5478085"/>
-              <a:gd name="connsiteY0" fmla="*/ 0 h 6276841"/>
-              <a:gd name="connsiteX1" fmla="*/ 5478085 w 5478085"/>
-              <a:gd name="connsiteY1" fmla="*/ 3299930 h 6276841"/>
-              <a:gd name="connsiteX2" fmla="*/ 3751098 w 5478085"/>
-              <a:gd name="connsiteY2" fmla="*/ 6201577 h 6276841"/>
-              <a:gd name="connsiteX3" fmla="*/ 3594858 w 5478085"/>
-              <a:gd name="connsiteY3" fmla="*/ 6276841 h 6276841"/>
-              <a:gd name="connsiteX4" fmla="*/ 761453 w 5478085"/>
-              <a:gd name="connsiteY4" fmla="*/ 6276841 h 6276841"/>
-              <a:gd name="connsiteX5" fmla="*/ 605213 w 5478085"/>
-              <a:gd name="connsiteY5" fmla="*/ 6201577 h 6276841"/>
-              <a:gd name="connsiteX6" fmla="*/ 79093 w 5478085"/>
-              <a:gd name="connsiteY6" fmla="*/ 5846317 h 6276841"/>
-              <a:gd name="connsiteX7" fmla="*/ 0 w 5478085"/>
-              <a:gd name="connsiteY7" fmla="*/ 5774432 h 6276841"/>
-              <a:gd name="connsiteX8" fmla="*/ 0 w 5478085"/>
-              <a:gd name="connsiteY8" fmla="*/ 825429 h 6276841"/>
-              <a:gd name="connsiteX9" fmla="*/ 79093 w 5478085"/>
-              <a:gd name="connsiteY9" fmla="*/ 753544 h 6276841"/>
-              <a:gd name="connsiteX10" fmla="*/ 2178155 w 5478085"/>
-              <a:gd name="connsiteY10" fmla="*/ 0 h 6276841"/>
-            </a:gdLst>
-            <a:ahLst/>
-            <a:cxnLst>
-              <a:cxn ang="0">
-                <a:pos x="connsiteX0" y="connsiteY0"/>
-              </a:cxn>
-              <a:cxn ang="0">
-                <a:pos x="connsiteX1" y="connsiteY1"/>
-              </a:cxn>
-              <a:cxn ang="0">
-                <a:pos x="connsiteX2" y="connsiteY2"/>
-              </a:cxn>
-              <a:cxn ang="0">
-                <a:pos x="connsiteX3" y="connsiteY3"/>
-              </a:cxn>
-              <a:cxn ang="0">
-                <a:pos x="connsiteX4" y="connsiteY4"/>
-              </a:cxn>
-              <a:cxn ang="0">
-                <a:pos x="connsiteX5" y="connsiteY5"/>
-              </a:cxn>
-              <a:cxn ang="0">
-                <a:pos x="connsiteX6" y="connsiteY6"/>
-              </a:cxn>
-              <a:cxn ang="0">
-                <a:pos x="connsiteX7" y="connsiteY7"/>
-              </a:cxn>
-              <a:cxn ang="0">
-                <a:pos x="connsiteX8" y="connsiteY8"/>
-              </a:cxn>
-              <a:cxn ang="0">
-                <a:pos x="connsiteX9" y="connsiteY9"/>
-              </a:cxn>
-              <a:cxn ang="0">
-                <a:pos x="connsiteX10" y="connsiteY10"/>
-              </a:cxn>
-            </a:cxnLst>
-            <a:rect l="l" t="t" r="r" b="b"/>
-            <a:pathLst>
-              <a:path w="5478085" h="6276841">
-                <a:moveTo>
-                  <a:pt x="2178155" y="0"/>
-                </a:moveTo>
-                <a:cubicBezTo>
-                  <a:pt x="4000656" y="0"/>
-                  <a:pt x="5478085" y="1477429"/>
-                  <a:pt x="5478085" y="3299930"/>
-                </a:cubicBezTo>
-                <a:cubicBezTo>
-                  <a:pt x="5478085" y="4552900"/>
-                  <a:pt x="4779769" y="5642769"/>
-                  <a:pt x="3751098" y="6201577"/>
-                </a:cubicBezTo>
-                <a:lnTo>
-                  <a:pt x="3594858" y="6276841"/>
-                </a:lnTo>
-                <a:lnTo>
-                  <a:pt x="761453" y="6276841"/>
-                </a:lnTo>
-                <a:lnTo>
-                  <a:pt x="605213" y="6201577"/>
-                </a:lnTo>
-                <a:cubicBezTo>
-                  <a:pt x="418182" y="6099975"/>
-                  <a:pt x="242071" y="5980818"/>
-                  <a:pt x="79093" y="5846317"/>
-                </a:cubicBezTo>
-                <a:lnTo>
-                  <a:pt x="0" y="5774432"/>
-                </a:lnTo>
-                <a:lnTo>
-                  <a:pt x="0" y="825429"/>
-                </a:lnTo>
-                <a:lnTo>
-                  <a:pt x="79093" y="753544"/>
-                </a:lnTo>
-                <a:cubicBezTo>
-                  <a:pt x="649516" y="282789"/>
-                  <a:pt x="1380811" y="0"/>
-                  <a:pt x="2178155" y="0"/>
-                </a:cubicBezTo>
-                <a:close/>
-              </a:path>
-            </a:pathLst>
-          </a:custGeom>
-          <a:solidFill>
-            <a:srgbClr val="FFFFFF"/>
-          </a:solidFill>
-          <a:ln>
-            <a:gradFill>
-              <a:gsLst>
-                <a:gs pos="0">
-                  <a:schemeClr val="accent1">
-                    <a:lumMod val="40000"/>
-                    <a:lumOff val="60000"/>
-                  </a:schemeClr>
-                </a:gs>
-                <a:gs pos="23000">
-                  <a:schemeClr val="accent1">
-                    <a:lumMod val="45000"/>
-                    <a:lumOff val="55000"/>
-                  </a:schemeClr>
-                </a:gs>
-                <a:gs pos="83000">
-                  <a:schemeClr val="accent3"/>
-                </a:gs>
-                <a:gs pos="100000">
-                  <a:schemeClr val="accent3"/>
-                </a:gs>
-              </a:gsLst>
-              <a:lin ang="5400000" scaled="1"/>
-            </a:gradFill>
-          </a:ln>
-        </p:spPr>
-        <p:style>
-          <a:lnRef idx="2">
-            <a:schemeClr val="accent1">
-              <a:shade val="50000"/>
-            </a:schemeClr>
-          </a:lnRef>
-          <a:fillRef idx="1">
-            <a:schemeClr val="accent1"/>
-          </a:fillRef>
-          <a:effectRef idx="0">
-            <a:schemeClr val="accent1"/>
-          </a:effectRef>
-          <a:fontRef idx="minor">
-            <a:schemeClr val="lt1"/>
-          </a:fontRef>
-        </p:style>
-        <p:txBody>
-          <a:bodyPr wrap="square" rtlCol="0" anchor="ctr">
-            <a:noAutofit/>
-          </a:bodyPr>
-          <a:lstStyle/>
-          <a:p>
-            <a:pPr algn="ctr"/>
-            <a:endParaRPr lang="en-US"/>
-          </a:p>
-        </p:txBody>
-      </p:sp>
-      <p:pic>
-        <p:nvPicPr>
-          <p:cNvPr id="4" name="Picture 3" descr="A close up of a cable&#10;&#10;Description automatically generated">
-            <a:extLst>
-              <a:ext uri="{FF2B5EF4-FFF2-40B4-BE49-F238E27FC236}">
-                <a16:creationId xmlns:a16="http://schemas.microsoft.com/office/drawing/2014/main" id="{7BD80E37-BC71-4536-8DFB-206105AB347F}"/>
-              </a:ext>
-            </a:extLst>
-          </p:cNvPr>
-          <p:cNvPicPr>
-            <a:picLocks noChangeAspect="1"/>
-          </p:cNvPicPr>
+          <p:cNvPr id="8" name="Content Placeholder 2">
+            <a:extLst>
+              <a:ext uri="{FF2B5EF4-FFF2-40B4-BE49-F238E27FC236}">
+                <a16:creationId xmlns:a16="http://schemas.microsoft.com/office/drawing/2014/main" id="{14DF7D47-4B44-4AE7-A56B-D33545498025}"/>
+              </a:ext>
+            </a:extLst>
+          </p:cNvPr>
+          <p:cNvSpPr txBox="1">
+            <a:spLocks/>
+          </p:cNvSpPr>
           <p:nvPr/>
-        </p:nvPicPr>
-        <p:blipFill rotWithShape="1">
-          <a:blip r:embed="rId3">
-            <a:extLst>
-              <a:ext uri="{28A0092B-C50C-407E-A947-70E740481C1C}">
-                <a14:useLocalDpi xmlns:a14="http://schemas.microsoft.com/office/drawing/2010/main" val="0"/>
-              </a:ext>
-            </a:extLst>
-          </a:blip>
-          <a:srcRect l="6551" r="6549" b="-1"/>
-          <a:stretch/>
-        </p:blipFill>
+        </p:nvSpPr>
         <p:spPr>
           <a:xfrm>
-            <a:off x="6893318" y="770037"/>
-            <a:ext cx="5298683" cy="6097438"/>
-          </a:xfrm>
-          <a:custGeom>
-            <a:avLst/>
-            <a:gdLst/>
-            <a:ahLst/>
-            <a:cxnLst/>
-            <a:rect l="l" t="t" r="r" b="b"/>
-            <a:pathLst>
-              <a:path w="5298683" h="6097438">
-                <a:moveTo>
-                  <a:pt x="3120528" y="0"/>
-                </a:moveTo>
-                <a:cubicBezTo>
-                  <a:pt x="3874524" y="0"/>
-                  <a:pt x="4566062" y="267415"/>
-                  <a:pt x="5105473" y="712577"/>
-                </a:cubicBezTo>
-                <a:lnTo>
-                  <a:pt x="5298683" y="888178"/>
-                </a:lnTo>
-                <a:lnTo>
-                  <a:pt x="5298683" y="5352876"/>
-                </a:lnTo>
-                <a:lnTo>
-                  <a:pt x="5105473" y="5528477"/>
-                </a:lnTo>
-                <a:cubicBezTo>
-                  <a:pt x="4874296" y="5719261"/>
-                  <a:pt x="4615179" y="5877397"/>
-                  <a:pt x="4335177" y="5995828"/>
-                </a:cubicBezTo>
-                <a:lnTo>
-                  <a:pt x="4057556" y="6097438"/>
-                </a:lnTo>
-                <a:lnTo>
-                  <a:pt x="2183499" y="6097438"/>
-                </a:lnTo>
-                <a:lnTo>
-                  <a:pt x="1905878" y="5995828"/>
-                </a:lnTo>
-                <a:cubicBezTo>
-                  <a:pt x="785873" y="5522106"/>
-                  <a:pt x="0" y="4413092"/>
-                  <a:pt x="0" y="3120527"/>
-                </a:cubicBezTo>
-                <a:cubicBezTo>
-                  <a:pt x="0" y="1397108"/>
-                  <a:pt x="1397108" y="0"/>
-                  <a:pt x="3120528" y="0"/>
-                </a:cubicBezTo>
-                <a:close/>
-              </a:path>
-            </a:pathLst>
-          </a:custGeom>
-        </p:spPr>
-      </p:pic>
-      <p:sp>
-        <p:nvSpPr>
-          <p:cNvPr id="41" name="Content Placeholder 2">
-            <a:extLst>
-              <a:ext uri="{FF2B5EF4-FFF2-40B4-BE49-F238E27FC236}">
-                <a16:creationId xmlns:a16="http://schemas.microsoft.com/office/drawing/2014/main" id="{8DDCCB4B-8AA2-4A93-8D2C-0145AE8C0494}"/>
-              </a:ext>
-            </a:extLst>
-          </p:cNvPr>
-          <p:cNvSpPr txBox="1">
-            <a:spLocks/>
-          </p:cNvSpPr>
-          <p:nvPr/>
-        </p:nvSpPr>
-        <p:spPr>
-          <a:xfrm>
-            <a:off x="891438" y="546705"/>
-            <a:ext cx="4033742" cy="556381"/>
+            <a:off x="2846029" y="2924629"/>
+            <a:ext cx="5020714" cy="2929466"/>
           </a:xfrm>
           <a:prstGeom prst="rect">
             <a:avLst/>
           </a:prstGeom>
           <a:solidFill>
-            <a:schemeClr val="accent3">
-              <a:lumMod val="40000"/>
-              <a:lumOff val="60000"/>
-            </a:schemeClr>
+            <a:schemeClr val="accent1"/>
           </a:solidFill>
-          <a:ln>
-            <a:solidFill>
-              <a:schemeClr val="accent1">
-                <a:lumMod val="75000"/>
-              </a:schemeClr>
-            </a:solidFill>
-          </a:ln>
         </p:spPr>
         <p:txBody>
           <a:bodyPr vert="horz" lIns="91440" tIns="45720" rIns="91440" bIns="45720" rtlCol="0">
@@ -5698,19 +5826,67 @@
               <a:buNone/>
             </a:pPr>
             <a:r>
-              <a:rPr lang="en-US"/>
-              <a:t>Sign up</a:t>
+              <a:rPr lang="en-US" u="sng" dirty="0"/>
+              <a:t>Your personal hang outs:</a:t>
+            </a:r>
+          </a:p>
+          <a:p>
+            <a:pPr marL="0" indent="0" algn="ctr">
+              <a:buFont typeface="Arial" panose="020B0604020202020204" pitchFamily="34" charset="0"/>
+              <a:buNone/>
+            </a:pPr>
+            <a:endParaRPr lang="en-US" u="sng" dirty="0"/>
+          </a:p>
+          <a:p>
+            <a:pPr marL="0" indent="0" algn="ctr">
+              <a:buFont typeface="Arial" panose="020B0604020202020204" pitchFamily="34" charset="0"/>
+              <a:buNone/>
+            </a:pPr>
+            <a:r>
+              <a:rPr lang="en-US" dirty="0"/>
+              <a:t>Play soccer on April 1st</a:t>
+            </a:r>
+          </a:p>
+          <a:p>
+            <a:pPr marL="0" indent="0" algn="ctr">
+              <a:buFont typeface="Arial" panose="020B0604020202020204" pitchFamily="34" charset="0"/>
+              <a:buNone/>
+            </a:pPr>
+            <a:r>
+              <a:rPr lang="en-US" dirty="0"/>
+              <a:t>Play Tennis on April 5</a:t>
+            </a:r>
+            <a:r>
+              <a:rPr lang="en-US" baseline="30000" dirty="0"/>
+              <a:t>th</a:t>
             </a:r>
             <a:endParaRPr lang="en-US" dirty="0"/>
           </a:p>
-        </p:txBody>
-      </p:sp>
-      <p:sp>
-        <p:nvSpPr>
-          <p:cNvPr id="43" name="Content Placeholder 2">
-            <a:extLst>
-              <a:ext uri="{FF2B5EF4-FFF2-40B4-BE49-F238E27FC236}">
-                <a16:creationId xmlns:a16="http://schemas.microsoft.com/office/drawing/2014/main" id="{D7BCBE7F-C69B-4A6B-A5E1-B02BCEBB1C2C}"/>
+          <a:p>
+            <a:pPr marL="0" indent="0" algn="ctr">
+              <a:buFont typeface="Arial" panose="020B0604020202020204" pitchFamily="34" charset="0"/>
+              <a:buNone/>
+            </a:pPr>
+            <a:r>
+              <a:rPr lang="en-US" dirty="0"/>
+              <a:t>Go to a Museum on May 1st</a:t>
+            </a:r>
+          </a:p>
+          <a:p>
+            <a:pPr marL="0" indent="0" algn="ctr">
+              <a:buFont typeface="Arial" panose="020B0604020202020204" pitchFamily="34" charset="0"/>
+              <a:buNone/>
+            </a:pPr>
+            <a:endParaRPr lang="en-US" dirty="0"/>
+          </a:p>
+        </p:txBody>
+      </p:sp>
+      <p:sp>
+        <p:nvSpPr>
+          <p:cNvPr id="10" name="Content Placeholder 2">
+            <a:extLst>
+              <a:ext uri="{FF2B5EF4-FFF2-40B4-BE49-F238E27FC236}">
+                <a16:creationId xmlns:a16="http://schemas.microsoft.com/office/drawing/2014/main" id="{855051F8-B34A-4BCE-9661-4EF3AD5D5D6C}"/>
               </a:ext>
             </a:extLst>
           </p:cNvPr>
@@ -5721,25 +5897,15 @@
         </p:nvSpPr>
         <p:spPr>
           <a:xfrm>
-            <a:off x="891438" y="1470781"/>
-            <a:ext cx="4033742" cy="556381"/>
+            <a:off x="8068715" y="2924629"/>
+            <a:ext cx="1771973" cy="2929466"/>
           </a:xfrm>
           <a:prstGeom prst="rect">
             <a:avLst/>
           </a:prstGeom>
           <a:solidFill>
-            <a:schemeClr val="accent3">
-              <a:lumMod val="40000"/>
-              <a:lumOff val="60000"/>
-            </a:schemeClr>
+            <a:schemeClr val="accent1"/>
           </a:solidFill>
-          <a:ln>
-            <a:solidFill>
-              <a:schemeClr val="accent1">
-                <a:lumMod val="75000"/>
-              </a:schemeClr>
-            </a:solidFill>
-          </a:ln>
         </p:spPr>
         <p:txBody>
           <a:bodyPr vert="horz" lIns="91440" tIns="45720" rIns="91440" bIns="45720" rtlCol="0">
@@ -5915,63 +6081,72 @@
               <a:buNone/>
             </a:pPr>
             <a:r>
+              <a:rPr lang="en-US" u="sng" dirty="0" err="1"/>
+              <a:t>Hangrrs</a:t>
+            </a:r>
+            <a:endParaRPr lang="en-US" u="sng" dirty="0"/>
+          </a:p>
+          <a:p>
+            <a:pPr marL="0" indent="0" algn="ctr">
+              <a:buFont typeface="Arial" panose="020B0604020202020204" pitchFamily="34" charset="0"/>
+              <a:buNone/>
+            </a:pPr>
+            <a:endParaRPr lang="en-US" u="sng" dirty="0"/>
+          </a:p>
+          <a:p>
+            <a:pPr marL="0" indent="0" algn="ctr">
+              <a:buFont typeface="Arial" panose="020B0604020202020204" pitchFamily="34" charset="0"/>
+              <a:buNone/>
+            </a:pPr>
+            <a:r>
               <a:rPr lang="en-US" dirty="0"/>
-              <a:t>Login</a:t>
-            </a:r>
-          </a:p>
-        </p:txBody>
-      </p:sp>
-    </p:spTree>
-    <p:extLst>
-      <p:ext uri="{BB962C8B-B14F-4D97-AF65-F5344CB8AC3E}">
-        <p14:creationId xmlns:p14="http://schemas.microsoft.com/office/powerpoint/2010/main" val="959754174"/>
-      </p:ext>
-    </p:extLst>
-  </p:cSld>
-  <p:clrMapOvr>
-    <a:masterClrMapping/>
-  </p:clrMapOvr>
-</p:sld>
-</file>
-
-<file path=ppt/slides/slide7.xml><?xml version="1.0" encoding="utf-8"?>
-<p:sld xmlns:a="http://schemas.openxmlformats.org/drawingml/2006/main" xmlns:r="http://schemas.openxmlformats.org/officeDocument/2006/relationships" xmlns:p="http://schemas.openxmlformats.org/presentationml/2006/main">
-  <p:cSld>
-    <p:spTree>
-      <p:nvGrpSpPr>
-        <p:cNvPr id="1" name=""/>
-        <p:cNvGrpSpPr/>
-        <p:nvPr/>
-      </p:nvGrpSpPr>
-      <p:grpSpPr>
-        <a:xfrm>
-          <a:off x="0" y="0"/>
-          <a:ext cx="0" cy="0"/>
-          <a:chOff x="0" y="0"/>
-          <a:chExt cx="0" cy="0"/>
-        </a:xfrm>
-      </p:grpSpPr>
-      <p:sp>
-        <p:nvSpPr>
-          <p:cNvPr id="3" name="Content Placeholder 2">
-            <a:extLst>
-              <a:ext uri="{FF2B5EF4-FFF2-40B4-BE49-F238E27FC236}">
-                <a16:creationId xmlns:a16="http://schemas.microsoft.com/office/drawing/2014/main" id="{285AC9F9-9C27-4D2C-880D-269BA992FE23}"/>
-              </a:ext>
-            </a:extLst>
-          </p:cNvPr>
-          <p:cNvSpPr>
-            <a:spLocks noGrp="1"/>
-          </p:cNvSpPr>
-          <p:nvPr>
-            <p:ph idx="1"/>
-          </p:nvPr>
+              <a:t>Ike, Chace</a:t>
+            </a:r>
+          </a:p>
+          <a:p>
+            <a:pPr marL="0" indent="0" algn="ctr">
+              <a:buFont typeface="Arial" panose="020B0604020202020204" pitchFamily="34" charset="0"/>
+              <a:buNone/>
+            </a:pPr>
+            <a:r>
+              <a:rPr lang="en-US" dirty="0"/>
+              <a:t>Wilson</a:t>
+            </a:r>
+          </a:p>
+          <a:p>
+            <a:pPr marL="0" indent="0" algn="ctr">
+              <a:buFont typeface="Arial" panose="020B0604020202020204" pitchFamily="34" charset="0"/>
+              <a:buNone/>
+            </a:pPr>
+            <a:r>
+              <a:rPr lang="en-US" dirty="0"/>
+              <a:t>Ike </a:t>
+            </a:r>
+          </a:p>
+        </p:txBody>
+      </p:sp>
+      <p:sp>
+        <p:nvSpPr>
+          <p:cNvPr id="12" name="Content Placeholder 2">
+            <a:extLst>
+              <a:ext uri="{FF2B5EF4-FFF2-40B4-BE49-F238E27FC236}">
+                <a16:creationId xmlns:a16="http://schemas.microsoft.com/office/drawing/2014/main" id="{964ACE52-3BFE-4EA0-BBE5-CBD3AF161FB5}"/>
+              </a:ext>
+            </a:extLst>
+          </p:cNvPr>
+          <p:cNvSpPr txBox="1">
+            <a:spLocks/>
+          </p:cNvSpPr>
+          <p:nvPr/>
         </p:nvSpPr>
         <p:spPr>
           <a:xfrm>
-            <a:off x="2846029" y="535650"/>
-            <a:ext cx="6994658" cy="588518"/>
+            <a:off x="2846029" y="1401845"/>
+            <a:ext cx="6994658" cy="1172022"/>
           </a:xfrm>
+          <a:prstGeom prst="rect">
+            <a:avLst/>
+          </a:prstGeom>
           <a:solidFill>
             <a:schemeClr val="accent3">
               <a:lumMod val="40000"/>
@@ -5985,165 +6160,6 @@
               </a:schemeClr>
             </a:solidFill>
           </a:ln>
-        </p:spPr>
-        <p:txBody>
-          <a:bodyPr>
-            <a:normAutofit/>
-          </a:bodyPr>
-          <a:lstStyle/>
-          <a:p>
-            <a:pPr marL="0" indent="0" algn="ctr">
-              <a:buNone/>
-            </a:pPr>
-            <a:r>
-              <a:rPr lang="en-US" dirty="0"/>
-              <a:t>Search: Type Your Hang Out</a:t>
-            </a:r>
-          </a:p>
-        </p:txBody>
-      </p:sp>
-      <p:sp>
-        <p:nvSpPr>
-          <p:cNvPr id="4" name="Oval 3">
-            <a:extLst>
-              <a:ext uri="{FF2B5EF4-FFF2-40B4-BE49-F238E27FC236}">
-                <a16:creationId xmlns:a16="http://schemas.microsoft.com/office/drawing/2014/main" id="{D35BAA18-EF98-42F5-A8F2-639C78A446A5}"/>
-              </a:ext>
-            </a:extLst>
-          </p:cNvPr>
-          <p:cNvSpPr/>
-          <p:nvPr/>
-        </p:nvSpPr>
-        <p:spPr>
-          <a:xfrm>
-            <a:off x="403583" y="409936"/>
-            <a:ext cx="1414818" cy="1428465"/>
-          </a:xfrm>
-          <a:prstGeom prst="ellipse">
-            <a:avLst/>
-          </a:prstGeom>
-        </p:spPr>
-        <p:style>
-          <a:lnRef idx="2">
-            <a:schemeClr val="accent1">
-              <a:shade val="50000"/>
-            </a:schemeClr>
-          </a:lnRef>
-          <a:fillRef idx="1">
-            <a:schemeClr val="accent1"/>
-          </a:fillRef>
-          <a:effectRef idx="0">
-            <a:schemeClr val="accent1"/>
-          </a:effectRef>
-          <a:fontRef idx="minor">
-            <a:schemeClr val="lt1"/>
-          </a:fontRef>
-        </p:style>
-        <p:txBody>
-          <a:bodyPr rtlCol="0" anchor="ctr"/>
-          <a:lstStyle/>
-          <a:p>
-            <a:pPr algn="ctr"/>
-            <a:endParaRPr lang="en-US"/>
-          </a:p>
-        </p:txBody>
-      </p:sp>
-      <p:sp>
-        <p:nvSpPr>
-          <p:cNvPr id="6" name="Rectangle 5">
-            <a:extLst>
-              <a:ext uri="{FF2B5EF4-FFF2-40B4-BE49-F238E27FC236}">
-                <a16:creationId xmlns:a16="http://schemas.microsoft.com/office/drawing/2014/main" id="{66E5A009-5410-4DF7-A074-65BB07B79FE1}"/>
-              </a:ext>
-            </a:extLst>
-          </p:cNvPr>
-          <p:cNvSpPr/>
-          <p:nvPr/>
-        </p:nvSpPr>
-        <p:spPr>
-          <a:xfrm>
-            <a:off x="552698" y="755514"/>
-            <a:ext cx="1116589" cy="646331"/>
-          </a:xfrm>
-          <a:prstGeom prst="rect">
-            <a:avLst/>
-          </a:prstGeom>
-        </p:spPr>
-        <p:txBody>
-          <a:bodyPr wrap="square">
-            <a:spAutoFit/>
-          </a:bodyPr>
-          <a:lstStyle/>
-          <a:p>
-            <a:pPr algn="ctr"/>
-            <a:r>
-              <a:rPr lang="en-US" dirty="0"/>
-              <a:t>Profile Picture</a:t>
-            </a:r>
-          </a:p>
-        </p:txBody>
-      </p:sp>
-      <p:pic>
-        <p:nvPicPr>
-          <p:cNvPr id="7" name="Picture 6" descr="A close up of a cable&#10;&#10;Description automatically generated">
-            <a:extLst>
-              <a:ext uri="{FF2B5EF4-FFF2-40B4-BE49-F238E27FC236}">
-                <a16:creationId xmlns:a16="http://schemas.microsoft.com/office/drawing/2014/main" id="{ED084E3A-4BB7-4D97-BD71-7DC45AC783B5}"/>
-              </a:ext>
-            </a:extLst>
-          </p:cNvPr>
-          <p:cNvPicPr>
-            <a:picLocks noChangeAspect="1"/>
-          </p:cNvPicPr>
-          <p:nvPr/>
-        </p:nvPicPr>
-        <p:blipFill>
-          <a:blip r:embed="rId2">
-            <a:extLst>
-              <a:ext uri="{28A0092B-C50C-407E-A947-70E740481C1C}">
-                <a14:useLocalDpi xmlns:a14="http://schemas.microsoft.com/office/drawing/2010/main" val="0"/>
-              </a:ext>
-            </a:extLst>
-          </a:blip>
-          <a:stretch>
-            <a:fillRect/>
-          </a:stretch>
-        </p:blipFill>
-        <p:spPr>
-          <a:xfrm>
-            <a:off x="10130249" y="301908"/>
-            <a:ext cx="1536493" cy="1536493"/>
-          </a:xfrm>
-          <a:prstGeom prst="rect">
-            <a:avLst/>
-          </a:prstGeom>
-        </p:spPr>
-      </p:pic>
-      <p:sp>
-        <p:nvSpPr>
-          <p:cNvPr id="8" name="Content Placeholder 2">
-            <a:extLst>
-              <a:ext uri="{FF2B5EF4-FFF2-40B4-BE49-F238E27FC236}">
-                <a16:creationId xmlns:a16="http://schemas.microsoft.com/office/drawing/2014/main" id="{14DF7D47-4B44-4AE7-A56B-D33545498025}"/>
-              </a:ext>
-            </a:extLst>
-          </p:cNvPr>
-          <p:cNvSpPr txBox="1">
-            <a:spLocks/>
-          </p:cNvSpPr>
-          <p:nvPr/>
-        </p:nvSpPr>
-        <p:spPr>
-          <a:xfrm>
-            <a:off x="2846029" y="2924629"/>
-            <a:ext cx="5020714" cy="2929466"/>
-          </a:xfrm>
-          <a:prstGeom prst="rect">
-            <a:avLst/>
-          </a:prstGeom>
-          <a:solidFill>
-            <a:schemeClr val="accent1"/>
-          </a:solidFill>
         </p:spPr>
         <p:txBody>
           <a:bodyPr vert="horz" lIns="91440" tIns="45720" rIns="91440" bIns="45720" rtlCol="0">
@@ -6319,8 +6335,8 @@
               <a:buNone/>
             </a:pPr>
             <a:r>
-              <a:rPr lang="en-US" u="sng" dirty="0"/>
-              <a:t>Your personal hang outs:</a:t>
+              <a:rPr lang="en-US" dirty="0"/>
+              <a:t>Popular Events Near You / Results</a:t>
             </a:r>
           </a:p>
           <a:p>
@@ -6328,58 +6344,400 @@
               <a:buFont typeface="Arial" panose="020B0604020202020204" pitchFamily="34" charset="0"/>
               <a:buNone/>
             </a:pPr>
-            <a:endParaRPr lang="en-US" u="sng" dirty="0"/>
-          </a:p>
+            <a:r>
+              <a:rPr lang="en-US" sz="1600" dirty="0"/>
+              <a:t>Play Tennis  *  Have coffee  *  Go to Museum</a:t>
+            </a:r>
+          </a:p>
+        </p:txBody>
+      </p:sp>
+      <p:sp>
+        <p:nvSpPr>
+          <p:cNvPr id="14" name="Content Placeholder 2">
+            <a:extLst>
+              <a:ext uri="{FF2B5EF4-FFF2-40B4-BE49-F238E27FC236}">
+                <a16:creationId xmlns:a16="http://schemas.microsoft.com/office/drawing/2014/main" id="{967AEAFD-F0ED-44C5-B33A-225130C1A793}"/>
+              </a:ext>
+            </a:extLst>
+          </p:cNvPr>
+          <p:cNvSpPr txBox="1">
+            <a:spLocks/>
+          </p:cNvSpPr>
+          <p:nvPr/>
+        </p:nvSpPr>
+        <p:spPr>
+          <a:xfrm>
+            <a:off x="289091" y="3350381"/>
+            <a:ext cx="1752581" cy="3314094"/>
+          </a:xfrm>
+          <a:prstGeom prst="rect">
+            <a:avLst/>
+          </a:prstGeom>
+          <a:solidFill>
+            <a:schemeClr val="accent1"/>
+          </a:solidFill>
+        </p:spPr>
+        <p:txBody>
+          <a:bodyPr vert="horz" lIns="91440" tIns="45720" rIns="91440" bIns="45720" rtlCol="0">
+            <a:normAutofit fontScale="55000" lnSpcReduction="20000"/>
+          </a:bodyPr>
+          <a:lstStyle>
+            <a:lvl1pPr marL="228600" indent="-228600" algn="l" defTabSz="914400" rtl="0" eaLnBrk="1" latinLnBrk="0" hangingPunct="1">
+              <a:lnSpc>
+                <a:spcPct val="90000"/>
+              </a:lnSpc>
+              <a:spcBef>
+                <a:spcPts val="1000"/>
+              </a:spcBef>
+              <a:buFont typeface="Arial" panose="020B0604020202020204" pitchFamily="34" charset="0"/>
+              <a:buChar char="•"/>
+              <a:defRPr sz="2800" kern="1200">
+                <a:solidFill>
+                  <a:schemeClr val="tx1"/>
+                </a:solidFill>
+                <a:latin typeface="+mn-lt"/>
+                <a:ea typeface="+mn-ea"/>
+                <a:cs typeface="+mn-cs"/>
+              </a:defRPr>
+            </a:lvl1pPr>
+            <a:lvl2pPr marL="685800" indent="-228600" algn="l" defTabSz="914400" rtl="0" eaLnBrk="1" latinLnBrk="0" hangingPunct="1">
+              <a:lnSpc>
+                <a:spcPct val="90000"/>
+              </a:lnSpc>
+              <a:spcBef>
+                <a:spcPts val="500"/>
+              </a:spcBef>
+              <a:buFont typeface="Arial" panose="020B0604020202020204" pitchFamily="34" charset="0"/>
+              <a:buChar char="•"/>
+              <a:defRPr sz="2400" kern="1200">
+                <a:solidFill>
+                  <a:schemeClr val="tx1"/>
+                </a:solidFill>
+                <a:latin typeface="+mn-lt"/>
+                <a:ea typeface="+mn-ea"/>
+                <a:cs typeface="+mn-cs"/>
+              </a:defRPr>
+            </a:lvl2pPr>
+            <a:lvl3pPr marL="1143000" indent="-228600" algn="l" defTabSz="914400" rtl="0" eaLnBrk="1" latinLnBrk="0" hangingPunct="1">
+              <a:lnSpc>
+                <a:spcPct val="90000"/>
+              </a:lnSpc>
+              <a:spcBef>
+                <a:spcPts val="500"/>
+              </a:spcBef>
+              <a:buFont typeface="Arial" panose="020B0604020202020204" pitchFamily="34" charset="0"/>
+              <a:buChar char="•"/>
+              <a:defRPr sz="2000" kern="1200">
+                <a:solidFill>
+                  <a:schemeClr val="tx1"/>
+                </a:solidFill>
+                <a:latin typeface="+mn-lt"/>
+                <a:ea typeface="+mn-ea"/>
+                <a:cs typeface="+mn-cs"/>
+              </a:defRPr>
+            </a:lvl3pPr>
+            <a:lvl4pPr marL="1600200" indent="-228600" algn="l" defTabSz="914400" rtl="0" eaLnBrk="1" latinLnBrk="0" hangingPunct="1">
+              <a:lnSpc>
+                <a:spcPct val="90000"/>
+              </a:lnSpc>
+              <a:spcBef>
+                <a:spcPts val="500"/>
+              </a:spcBef>
+              <a:buFont typeface="Arial" panose="020B0604020202020204" pitchFamily="34" charset="0"/>
+              <a:buChar char="•"/>
+              <a:defRPr sz="1800" kern="1200">
+                <a:solidFill>
+                  <a:schemeClr val="tx1"/>
+                </a:solidFill>
+                <a:latin typeface="+mn-lt"/>
+                <a:ea typeface="+mn-ea"/>
+                <a:cs typeface="+mn-cs"/>
+              </a:defRPr>
+            </a:lvl4pPr>
+            <a:lvl5pPr marL="2057400" indent="-228600" algn="l" defTabSz="914400" rtl="0" eaLnBrk="1" latinLnBrk="0" hangingPunct="1">
+              <a:lnSpc>
+                <a:spcPct val="90000"/>
+              </a:lnSpc>
+              <a:spcBef>
+                <a:spcPts val="500"/>
+              </a:spcBef>
+              <a:buFont typeface="Arial" panose="020B0604020202020204" pitchFamily="34" charset="0"/>
+              <a:buChar char="•"/>
+              <a:defRPr sz="1800" kern="1200">
+                <a:solidFill>
+                  <a:schemeClr val="tx1"/>
+                </a:solidFill>
+                <a:latin typeface="+mn-lt"/>
+                <a:ea typeface="+mn-ea"/>
+                <a:cs typeface="+mn-cs"/>
+              </a:defRPr>
+            </a:lvl5pPr>
+            <a:lvl6pPr marL="2514600" indent="-228600" algn="l" defTabSz="914400" rtl="0" eaLnBrk="1" latinLnBrk="0" hangingPunct="1">
+              <a:lnSpc>
+                <a:spcPct val="90000"/>
+              </a:lnSpc>
+              <a:spcBef>
+                <a:spcPts val="500"/>
+              </a:spcBef>
+              <a:buFont typeface="Arial" panose="020B0604020202020204" pitchFamily="34" charset="0"/>
+              <a:buChar char="•"/>
+              <a:defRPr sz="1800" kern="1200">
+                <a:solidFill>
+                  <a:schemeClr val="tx1"/>
+                </a:solidFill>
+                <a:latin typeface="+mn-lt"/>
+                <a:ea typeface="+mn-ea"/>
+                <a:cs typeface="+mn-cs"/>
+              </a:defRPr>
+            </a:lvl6pPr>
+            <a:lvl7pPr marL="2971800" indent="-228600" algn="l" defTabSz="914400" rtl="0" eaLnBrk="1" latinLnBrk="0" hangingPunct="1">
+              <a:lnSpc>
+                <a:spcPct val="90000"/>
+              </a:lnSpc>
+              <a:spcBef>
+                <a:spcPts val="500"/>
+              </a:spcBef>
+              <a:buFont typeface="Arial" panose="020B0604020202020204" pitchFamily="34" charset="0"/>
+              <a:buChar char="•"/>
+              <a:defRPr sz="1800" kern="1200">
+                <a:solidFill>
+                  <a:schemeClr val="tx1"/>
+                </a:solidFill>
+                <a:latin typeface="+mn-lt"/>
+                <a:ea typeface="+mn-ea"/>
+                <a:cs typeface="+mn-cs"/>
+              </a:defRPr>
+            </a:lvl7pPr>
+            <a:lvl8pPr marL="3429000" indent="-228600" algn="l" defTabSz="914400" rtl="0" eaLnBrk="1" latinLnBrk="0" hangingPunct="1">
+              <a:lnSpc>
+                <a:spcPct val="90000"/>
+              </a:lnSpc>
+              <a:spcBef>
+                <a:spcPts val="500"/>
+              </a:spcBef>
+              <a:buFont typeface="Arial" panose="020B0604020202020204" pitchFamily="34" charset="0"/>
+              <a:buChar char="•"/>
+              <a:defRPr sz="1800" kern="1200">
+                <a:solidFill>
+                  <a:schemeClr val="tx1"/>
+                </a:solidFill>
+                <a:latin typeface="+mn-lt"/>
+                <a:ea typeface="+mn-ea"/>
+                <a:cs typeface="+mn-cs"/>
+              </a:defRPr>
+            </a:lvl8pPr>
+            <a:lvl9pPr marL="3886200" indent="-228600" algn="l" defTabSz="914400" rtl="0" eaLnBrk="1" latinLnBrk="0" hangingPunct="1">
+              <a:lnSpc>
+                <a:spcPct val="90000"/>
+              </a:lnSpc>
+              <a:spcBef>
+                <a:spcPts val="500"/>
+              </a:spcBef>
+              <a:buFont typeface="Arial" panose="020B0604020202020204" pitchFamily="34" charset="0"/>
+              <a:buChar char="•"/>
+              <a:defRPr sz="1800" kern="1200">
+                <a:solidFill>
+                  <a:schemeClr val="tx1"/>
+                </a:solidFill>
+                <a:latin typeface="+mn-lt"/>
+                <a:ea typeface="+mn-ea"/>
+                <a:cs typeface="+mn-cs"/>
+              </a:defRPr>
+            </a:lvl9pPr>
+          </a:lstStyle>
           <a:p>
             <a:pPr marL="0" indent="0" algn="ctr">
               <a:buFont typeface="Arial" panose="020B0604020202020204" pitchFamily="34" charset="0"/>
               <a:buNone/>
             </a:pPr>
             <a:r>
-              <a:rPr lang="en-US" dirty="0"/>
-              <a:t>Play soccer on April 1st</a:t>
-            </a:r>
-          </a:p>
-          <a:p>
-            <a:pPr marL="0" indent="0" algn="ctr">
-              <a:buFont typeface="Arial" panose="020B0604020202020204" pitchFamily="34" charset="0"/>
-              <a:buNone/>
-            </a:pPr>
-            <a:r>
-              <a:rPr lang="en-US" dirty="0"/>
-              <a:t>Play Tennis on April 5</a:t>
-            </a:r>
-            <a:r>
-              <a:rPr lang="en-US" baseline="30000" dirty="0"/>
-              <a:t>th</a:t>
-            </a:r>
-            <a:endParaRPr lang="en-US" dirty="0"/>
-          </a:p>
-          <a:p>
-            <a:pPr marL="0" indent="0" algn="ctr">
-              <a:buFont typeface="Arial" panose="020B0604020202020204" pitchFamily="34" charset="0"/>
-              <a:buNone/>
-            </a:pPr>
-            <a:r>
-              <a:rPr lang="en-US" dirty="0"/>
-              <a:t>Go to a Museum on May 1st</a:t>
-            </a:r>
-          </a:p>
-          <a:p>
-            <a:pPr marL="0" indent="0" algn="ctr">
-              <a:buFont typeface="Arial" panose="020B0604020202020204" pitchFamily="34" charset="0"/>
+              <a:rPr lang="en-US" sz="4400" b="1" u="sng" dirty="0"/>
+              <a:t>About</a:t>
+            </a:r>
+          </a:p>
+          <a:p>
+            <a:pPr marL="0" indent="0">
               <a:buNone/>
             </a:pPr>
             <a:endParaRPr lang="en-US" dirty="0"/>
           </a:p>
-        </p:txBody>
-      </p:sp>
-      <p:sp>
-        <p:nvSpPr>
-          <p:cNvPr id="10" name="Content Placeholder 2">
-            <a:extLst>
-              <a:ext uri="{FF2B5EF4-FFF2-40B4-BE49-F238E27FC236}">
-                <a16:creationId xmlns:a16="http://schemas.microsoft.com/office/drawing/2014/main" id="{855051F8-B34A-4BCE-9661-4EF3AD5D5D6C}"/>
+          <a:p>
+            <a:pPr marL="0" indent="0">
+              <a:buNone/>
+            </a:pPr>
+            <a:r>
+              <a:rPr lang="en-US" dirty="0"/>
+              <a:t>Lorem ipsum dolor sit </a:t>
+            </a:r>
+            <a:r>
+              <a:rPr lang="en-US" dirty="0" err="1"/>
+              <a:t>amet</a:t>
+            </a:r>
+            <a:r>
+              <a:rPr lang="en-US" dirty="0"/>
+              <a:t>, </a:t>
+            </a:r>
+            <a:r>
+              <a:rPr lang="en-US" dirty="0" err="1"/>
+              <a:t>consectetur</a:t>
+            </a:r>
+            <a:r>
+              <a:rPr lang="en-US" dirty="0"/>
+              <a:t> </a:t>
+            </a:r>
+            <a:r>
+              <a:rPr lang="en-US" dirty="0" err="1"/>
+              <a:t>adipiscing</a:t>
+            </a:r>
+            <a:r>
+              <a:rPr lang="en-US" dirty="0"/>
+              <a:t> </a:t>
+            </a:r>
+            <a:r>
+              <a:rPr lang="en-US" dirty="0" err="1"/>
+              <a:t>elit</a:t>
+            </a:r>
+            <a:r>
+              <a:rPr lang="en-US" dirty="0"/>
+              <a:t>, sed do </a:t>
+            </a:r>
+            <a:r>
+              <a:rPr lang="en-US" dirty="0" err="1"/>
+              <a:t>eiusmod</a:t>
+            </a:r>
+            <a:r>
+              <a:rPr lang="en-US" dirty="0"/>
+              <a:t> </a:t>
+            </a:r>
+            <a:r>
+              <a:rPr lang="en-US" dirty="0" err="1"/>
+              <a:t>tempor</a:t>
+            </a:r>
+            <a:r>
+              <a:rPr lang="en-US" dirty="0"/>
+              <a:t> </a:t>
+            </a:r>
+            <a:r>
+              <a:rPr lang="en-US" dirty="0" err="1"/>
+              <a:t>incididunt</a:t>
+            </a:r>
+            <a:r>
+              <a:rPr lang="en-US" dirty="0"/>
+              <a:t> </a:t>
+            </a:r>
+            <a:r>
+              <a:rPr lang="en-US" dirty="0" err="1"/>
+              <a:t>ut</a:t>
+            </a:r>
+            <a:r>
+              <a:rPr lang="en-US" dirty="0"/>
+              <a:t> </a:t>
+            </a:r>
+            <a:r>
+              <a:rPr lang="en-US" dirty="0" err="1"/>
+              <a:t>labore</a:t>
+            </a:r>
+            <a:r>
+              <a:rPr lang="en-US" dirty="0"/>
+              <a:t> et dolore magna </a:t>
+            </a:r>
+            <a:r>
+              <a:rPr lang="en-US" dirty="0" err="1"/>
+              <a:t>aliqua</a:t>
+            </a:r>
+            <a:r>
+              <a:rPr lang="en-US" dirty="0"/>
+              <a:t>. Ut </a:t>
+            </a:r>
+            <a:r>
+              <a:rPr lang="en-US" dirty="0" err="1"/>
+              <a:t>enim</a:t>
+            </a:r>
+            <a:r>
+              <a:rPr lang="en-US" dirty="0"/>
+              <a:t> ad minim </a:t>
+            </a:r>
+            <a:r>
+              <a:rPr lang="en-US" dirty="0" err="1"/>
+              <a:t>veniam</a:t>
+            </a:r>
+            <a:r>
+              <a:rPr lang="en-US" dirty="0"/>
+              <a:t>, </a:t>
+            </a:r>
+            <a:r>
+              <a:rPr lang="en-US" dirty="0" err="1"/>
+              <a:t>quis</a:t>
+            </a:r>
+            <a:r>
+              <a:rPr lang="en-US" dirty="0"/>
+              <a:t> </a:t>
+            </a:r>
+            <a:r>
+              <a:rPr lang="en-US" dirty="0" err="1"/>
+              <a:t>nostrud</a:t>
+            </a:r>
+            <a:r>
+              <a:rPr lang="en-US" dirty="0"/>
+              <a:t> exercitation </a:t>
+            </a:r>
+            <a:r>
+              <a:rPr lang="en-US" dirty="0" err="1"/>
+              <a:t>ullamco</a:t>
+            </a:r>
+            <a:r>
+              <a:rPr lang="en-US" dirty="0"/>
+              <a:t> </a:t>
+            </a:r>
+            <a:r>
+              <a:rPr lang="en-US" dirty="0" err="1"/>
+              <a:t>laboris</a:t>
+            </a:r>
+            <a:r>
+              <a:rPr lang="en-US" dirty="0"/>
+              <a:t> nisi </a:t>
+            </a:r>
+            <a:r>
+              <a:rPr lang="en-US" dirty="0" err="1"/>
+              <a:t>ut</a:t>
+            </a:r>
+            <a:r>
+              <a:rPr lang="en-US" dirty="0"/>
+              <a:t> </a:t>
+            </a:r>
+            <a:r>
+              <a:rPr lang="en-US" dirty="0" err="1"/>
+              <a:t>aliquip</a:t>
+            </a:r>
+            <a:r>
+              <a:rPr lang="en-US" dirty="0"/>
+              <a:t> ex </a:t>
+            </a:r>
+            <a:r>
+              <a:rPr lang="en-US" dirty="0" err="1"/>
+              <a:t>ea</a:t>
+            </a:r>
+            <a:r>
+              <a:rPr lang="en-US" dirty="0"/>
+              <a:t> </a:t>
+            </a:r>
+            <a:r>
+              <a:rPr lang="en-US" dirty="0" err="1"/>
+              <a:t>commodo</a:t>
+            </a:r>
+            <a:r>
+              <a:rPr lang="en-US" dirty="0"/>
+              <a:t>.</a:t>
+            </a:r>
+          </a:p>
+        </p:txBody>
+      </p:sp>
+      <p:sp>
+        <p:nvSpPr>
+          <p:cNvPr id="15" name="Content Placeholder 2">
+            <a:extLst>
+              <a:ext uri="{FF2B5EF4-FFF2-40B4-BE49-F238E27FC236}">
+                <a16:creationId xmlns:a16="http://schemas.microsoft.com/office/drawing/2014/main" id="{8F3828E5-0973-46E3-95D5-E5E5EB71F53D}"/>
               </a:ext>
             </a:extLst>
           </p:cNvPr>
@@ -6390,8 +6748,8 @@
         </p:nvSpPr>
         <p:spPr>
           <a:xfrm>
-            <a:off x="8068715" y="2924629"/>
-            <a:ext cx="1771973" cy="2929466"/>
+            <a:off x="279418" y="2183979"/>
+            <a:ext cx="1752581" cy="539869"/>
           </a:xfrm>
           <a:prstGeom prst="rect">
             <a:avLst/>
@@ -6570,60 +6928,21 @@
           </a:lstStyle>
           <a:p>
             <a:pPr marL="0" indent="0" algn="ctr">
-              <a:buFont typeface="Arial" panose="020B0604020202020204" pitchFamily="34" charset="0"/>
               <a:buNone/>
             </a:pPr>
             <a:r>
-              <a:rPr lang="en-US" u="sng" dirty="0" err="1"/>
-              <a:t>Hangrrs</a:t>
-            </a:r>
-            <a:endParaRPr lang="en-US" u="sng" dirty="0"/>
-          </a:p>
-          <a:p>
-            <a:pPr marL="0" indent="0" algn="ctr">
-              <a:buFont typeface="Arial" panose="020B0604020202020204" pitchFamily="34" charset="0"/>
-              <a:buNone/>
-            </a:pPr>
-            <a:endParaRPr lang="en-US" u="sng" dirty="0"/>
-          </a:p>
-          <a:p>
-            <a:pPr marL="0" indent="0" algn="ctr">
-              <a:buFont typeface="Arial" panose="020B0604020202020204" pitchFamily="34" charset="0"/>
-              <a:buNone/>
-            </a:pPr>
-            <a:r>
               <a:rPr lang="en-US" dirty="0"/>
-              <a:t>Ike, Chace</a:t>
-            </a:r>
-          </a:p>
-          <a:p>
-            <a:pPr marL="0" indent="0" algn="ctr">
-              <a:buFont typeface="Arial" panose="020B0604020202020204" pitchFamily="34" charset="0"/>
-              <a:buNone/>
-            </a:pPr>
-            <a:r>
-              <a:rPr lang="en-US" dirty="0"/>
-              <a:t>Wilson</a:t>
-            </a:r>
-          </a:p>
-          <a:p>
-            <a:pPr marL="0" indent="0" algn="ctr">
-              <a:buFont typeface="Arial" panose="020B0604020202020204" pitchFamily="34" charset="0"/>
-              <a:buNone/>
-            </a:pPr>
-            <a:r>
-              <a:rPr lang="en-US" dirty="0"/>
-              <a:t>Ike </a:t>
-            </a:r>
-          </a:p>
-        </p:txBody>
-      </p:sp>
-      <p:sp>
-        <p:nvSpPr>
-          <p:cNvPr id="12" name="Content Placeholder 2">
-            <a:extLst>
-              <a:ext uri="{FF2B5EF4-FFF2-40B4-BE49-F238E27FC236}">
-                <a16:creationId xmlns:a16="http://schemas.microsoft.com/office/drawing/2014/main" id="{964ACE52-3BFE-4EA0-BBE5-CBD3AF161FB5}"/>
+              <a:t>Kiki</a:t>
+            </a:r>
+          </a:p>
+        </p:txBody>
+      </p:sp>
+      <p:sp>
+        <p:nvSpPr>
+          <p:cNvPr id="16" name="Content Placeholder 2">
+            <a:extLst>
+              <a:ext uri="{FF2B5EF4-FFF2-40B4-BE49-F238E27FC236}">
+                <a16:creationId xmlns:a16="http://schemas.microsoft.com/office/drawing/2014/main" id="{1EA18FA2-02FC-430D-A8C9-C651F19C3688}"/>
               </a:ext>
             </a:extLst>
           </p:cNvPr>
@@ -6634,8 +6953,8 @@
         </p:nvSpPr>
         <p:spPr>
           <a:xfrm>
-            <a:off x="2846029" y="1401845"/>
-            <a:ext cx="6994658" cy="1172022"/>
+            <a:off x="289091" y="2847392"/>
+            <a:ext cx="1752581" cy="379444"/>
           </a:xfrm>
           <a:prstGeom prst="rect">
             <a:avLst/>
@@ -6828,818 +7147,6 @@
               <a:buNone/>
             </a:pPr>
             <a:r>
-              <a:rPr lang="en-US" dirty="0"/>
-              <a:t>Popular Events Near You / Results</a:t>
-            </a:r>
-          </a:p>
-          <a:p>
-            <a:pPr marL="0" indent="0" algn="ctr">
-              <a:buFont typeface="Arial" panose="020B0604020202020204" pitchFamily="34" charset="0"/>
-              <a:buNone/>
-            </a:pPr>
-            <a:r>
-              <a:rPr lang="en-US" sz="1600" dirty="0"/>
-              <a:t>Play Tennis  *  Have coffee  *  Go to Museum</a:t>
-            </a:r>
-          </a:p>
-        </p:txBody>
-      </p:sp>
-      <p:sp>
-        <p:nvSpPr>
-          <p:cNvPr id="14" name="Content Placeholder 2">
-            <a:extLst>
-              <a:ext uri="{FF2B5EF4-FFF2-40B4-BE49-F238E27FC236}">
-                <a16:creationId xmlns:a16="http://schemas.microsoft.com/office/drawing/2014/main" id="{967AEAFD-F0ED-44C5-B33A-225130C1A793}"/>
-              </a:ext>
-            </a:extLst>
-          </p:cNvPr>
-          <p:cNvSpPr txBox="1">
-            <a:spLocks/>
-          </p:cNvSpPr>
-          <p:nvPr/>
-        </p:nvSpPr>
-        <p:spPr>
-          <a:xfrm>
-            <a:off x="289091" y="3350381"/>
-            <a:ext cx="1752581" cy="3314094"/>
-          </a:xfrm>
-          <a:prstGeom prst="rect">
-            <a:avLst/>
-          </a:prstGeom>
-          <a:solidFill>
-            <a:schemeClr val="accent1"/>
-          </a:solidFill>
-        </p:spPr>
-        <p:txBody>
-          <a:bodyPr vert="horz" lIns="91440" tIns="45720" rIns="91440" bIns="45720" rtlCol="0">
-            <a:normAutofit fontScale="55000" lnSpcReduction="20000"/>
-          </a:bodyPr>
-          <a:lstStyle>
-            <a:lvl1pPr marL="228600" indent="-228600" algn="l" defTabSz="914400" rtl="0" eaLnBrk="1" latinLnBrk="0" hangingPunct="1">
-              <a:lnSpc>
-                <a:spcPct val="90000"/>
-              </a:lnSpc>
-              <a:spcBef>
-                <a:spcPts val="1000"/>
-              </a:spcBef>
-              <a:buFont typeface="Arial" panose="020B0604020202020204" pitchFamily="34" charset="0"/>
-              <a:buChar char="•"/>
-              <a:defRPr sz="2800" kern="1200">
-                <a:solidFill>
-                  <a:schemeClr val="tx1"/>
-                </a:solidFill>
-                <a:latin typeface="+mn-lt"/>
-                <a:ea typeface="+mn-ea"/>
-                <a:cs typeface="+mn-cs"/>
-              </a:defRPr>
-            </a:lvl1pPr>
-            <a:lvl2pPr marL="685800" indent="-228600" algn="l" defTabSz="914400" rtl="0" eaLnBrk="1" latinLnBrk="0" hangingPunct="1">
-              <a:lnSpc>
-                <a:spcPct val="90000"/>
-              </a:lnSpc>
-              <a:spcBef>
-                <a:spcPts val="500"/>
-              </a:spcBef>
-              <a:buFont typeface="Arial" panose="020B0604020202020204" pitchFamily="34" charset="0"/>
-              <a:buChar char="•"/>
-              <a:defRPr sz="2400" kern="1200">
-                <a:solidFill>
-                  <a:schemeClr val="tx1"/>
-                </a:solidFill>
-                <a:latin typeface="+mn-lt"/>
-                <a:ea typeface="+mn-ea"/>
-                <a:cs typeface="+mn-cs"/>
-              </a:defRPr>
-            </a:lvl2pPr>
-            <a:lvl3pPr marL="1143000" indent="-228600" algn="l" defTabSz="914400" rtl="0" eaLnBrk="1" latinLnBrk="0" hangingPunct="1">
-              <a:lnSpc>
-                <a:spcPct val="90000"/>
-              </a:lnSpc>
-              <a:spcBef>
-                <a:spcPts val="500"/>
-              </a:spcBef>
-              <a:buFont typeface="Arial" panose="020B0604020202020204" pitchFamily="34" charset="0"/>
-              <a:buChar char="•"/>
-              <a:defRPr sz="2000" kern="1200">
-                <a:solidFill>
-                  <a:schemeClr val="tx1"/>
-                </a:solidFill>
-                <a:latin typeface="+mn-lt"/>
-                <a:ea typeface="+mn-ea"/>
-                <a:cs typeface="+mn-cs"/>
-              </a:defRPr>
-            </a:lvl3pPr>
-            <a:lvl4pPr marL="1600200" indent="-228600" algn="l" defTabSz="914400" rtl="0" eaLnBrk="1" latinLnBrk="0" hangingPunct="1">
-              <a:lnSpc>
-                <a:spcPct val="90000"/>
-              </a:lnSpc>
-              <a:spcBef>
-                <a:spcPts val="500"/>
-              </a:spcBef>
-              <a:buFont typeface="Arial" panose="020B0604020202020204" pitchFamily="34" charset="0"/>
-              <a:buChar char="•"/>
-              <a:defRPr sz="1800" kern="1200">
-                <a:solidFill>
-                  <a:schemeClr val="tx1"/>
-                </a:solidFill>
-                <a:latin typeface="+mn-lt"/>
-                <a:ea typeface="+mn-ea"/>
-                <a:cs typeface="+mn-cs"/>
-              </a:defRPr>
-            </a:lvl4pPr>
-            <a:lvl5pPr marL="2057400" indent="-228600" algn="l" defTabSz="914400" rtl="0" eaLnBrk="1" latinLnBrk="0" hangingPunct="1">
-              <a:lnSpc>
-                <a:spcPct val="90000"/>
-              </a:lnSpc>
-              <a:spcBef>
-                <a:spcPts val="500"/>
-              </a:spcBef>
-              <a:buFont typeface="Arial" panose="020B0604020202020204" pitchFamily="34" charset="0"/>
-              <a:buChar char="•"/>
-              <a:defRPr sz="1800" kern="1200">
-                <a:solidFill>
-                  <a:schemeClr val="tx1"/>
-                </a:solidFill>
-                <a:latin typeface="+mn-lt"/>
-                <a:ea typeface="+mn-ea"/>
-                <a:cs typeface="+mn-cs"/>
-              </a:defRPr>
-            </a:lvl5pPr>
-            <a:lvl6pPr marL="2514600" indent="-228600" algn="l" defTabSz="914400" rtl="0" eaLnBrk="1" latinLnBrk="0" hangingPunct="1">
-              <a:lnSpc>
-                <a:spcPct val="90000"/>
-              </a:lnSpc>
-              <a:spcBef>
-                <a:spcPts val="500"/>
-              </a:spcBef>
-              <a:buFont typeface="Arial" panose="020B0604020202020204" pitchFamily="34" charset="0"/>
-              <a:buChar char="•"/>
-              <a:defRPr sz="1800" kern="1200">
-                <a:solidFill>
-                  <a:schemeClr val="tx1"/>
-                </a:solidFill>
-                <a:latin typeface="+mn-lt"/>
-                <a:ea typeface="+mn-ea"/>
-                <a:cs typeface="+mn-cs"/>
-              </a:defRPr>
-            </a:lvl6pPr>
-            <a:lvl7pPr marL="2971800" indent="-228600" algn="l" defTabSz="914400" rtl="0" eaLnBrk="1" latinLnBrk="0" hangingPunct="1">
-              <a:lnSpc>
-                <a:spcPct val="90000"/>
-              </a:lnSpc>
-              <a:spcBef>
-                <a:spcPts val="500"/>
-              </a:spcBef>
-              <a:buFont typeface="Arial" panose="020B0604020202020204" pitchFamily="34" charset="0"/>
-              <a:buChar char="•"/>
-              <a:defRPr sz="1800" kern="1200">
-                <a:solidFill>
-                  <a:schemeClr val="tx1"/>
-                </a:solidFill>
-                <a:latin typeface="+mn-lt"/>
-                <a:ea typeface="+mn-ea"/>
-                <a:cs typeface="+mn-cs"/>
-              </a:defRPr>
-            </a:lvl7pPr>
-            <a:lvl8pPr marL="3429000" indent="-228600" algn="l" defTabSz="914400" rtl="0" eaLnBrk="1" latinLnBrk="0" hangingPunct="1">
-              <a:lnSpc>
-                <a:spcPct val="90000"/>
-              </a:lnSpc>
-              <a:spcBef>
-                <a:spcPts val="500"/>
-              </a:spcBef>
-              <a:buFont typeface="Arial" panose="020B0604020202020204" pitchFamily="34" charset="0"/>
-              <a:buChar char="•"/>
-              <a:defRPr sz="1800" kern="1200">
-                <a:solidFill>
-                  <a:schemeClr val="tx1"/>
-                </a:solidFill>
-                <a:latin typeface="+mn-lt"/>
-                <a:ea typeface="+mn-ea"/>
-                <a:cs typeface="+mn-cs"/>
-              </a:defRPr>
-            </a:lvl8pPr>
-            <a:lvl9pPr marL="3886200" indent="-228600" algn="l" defTabSz="914400" rtl="0" eaLnBrk="1" latinLnBrk="0" hangingPunct="1">
-              <a:lnSpc>
-                <a:spcPct val="90000"/>
-              </a:lnSpc>
-              <a:spcBef>
-                <a:spcPts val="500"/>
-              </a:spcBef>
-              <a:buFont typeface="Arial" panose="020B0604020202020204" pitchFamily="34" charset="0"/>
-              <a:buChar char="•"/>
-              <a:defRPr sz="1800" kern="1200">
-                <a:solidFill>
-                  <a:schemeClr val="tx1"/>
-                </a:solidFill>
-                <a:latin typeface="+mn-lt"/>
-                <a:ea typeface="+mn-ea"/>
-                <a:cs typeface="+mn-cs"/>
-              </a:defRPr>
-            </a:lvl9pPr>
-          </a:lstStyle>
-          <a:p>
-            <a:pPr marL="0" indent="0" algn="ctr">
-              <a:buFont typeface="Arial" panose="020B0604020202020204" pitchFamily="34" charset="0"/>
-              <a:buNone/>
-            </a:pPr>
-            <a:r>
-              <a:rPr lang="en-US" sz="4400" b="1" u="sng" dirty="0"/>
-              <a:t>About</a:t>
-            </a:r>
-          </a:p>
-          <a:p>
-            <a:pPr marL="0" indent="0">
-              <a:buNone/>
-            </a:pPr>
-            <a:endParaRPr lang="en-US" dirty="0"/>
-          </a:p>
-          <a:p>
-            <a:pPr marL="0" indent="0">
-              <a:buNone/>
-            </a:pPr>
-            <a:r>
-              <a:rPr lang="en-US" dirty="0"/>
-              <a:t>Lorem ipsum dolor sit </a:t>
-            </a:r>
-            <a:r>
-              <a:rPr lang="en-US" dirty="0" err="1"/>
-              <a:t>amet</a:t>
-            </a:r>
-            <a:r>
-              <a:rPr lang="en-US" dirty="0"/>
-              <a:t>, </a:t>
-            </a:r>
-            <a:r>
-              <a:rPr lang="en-US" dirty="0" err="1"/>
-              <a:t>consectetur</a:t>
-            </a:r>
-            <a:r>
-              <a:rPr lang="en-US" dirty="0"/>
-              <a:t> </a:t>
-            </a:r>
-            <a:r>
-              <a:rPr lang="en-US" dirty="0" err="1"/>
-              <a:t>adipiscing</a:t>
-            </a:r>
-            <a:r>
-              <a:rPr lang="en-US" dirty="0"/>
-              <a:t> </a:t>
-            </a:r>
-            <a:r>
-              <a:rPr lang="en-US" dirty="0" err="1"/>
-              <a:t>elit</a:t>
-            </a:r>
-            <a:r>
-              <a:rPr lang="en-US" dirty="0"/>
-              <a:t>, sed do </a:t>
-            </a:r>
-            <a:r>
-              <a:rPr lang="en-US" dirty="0" err="1"/>
-              <a:t>eiusmod</a:t>
-            </a:r>
-            <a:r>
-              <a:rPr lang="en-US" dirty="0"/>
-              <a:t> </a:t>
-            </a:r>
-            <a:r>
-              <a:rPr lang="en-US" dirty="0" err="1"/>
-              <a:t>tempor</a:t>
-            </a:r>
-            <a:r>
-              <a:rPr lang="en-US" dirty="0"/>
-              <a:t> </a:t>
-            </a:r>
-            <a:r>
-              <a:rPr lang="en-US" dirty="0" err="1"/>
-              <a:t>incididunt</a:t>
-            </a:r>
-            <a:r>
-              <a:rPr lang="en-US" dirty="0"/>
-              <a:t> </a:t>
-            </a:r>
-            <a:r>
-              <a:rPr lang="en-US" dirty="0" err="1"/>
-              <a:t>ut</a:t>
-            </a:r>
-            <a:r>
-              <a:rPr lang="en-US" dirty="0"/>
-              <a:t> </a:t>
-            </a:r>
-            <a:r>
-              <a:rPr lang="en-US" dirty="0" err="1"/>
-              <a:t>labore</a:t>
-            </a:r>
-            <a:r>
-              <a:rPr lang="en-US" dirty="0"/>
-              <a:t> et dolore magna </a:t>
-            </a:r>
-            <a:r>
-              <a:rPr lang="en-US" dirty="0" err="1"/>
-              <a:t>aliqua</a:t>
-            </a:r>
-            <a:r>
-              <a:rPr lang="en-US" dirty="0"/>
-              <a:t>. Ut </a:t>
-            </a:r>
-            <a:r>
-              <a:rPr lang="en-US" dirty="0" err="1"/>
-              <a:t>enim</a:t>
-            </a:r>
-            <a:r>
-              <a:rPr lang="en-US" dirty="0"/>
-              <a:t> ad minim </a:t>
-            </a:r>
-            <a:r>
-              <a:rPr lang="en-US" dirty="0" err="1"/>
-              <a:t>veniam</a:t>
-            </a:r>
-            <a:r>
-              <a:rPr lang="en-US" dirty="0"/>
-              <a:t>, </a:t>
-            </a:r>
-            <a:r>
-              <a:rPr lang="en-US" dirty="0" err="1"/>
-              <a:t>quis</a:t>
-            </a:r>
-            <a:r>
-              <a:rPr lang="en-US" dirty="0"/>
-              <a:t> </a:t>
-            </a:r>
-            <a:r>
-              <a:rPr lang="en-US" dirty="0" err="1"/>
-              <a:t>nostrud</a:t>
-            </a:r>
-            <a:r>
-              <a:rPr lang="en-US" dirty="0"/>
-              <a:t> exercitation </a:t>
-            </a:r>
-            <a:r>
-              <a:rPr lang="en-US" dirty="0" err="1"/>
-              <a:t>ullamco</a:t>
-            </a:r>
-            <a:r>
-              <a:rPr lang="en-US" dirty="0"/>
-              <a:t> </a:t>
-            </a:r>
-            <a:r>
-              <a:rPr lang="en-US" dirty="0" err="1"/>
-              <a:t>laboris</a:t>
-            </a:r>
-            <a:r>
-              <a:rPr lang="en-US" dirty="0"/>
-              <a:t> nisi </a:t>
-            </a:r>
-            <a:r>
-              <a:rPr lang="en-US" dirty="0" err="1"/>
-              <a:t>ut</a:t>
-            </a:r>
-            <a:r>
-              <a:rPr lang="en-US" dirty="0"/>
-              <a:t> </a:t>
-            </a:r>
-            <a:r>
-              <a:rPr lang="en-US" dirty="0" err="1"/>
-              <a:t>aliquip</a:t>
-            </a:r>
-            <a:r>
-              <a:rPr lang="en-US" dirty="0"/>
-              <a:t> ex </a:t>
-            </a:r>
-            <a:r>
-              <a:rPr lang="en-US" dirty="0" err="1"/>
-              <a:t>ea</a:t>
-            </a:r>
-            <a:r>
-              <a:rPr lang="en-US" dirty="0"/>
-              <a:t> </a:t>
-            </a:r>
-            <a:r>
-              <a:rPr lang="en-US" dirty="0" err="1"/>
-              <a:t>commodo</a:t>
-            </a:r>
-            <a:r>
-              <a:rPr lang="en-US" dirty="0"/>
-              <a:t>.</a:t>
-            </a:r>
-          </a:p>
-        </p:txBody>
-      </p:sp>
-      <p:sp>
-        <p:nvSpPr>
-          <p:cNvPr id="15" name="Content Placeholder 2">
-            <a:extLst>
-              <a:ext uri="{FF2B5EF4-FFF2-40B4-BE49-F238E27FC236}">
-                <a16:creationId xmlns:a16="http://schemas.microsoft.com/office/drawing/2014/main" id="{8F3828E5-0973-46E3-95D5-E5E5EB71F53D}"/>
-              </a:ext>
-            </a:extLst>
-          </p:cNvPr>
-          <p:cNvSpPr txBox="1">
-            <a:spLocks/>
-          </p:cNvSpPr>
-          <p:nvPr/>
-        </p:nvSpPr>
-        <p:spPr>
-          <a:xfrm>
-            <a:off x="279418" y="2183979"/>
-            <a:ext cx="1752581" cy="539869"/>
-          </a:xfrm>
-          <a:prstGeom prst="rect">
-            <a:avLst/>
-          </a:prstGeom>
-          <a:solidFill>
-            <a:schemeClr val="accent1"/>
-          </a:solidFill>
-        </p:spPr>
-        <p:txBody>
-          <a:bodyPr vert="horz" lIns="91440" tIns="45720" rIns="91440" bIns="45720" rtlCol="0">
-            <a:normAutofit/>
-          </a:bodyPr>
-          <a:lstStyle>
-            <a:lvl1pPr marL="228600" indent="-228600" algn="l" defTabSz="914400" rtl="0" eaLnBrk="1" latinLnBrk="0" hangingPunct="1">
-              <a:lnSpc>
-                <a:spcPct val="90000"/>
-              </a:lnSpc>
-              <a:spcBef>
-                <a:spcPts val="1000"/>
-              </a:spcBef>
-              <a:buFont typeface="Arial" panose="020B0604020202020204" pitchFamily="34" charset="0"/>
-              <a:buChar char="•"/>
-              <a:defRPr sz="2800" kern="1200">
-                <a:solidFill>
-                  <a:schemeClr val="tx1"/>
-                </a:solidFill>
-                <a:latin typeface="+mn-lt"/>
-                <a:ea typeface="+mn-ea"/>
-                <a:cs typeface="+mn-cs"/>
-              </a:defRPr>
-            </a:lvl1pPr>
-            <a:lvl2pPr marL="685800" indent="-228600" algn="l" defTabSz="914400" rtl="0" eaLnBrk="1" latinLnBrk="0" hangingPunct="1">
-              <a:lnSpc>
-                <a:spcPct val="90000"/>
-              </a:lnSpc>
-              <a:spcBef>
-                <a:spcPts val="500"/>
-              </a:spcBef>
-              <a:buFont typeface="Arial" panose="020B0604020202020204" pitchFamily="34" charset="0"/>
-              <a:buChar char="•"/>
-              <a:defRPr sz="2400" kern="1200">
-                <a:solidFill>
-                  <a:schemeClr val="tx1"/>
-                </a:solidFill>
-                <a:latin typeface="+mn-lt"/>
-                <a:ea typeface="+mn-ea"/>
-                <a:cs typeface="+mn-cs"/>
-              </a:defRPr>
-            </a:lvl2pPr>
-            <a:lvl3pPr marL="1143000" indent="-228600" algn="l" defTabSz="914400" rtl="0" eaLnBrk="1" latinLnBrk="0" hangingPunct="1">
-              <a:lnSpc>
-                <a:spcPct val="90000"/>
-              </a:lnSpc>
-              <a:spcBef>
-                <a:spcPts val="500"/>
-              </a:spcBef>
-              <a:buFont typeface="Arial" panose="020B0604020202020204" pitchFamily="34" charset="0"/>
-              <a:buChar char="•"/>
-              <a:defRPr sz="2000" kern="1200">
-                <a:solidFill>
-                  <a:schemeClr val="tx1"/>
-                </a:solidFill>
-                <a:latin typeface="+mn-lt"/>
-                <a:ea typeface="+mn-ea"/>
-                <a:cs typeface="+mn-cs"/>
-              </a:defRPr>
-            </a:lvl3pPr>
-            <a:lvl4pPr marL="1600200" indent="-228600" algn="l" defTabSz="914400" rtl="0" eaLnBrk="1" latinLnBrk="0" hangingPunct="1">
-              <a:lnSpc>
-                <a:spcPct val="90000"/>
-              </a:lnSpc>
-              <a:spcBef>
-                <a:spcPts val="500"/>
-              </a:spcBef>
-              <a:buFont typeface="Arial" panose="020B0604020202020204" pitchFamily="34" charset="0"/>
-              <a:buChar char="•"/>
-              <a:defRPr sz="1800" kern="1200">
-                <a:solidFill>
-                  <a:schemeClr val="tx1"/>
-                </a:solidFill>
-                <a:latin typeface="+mn-lt"/>
-                <a:ea typeface="+mn-ea"/>
-                <a:cs typeface="+mn-cs"/>
-              </a:defRPr>
-            </a:lvl4pPr>
-            <a:lvl5pPr marL="2057400" indent="-228600" algn="l" defTabSz="914400" rtl="0" eaLnBrk="1" latinLnBrk="0" hangingPunct="1">
-              <a:lnSpc>
-                <a:spcPct val="90000"/>
-              </a:lnSpc>
-              <a:spcBef>
-                <a:spcPts val="500"/>
-              </a:spcBef>
-              <a:buFont typeface="Arial" panose="020B0604020202020204" pitchFamily="34" charset="0"/>
-              <a:buChar char="•"/>
-              <a:defRPr sz="1800" kern="1200">
-                <a:solidFill>
-                  <a:schemeClr val="tx1"/>
-                </a:solidFill>
-                <a:latin typeface="+mn-lt"/>
-                <a:ea typeface="+mn-ea"/>
-                <a:cs typeface="+mn-cs"/>
-              </a:defRPr>
-            </a:lvl5pPr>
-            <a:lvl6pPr marL="2514600" indent="-228600" algn="l" defTabSz="914400" rtl="0" eaLnBrk="1" latinLnBrk="0" hangingPunct="1">
-              <a:lnSpc>
-                <a:spcPct val="90000"/>
-              </a:lnSpc>
-              <a:spcBef>
-                <a:spcPts val="500"/>
-              </a:spcBef>
-              <a:buFont typeface="Arial" panose="020B0604020202020204" pitchFamily="34" charset="0"/>
-              <a:buChar char="•"/>
-              <a:defRPr sz="1800" kern="1200">
-                <a:solidFill>
-                  <a:schemeClr val="tx1"/>
-                </a:solidFill>
-                <a:latin typeface="+mn-lt"/>
-                <a:ea typeface="+mn-ea"/>
-                <a:cs typeface="+mn-cs"/>
-              </a:defRPr>
-            </a:lvl6pPr>
-            <a:lvl7pPr marL="2971800" indent="-228600" algn="l" defTabSz="914400" rtl="0" eaLnBrk="1" latinLnBrk="0" hangingPunct="1">
-              <a:lnSpc>
-                <a:spcPct val="90000"/>
-              </a:lnSpc>
-              <a:spcBef>
-                <a:spcPts val="500"/>
-              </a:spcBef>
-              <a:buFont typeface="Arial" panose="020B0604020202020204" pitchFamily="34" charset="0"/>
-              <a:buChar char="•"/>
-              <a:defRPr sz="1800" kern="1200">
-                <a:solidFill>
-                  <a:schemeClr val="tx1"/>
-                </a:solidFill>
-                <a:latin typeface="+mn-lt"/>
-                <a:ea typeface="+mn-ea"/>
-                <a:cs typeface="+mn-cs"/>
-              </a:defRPr>
-            </a:lvl7pPr>
-            <a:lvl8pPr marL="3429000" indent="-228600" algn="l" defTabSz="914400" rtl="0" eaLnBrk="1" latinLnBrk="0" hangingPunct="1">
-              <a:lnSpc>
-                <a:spcPct val="90000"/>
-              </a:lnSpc>
-              <a:spcBef>
-                <a:spcPts val="500"/>
-              </a:spcBef>
-              <a:buFont typeface="Arial" panose="020B0604020202020204" pitchFamily="34" charset="0"/>
-              <a:buChar char="•"/>
-              <a:defRPr sz="1800" kern="1200">
-                <a:solidFill>
-                  <a:schemeClr val="tx1"/>
-                </a:solidFill>
-                <a:latin typeface="+mn-lt"/>
-                <a:ea typeface="+mn-ea"/>
-                <a:cs typeface="+mn-cs"/>
-              </a:defRPr>
-            </a:lvl8pPr>
-            <a:lvl9pPr marL="3886200" indent="-228600" algn="l" defTabSz="914400" rtl="0" eaLnBrk="1" latinLnBrk="0" hangingPunct="1">
-              <a:lnSpc>
-                <a:spcPct val="90000"/>
-              </a:lnSpc>
-              <a:spcBef>
-                <a:spcPts val="500"/>
-              </a:spcBef>
-              <a:buFont typeface="Arial" panose="020B0604020202020204" pitchFamily="34" charset="0"/>
-              <a:buChar char="•"/>
-              <a:defRPr sz="1800" kern="1200">
-                <a:solidFill>
-                  <a:schemeClr val="tx1"/>
-                </a:solidFill>
-                <a:latin typeface="+mn-lt"/>
-                <a:ea typeface="+mn-ea"/>
-                <a:cs typeface="+mn-cs"/>
-              </a:defRPr>
-            </a:lvl9pPr>
-          </a:lstStyle>
-          <a:p>
-            <a:pPr marL="0" indent="0" algn="ctr">
-              <a:buNone/>
-            </a:pPr>
-            <a:r>
-              <a:rPr lang="en-US" dirty="0"/>
-              <a:t>Kiki</a:t>
-            </a:r>
-          </a:p>
-        </p:txBody>
-      </p:sp>
-      <p:sp>
-        <p:nvSpPr>
-          <p:cNvPr id="16" name="Content Placeholder 2">
-            <a:extLst>
-              <a:ext uri="{FF2B5EF4-FFF2-40B4-BE49-F238E27FC236}">
-                <a16:creationId xmlns:a16="http://schemas.microsoft.com/office/drawing/2014/main" id="{1EA18FA2-02FC-430D-A8C9-C651F19C3688}"/>
-              </a:ext>
-            </a:extLst>
-          </p:cNvPr>
-          <p:cNvSpPr txBox="1">
-            <a:spLocks/>
-          </p:cNvSpPr>
-          <p:nvPr/>
-        </p:nvSpPr>
-        <p:spPr>
-          <a:xfrm>
-            <a:off x="289091" y="2847392"/>
-            <a:ext cx="1752581" cy="379444"/>
-          </a:xfrm>
-          <a:prstGeom prst="rect">
-            <a:avLst/>
-          </a:prstGeom>
-          <a:solidFill>
-            <a:schemeClr val="accent3">
-              <a:lumMod val="40000"/>
-              <a:lumOff val="60000"/>
-            </a:schemeClr>
-          </a:solidFill>
-          <a:ln>
-            <a:solidFill>
-              <a:schemeClr val="accent1">
-                <a:lumMod val="75000"/>
-              </a:schemeClr>
-            </a:solidFill>
-          </a:ln>
-        </p:spPr>
-        <p:txBody>
-          <a:bodyPr vert="horz" lIns="91440" tIns="45720" rIns="91440" bIns="45720" rtlCol="0">
-            <a:normAutofit/>
-          </a:bodyPr>
-          <a:lstStyle>
-            <a:lvl1pPr marL="228600" indent="-228600" algn="l" defTabSz="914400" rtl="0" eaLnBrk="1" latinLnBrk="0" hangingPunct="1">
-              <a:lnSpc>
-                <a:spcPct val="90000"/>
-              </a:lnSpc>
-              <a:spcBef>
-                <a:spcPts val="1000"/>
-              </a:spcBef>
-              <a:buFont typeface="Arial" panose="020B0604020202020204" pitchFamily="34" charset="0"/>
-              <a:buChar char="•"/>
-              <a:defRPr sz="2800" kern="1200">
-                <a:solidFill>
-                  <a:schemeClr val="tx1"/>
-                </a:solidFill>
-                <a:latin typeface="+mn-lt"/>
-                <a:ea typeface="+mn-ea"/>
-                <a:cs typeface="+mn-cs"/>
-              </a:defRPr>
-            </a:lvl1pPr>
-            <a:lvl2pPr marL="685800" indent="-228600" algn="l" defTabSz="914400" rtl="0" eaLnBrk="1" latinLnBrk="0" hangingPunct="1">
-              <a:lnSpc>
-                <a:spcPct val="90000"/>
-              </a:lnSpc>
-              <a:spcBef>
-                <a:spcPts val="500"/>
-              </a:spcBef>
-              <a:buFont typeface="Arial" panose="020B0604020202020204" pitchFamily="34" charset="0"/>
-              <a:buChar char="•"/>
-              <a:defRPr sz="2400" kern="1200">
-                <a:solidFill>
-                  <a:schemeClr val="tx1"/>
-                </a:solidFill>
-                <a:latin typeface="+mn-lt"/>
-                <a:ea typeface="+mn-ea"/>
-                <a:cs typeface="+mn-cs"/>
-              </a:defRPr>
-            </a:lvl2pPr>
-            <a:lvl3pPr marL="1143000" indent="-228600" algn="l" defTabSz="914400" rtl="0" eaLnBrk="1" latinLnBrk="0" hangingPunct="1">
-              <a:lnSpc>
-                <a:spcPct val="90000"/>
-              </a:lnSpc>
-              <a:spcBef>
-                <a:spcPts val="500"/>
-              </a:spcBef>
-              <a:buFont typeface="Arial" panose="020B0604020202020204" pitchFamily="34" charset="0"/>
-              <a:buChar char="•"/>
-              <a:defRPr sz="2000" kern="1200">
-                <a:solidFill>
-                  <a:schemeClr val="tx1"/>
-                </a:solidFill>
-                <a:latin typeface="+mn-lt"/>
-                <a:ea typeface="+mn-ea"/>
-                <a:cs typeface="+mn-cs"/>
-              </a:defRPr>
-            </a:lvl3pPr>
-            <a:lvl4pPr marL="1600200" indent="-228600" algn="l" defTabSz="914400" rtl="0" eaLnBrk="1" latinLnBrk="0" hangingPunct="1">
-              <a:lnSpc>
-                <a:spcPct val="90000"/>
-              </a:lnSpc>
-              <a:spcBef>
-                <a:spcPts val="500"/>
-              </a:spcBef>
-              <a:buFont typeface="Arial" panose="020B0604020202020204" pitchFamily="34" charset="0"/>
-              <a:buChar char="•"/>
-              <a:defRPr sz="1800" kern="1200">
-                <a:solidFill>
-                  <a:schemeClr val="tx1"/>
-                </a:solidFill>
-                <a:latin typeface="+mn-lt"/>
-                <a:ea typeface="+mn-ea"/>
-                <a:cs typeface="+mn-cs"/>
-              </a:defRPr>
-            </a:lvl4pPr>
-            <a:lvl5pPr marL="2057400" indent="-228600" algn="l" defTabSz="914400" rtl="0" eaLnBrk="1" latinLnBrk="0" hangingPunct="1">
-              <a:lnSpc>
-                <a:spcPct val="90000"/>
-              </a:lnSpc>
-              <a:spcBef>
-                <a:spcPts val="500"/>
-              </a:spcBef>
-              <a:buFont typeface="Arial" panose="020B0604020202020204" pitchFamily="34" charset="0"/>
-              <a:buChar char="•"/>
-              <a:defRPr sz="1800" kern="1200">
-                <a:solidFill>
-                  <a:schemeClr val="tx1"/>
-                </a:solidFill>
-                <a:latin typeface="+mn-lt"/>
-                <a:ea typeface="+mn-ea"/>
-                <a:cs typeface="+mn-cs"/>
-              </a:defRPr>
-            </a:lvl5pPr>
-            <a:lvl6pPr marL="2514600" indent="-228600" algn="l" defTabSz="914400" rtl="0" eaLnBrk="1" latinLnBrk="0" hangingPunct="1">
-              <a:lnSpc>
-                <a:spcPct val="90000"/>
-              </a:lnSpc>
-              <a:spcBef>
-                <a:spcPts val="500"/>
-              </a:spcBef>
-              <a:buFont typeface="Arial" panose="020B0604020202020204" pitchFamily="34" charset="0"/>
-              <a:buChar char="•"/>
-              <a:defRPr sz="1800" kern="1200">
-                <a:solidFill>
-                  <a:schemeClr val="tx1"/>
-                </a:solidFill>
-                <a:latin typeface="+mn-lt"/>
-                <a:ea typeface="+mn-ea"/>
-                <a:cs typeface="+mn-cs"/>
-              </a:defRPr>
-            </a:lvl6pPr>
-            <a:lvl7pPr marL="2971800" indent="-228600" algn="l" defTabSz="914400" rtl="0" eaLnBrk="1" latinLnBrk="0" hangingPunct="1">
-              <a:lnSpc>
-                <a:spcPct val="90000"/>
-              </a:lnSpc>
-              <a:spcBef>
-                <a:spcPts val="500"/>
-              </a:spcBef>
-              <a:buFont typeface="Arial" panose="020B0604020202020204" pitchFamily="34" charset="0"/>
-              <a:buChar char="•"/>
-              <a:defRPr sz="1800" kern="1200">
-                <a:solidFill>
-                  <a:schemeClr val="tx1"/>
-                </a:solidFill>
-                <a:latin typeface="+mn-lt"/>
-                <a:ea typeface="+mn-ea"/>
-                <a:cs typeface="+mn-cs"/>
-              </a:defRPr>
-            </a:lvl7pPr>
-            <a:lvl8pPr marL="3429000" indent="-228600" algn="l" defTabSz="914400" rtl="0" eaLnBrk="1" latinLnBrk="0" hangingPunct="1">
-              <a:lnSpc>
-                <a:spcPct val="90000"/>
-              </a:lnSpc>
-              <a:spcBef>
-                <a:spcPts val="500"/>
-              </a:spcBef>
-              <a:buFont typeface="Arial" panose="020B0604020202020204" pitchFamily="34" charset="0"/>
-              <a:buChar char="•"/>
-              <a:defRPr sz="1800" kern="1200">
-                <a:solidFill>
-                  <a:schemeClr val="tx1"/>
-                </a:solidFill>
-                <a:latin typeface="+mn-lt"/>
-                <a:ea typeface="+mn-ea"/>
-                <a:cs typeface="+mn-cs"/>
-              </a:defRPr>
-            </a:lvl8pPr>
-            <a:lvl9pPr marL="3886200" indent="-228600" algn="l" defTabSz="914400" rtl="0" eaLnBrk="1" latinLnBrk="0" hangingPunct="1">
-              <a:lnSpc>
-                <a:spcPct val="90000"/>
-              </a:lnSpc>
-              <a:spcBef>
-                <a:spcPts val="500"/>
-              </a:spcBef>
-              <a:buFont typeface="Arial" panose="020B0604020202020204" pitchFamily="34" charset="0"/>
-              <a:buChar char="•"/>
-              <a:defRPr sz="1800" kern="1200">
-                <a:solidFill>
-                  <a:schemeClr val="tx1"/>
-                </a:solidFill>
-                <a:latin typeface="+mn-lt"/>
-                <a:ea typeface="+mn-ea"/>
-                <a:cs typeface="+mn-cs"/>
-              </a:defRPr>
-            </a:lvl9pPr>
-          </a:lstStyle>
-          <a:p>
-            <a:pPr marL="0" indent="0" algn="ctr">
-              <a:buFont typeface="Arial" panose="020B0604020202020204" pitchFamily="34" charset="0"/>
-              <a:buNone/>
-            </a:pPr>
-            <a:r>
               <a:rPr lang="en-US" sz="2000" b="1" dirty="0"/>
               <a:t>Message Kiki</a:t>
             </a:r>
@@ -7650,1678 +7157,6 @@
     <p:extLst>
       <p:ext uri="{BB962C8B-B14F-4D97-AF65-F5344CB8AC3E}">
         <p14:creationId xmlns:p14="http://schemas.microsoft.com/office/powerpoint/2010/main" val="2581418057"/>
-      </p:ext>
-    </p:extLst>
-  </p:cSld>
-  <p:clrMapOvr>
-    <a:masterClrMapping/>
-  </p:clrMapOvr>
-</p:sld>
-</file>
-
-<file path=ppt/slides/slide8.xml><?xml version="1.0" encoding="utf-8"?>
-<p:sld xmlns:a="http://schemas.openxmlformats.org/drawingml/2006/main" xmlns:r="http://schemas.openxmlformats.org/officeDocument/2006/relationships" xmlns:p="http://schemas.openxmlformats.org/presentationml/2006/main">
-  <p:cSld>
-    <p:spTree>
-      <p:nvGrpSpPr>
-        <p:cNvPr id="1" name=""/>
-        <p:cNvGrpSpPr/>
-        <p:nvPr/>
-      </p:nvGrpSpPr>
-      <p:grpSpPr>
-        <a:xfrm>
-          <a:off x="0" y="0"/>
-          <a:ext cx="0" cy="0"/>
-          <a:chOff x="0" y="0"/>
-          <a:chExt cx="0" cy="0"/>
-        </a:xfrm>
-      </p:grpSpPr>
-      <p:sp>
-        <p:nvSpPr>
-          <p:cNvPr id="3" name="Content Placeholder 2">
-            <a:extLst>
-              <a:ext uri="{FF2B5EF4-FFF2-40B4-BE49-F238E27FC236}">
-                <a16:creationId xmlns:a16="http://schemas.microsoft.com/office/drawing/2014/main" id="{285AC9F9-9C27-4D2C-880D-269BA992FE23}"/>
-              </a:ext>
-            </a:extLst>
-          </p:cNvPr>
-          <p:cNvSpPr>
-            <a:spLocks noGrp="1"/>
-          </p:cNvSpPr>
-          <p:nvPr>
-            <p:ph idx="1"/>
-          </p:nvPr>
-        </p:nvSpPr>
-        <p:spPr>
-          <a:xfrm>
-            <a:off x="2846029" y="535650"/>
-            <a:ext cx="6994658" cy="588518"/>
-          </a:xfrm>
-          <a:solidFill>
-            <a:schemeClr val="accent3">
-              <a:lumMod val="40000"/>
-              <a:lumOff val="60000"/>
-            </a:schemeClr>
-          </a:solidFill>
-          <a:ln>
-            <a:solidFill>
-              <a:schemeClr val="accent1">
-                <a:lumMod val="75000"/>
-              </a:schemeClr>
-            </a:solidFill>
-          </a:ln>
-        </p:spPr>
-        <p:txBody>
-          <a:bodyPr>
-            <a:normAutofit/>
-          </a:bodyPr>
-          <a:lstStyle/>
-          <a:p>
-            <a:pPr marL="0" indent="0" algn="ctr">
-              <a:buNone/>
-            </a:pPr>
-            <a:r>
-              <a:rPr lang="en-US" dirty="0"/>
-              <a:t>Search: Type Your Hang Out</a:t>
-            </a:r>
-          </a:p>
-        </p:txBody>
-      </p:sp>
-      <p:sp>
-        <p:nvSpPr>
-          <p:cNvPr id="4" name="Oval 3">
-            <a:extLst>
-              <a:ext uri="{FF2B5EF4-FFF2-40B4-BE49-F238E27FC236}">
-                <a16:creationId xmlns:a16="http://schemas.microsoft.com/office/drawing/2014/main" id="{D35BAA18-EF98-42F5-A8F2-639C78A446A5}"/>
-              </a:ext>
-            </a:extLst>
-          </p:cNvPr>
-          <p:cNvSpPr/>
-          <p:nvPr/>
-        </p:nvSpPr>
-        <p:spPr>
-          <a:xfrm>
-            <a:off x="403583" y="409936"/>
-            <a:ext cx="1414818" cy="1428465"/>
-          </a:xfrm>
-          <a:prstGeom prst="ellipse">
-            <a:avLst/>
-          </a:prstGeom>
-        </p:spPr>
-        <p:style>
-          <a:lnRef idx="2">
-            <a:schemeClr val="accent1">
-              <a:shade val="50000"/>
-            </a:schemeClr>
-          </a:lnRef>
-          <a:fillRef idx="1">
-            <a:schemeClr val="accent1"/>
-          </a:fillRef>
-          <a:effectRef idx="0">
-            <a:schemeClr val="accent1"/>
-          </a:effectRef>
-          <a:fontRef idx="minor">
-            <a:schemeClr val="lt1"/>
-          </a:fontRef>
-        </p:style>
-        <p:txBody>
-          <a:bodyPr rtlCol="0" anchor="ctr"/>
-          <a:lstStyle/>
-          <a:p>
-            <a:pPr algn="ctr"/>
-            <a:endParaRPr lang="en-US"/>
-          </a:p>
-        </p:txBody>
-      </p:sp>
-      <p:sp>
-        <p:nvSpPr>
-          <p:cNvPr id="6" name="Rectangle 5">
-            <a:extLst>
-              <a:ext uri="{FF2B5EF4-FFF2-40B4-BE49-F238E27FC236}">
-                <a16:creationId xmlns:a16="http://schemas.microsoft.com/office/drawing/2014/main" id="{66E5A009-5410-4DF7-A074-65BB07B79FE1}"/>
-              </a:ext>
-            </a:extLst>
-          </p:cNvPr>
-          <p:cNvSpPr/>
-          <p:nvPr/>
-        </p:nvSpPr>
-        <p:spPr>
-          <a:xfrm>
-            <a:off x="552698" y="755514"/>
-            <a:ext cx="1116589" cy="646331"/>
-          </a:xfrm>
-          <a:prstGeom prst="rect">
-            <a:avLst/>
-          </a:prstGeom>
-        </p:spPr>
-        <p:txBody>
-          <a:bodyPr wrap="square">
-            <a:spAutoFit/>
-          </a:bodyPr>
-          <a:lstStyle/>
-          <a:p>
-            <a:pPr algn="ctr"/>
-            <a:r>
-              <a:rPr lang="en-US" dirty="0"/>
-              <a:t>Profile Picture</a:t>
-            </a:r>
-          </a:p>
-        </p:txBody>
-      </p:sp>
-      <p:pic>
-        <p:nvPicPr>
-          <p:cNvPr id="7" name="Picture 6" descr="A close up of a cable&#10;&#10;Description automatically generated">
-            <a:extLst>
-              <a:ext uri="{FF2B5EF4-FFF2-40B4-BE49-F238E27FC236}">
-                <a16:creationId xmlns:a16="http://schemas.microsoft.com/office/drawing/2014/main" id="{ED084E3A-4BB7-4D97-BD71-7DC45AC783B5}"/>
-              </a:ext>
-            </a:extLst>
-          </p:cNvPr>
-          <p:cNvPicPr>
-            <a:picLocks noChangeAspect="1"/>
-          </p:cNvPicPr>
-          <p:nvPr/>
-        </p:nvPicPr>
-        <p:blipFill>
-          <a:blip r:embed="rId2">
-            <a:extLst>
-              <a:ext uri="{28A0092B-C50C-407E-A947-70E740481C1C}">
-                <a14:useLocalDpi xmlns:a14="http://schemas.microsoft.com/office/drawing/2010/main" val="0"/>
-              </a:ext>
-            </a:extLst>
-          </a:blip>
-          <a:stretch>
-            <a:fillRect/>
-          </a:stretch>
-        </p:blipFill>
-        <p:spPr>
-          <a:xfrm>
-            <a:off x="10130249" y="301908"/>
-            <a:ext cx="1536493" cy="1536493"/>
-          </a:xfrm>
-          <a:prstGeom prst="rect">
-            <a:avLst/>
-          </a:prstGeom>
-        </p:spPr>
-      </p:pic>
-      <p:sp>
-        <p:nvSpPr>
-          <p:cNvPr id="8" name="Content Placeholder 2">
-            <a:extLst>
-              <a:ext uri="{FF2B5EF4-FFF2-40B4-BE49-F238E27FC236}">
-                <a16:creationId xmlns:a16="http://schemas.microsoft.com/office/drawing/2014/main" id="{14DF7D47-4B44-4AE7-A56B-D33545498025}"/>
-              </a:ext>
-            </a:extLst>
-          </p:cNvPr>
-          <p:cNvSpPr txBox="1">
-            <a:spLocks/>
-          </p:cNvSpPr>
-          <p:nvPr/>
-        </p:nvSpPr>
-        <p:spPr>
-          <a:xfrm>
-            <a:off x="2846029" y="2924629"/>
-            <a:ext cx="5020714" cy="2929466"/>
-          </a:xfrm>
-          <a:prstGeom prst="rect">
-            <a:avLst/>
-          </a:prstGeom>
-          <a:solidFill>
-            <a:schemeClr val="accent1"/>
-          </a:solidFill>
-        </p:spPr>
-        <p:txBody>
-          <a:bodyPr vert="horz" lIns="91440" tIns="45720" rIns="91440" bIns="45720" rtlCol="0">
-            <a:normAutofit/>
-          </a:bodyPr>
-          <a:lstStyle>
-            <a:lvl1pPr marL="228600" indent="-228600" algn="l" defTabSz="914400" rtl="0" eaLnBrk="1" latinLnBrk="0" hangingPunct="1">
-              <a:lnSpc>
-                <a:spcPct val="90000"/>
-              </a:lnSpc>
-              <a:spcBef>
-                <a:spcPts val="1000"/>
-              </a:spcBef>
-              <a:buFont typeface="Arial" panose="020B0604020202020204" pitchFamily="34" charset="0"/>
-              <a:buChar char="•"/>
-              <a:defRPr sz="2800" kern="1200">
-                <a:solidFill>
-                  <a:schemeClr val="tx1"/>
-                </a:solidFill>
-                <a:latin typeface="+mn-lt"/>
-                <a:ea typeface="+mn-ea"/>
-                <a:cs typeface="+mn-cs"/>
-              </a:defRPr>
-            </a:lvl1pPr>
-            <a:lvl2pPr marL="685800" indent="-228600" algn="l" defTabSz="914400" rtl="0" eaLnBrk="1" latinLnBrk="0" hangingPunct="1">
-              <a:lnSpc>
-                <a:spcPct val="90000"/>
-              </a:lnSpc>
-              <a:spcBef>
-                <a:spcPts val="500"/>
-              </a:spcBef>
-              <a:buFont typeface="Arial" panose="020B0604020202020204" pitchFamily="34" charset="0"/>
-              <a:buChar char="•"/>
-              <a:defRPr sz="2400" kern="1200">
-                <a:solidFill>
-                  <a:schemeClr val="tx1"/>
-                </a:solidFill>
-                <a:latin typeface="+mn-lt"/>
-                <a:ea typeface="+mn-ea"/>
-                <a:cs typeface="+mn-cs"/>
-              </a:defRPr>
-            </a:lvl2pPr>
-            <a:lvl3pPr marL="1143000" indent="-228600" algn="l" defTabSz="914400" rtl="0" eaLnBrk="1" latinLnBrk="0" hangingPunct="1">
-              <a:lnSpc>
-                <a:spcPct val="90000"/>
-              </a:lnSpc>
-              <a:spcBef>
-                <a:spcPts val="500"/>
-              </a:spcBef>
-              <a:buFont typeface="Arial" panose="020B0604020202020204" pitchFamily="34" charset="0"/>
-              <a:buChar char="•"/>
-              <a:defRPr sz="2000" kern="1200">
-                <a:solidFill>
-                  <a:schemeClr val="tx1"/>
-                </a:solidFill>
-                <a:latin typeface="+mn-lt"/>
-                <a:ea typeface="+mn-ea"/>
-                <a:cs typeface="+mn-cs"/>
-              </a:defRPr>
-            </a:lvl3pPr>
-            <a:lvl4pPr marL="1600200" indent="-228600" algn="l" defTabSz="914400" rtl="0" eaLnBrk="1" latinLnBrk="0" hangingPunct="1">
-              <a:lnSpc>
-                <a:spcPct val="90000"/>
-              </a:lnSpc>
-              <a:spcBef>
-                <a:spcPts val="500"/>
-              </a:spcBef>
-              <a:buFont typeface="Arial" panose="020B0604020202020204" pitchFamily="34" charset="0"/>
-              <a:buChar char="•"/>
-              <a:defRPr sz="1800" kern="1200">
-                <a:solidFill>
-                  <a:schemeClr val="tx1"/>
-                </a:solidFill>
-                <a:latin typeface="+mn-lt"/>
-                <a:ea typeface="+mn-ea"/>
-                <a:cs typeface="+mn-cs"/>
-              </a:defRPr>
-            </a:lvl4pPr>
-            <a:lvl5pPr marL="2057400" indent="-228600" algn="l" defTabSz="914400" rtl="0" eaLnBrk="1" latinLnBrk="0" hangingPunct="1">
-              <a:lnSpc>
-                <a:spcPct val="90000"/>
-              </a:lnSpc>
-              <a:spcBef>
-                <a:spcPts val="500"/>
-              </a:spcBef>
-              <a:buFont typeface="Arial" panose="020B0604020202020204" pitchFamily="34" charset="0"/>
-              <a:buChar char="•"/>
-              <a:defRPr sz="1800" kern="1200">
-                <a:solidFill>
-                  <a:schemeClr val="tx1"/>
-                </a:solidFill>
-                <a:latin typeface="+mn-lt"/>
-                <a:ea typeface="+mn-ea"/>
-                <a:cs typeface="+mn-cs"/>
-              </a:defRPr>
-            </a:lvl5pPr>
-            <a:lvl6pPr marL="2514600" indent="-228600" algn="l" defTabSz="914400" rtl="0" eaLnBrk="1" latinLnBrk="0" hangingPunct="1">
-              <a:lnSpc>
-                <a:spcPct val="90000"/>
-              </a:lnSpc>
-              <a:spcBef>
-                <a:spcPts val="500"/>
-              </a:spcBef>
-              <a:buFont typeface="Arial" panose="020B0604020202020204" pitchFamily="34" charset="0"/>
-              <a:buChar char="•"/>
-              <a:defRPr sz="1800" kern="1200">
-                <a:solidFill>
-                  <a:schemeClr val="tx1"/>
-                </a:solidFill>
-                <a:latin typeface="+mn-lt"/>
-                <a:ea typeface="+mn-ea"/>
-                <a:cs typeface="+mn-cs"/>
-              </a:defRPr>
-            </a:lvl6pPr>
-            <a:lvl7pPr marL="2971800" indent="-228600" algn="l" defTabSz="914400" rtl="0" eaLnBrk="1" latinLnBrk="0" hangingPunct="1">
-              <a:lnSpc>
-                <a:spcPct val="90000"/>
-              </a:lnSpc>
-              <a:spcBef>
-                <a:spcPts val="500"/>
-              </a:spcBef>
-              <a:buFont typeface="Arial" panose="020B0604020202020204" pitchFamily="34" charset="0"/>
-              <a:buChar char="•"/>
-              <a:defRPr sz="1800" kern="1200">
-                <a:solidFill>
-                  <a:schemeClr val="tx1"/>
-                </a:solidFill>
-                <a:latin typeface="+mn-lt"/>
-                <a:ea typeface="+mn-ea"/>
-                <a:cs typeface="+mn-cs"/>
-              </a:defRPr>
-            </a:lvl7pPr>
-            <a:lvl8pPr marL="3429000" indent="-228600" algn="l" defTabSz="914400" rtl="0" eaLnBrk="1" latinLnBrk="0" hangingPunct="1">
-              <a:lnSpc>
-                <a:spcPct val="90000"/>
-              </a:lnSpc>
-              <a:spcBef>
-                <a:spcPts val="500"/>
-              </a:spcBef>
-              <a:buFont typeface="Arial" panose="020B0604020202020204" pitchFamily="34" charset="0"/>
-              <a:buChar char="•"/>
-              <a:defRPr sz="1800" kern="1200">
-                <a:solidFill>
-                  <a:schemeClr val="tx1"/>
-                </a:solidFill>
-                <a:latin typeface="+mn-lt"/>
-                <a:ea typeface="+mn-ea"/>
-                <a:cs typeface="+mn-cs"/>
-              </a:defRPr>
-            </a:lvl8pPr>
-            <a:lvl9pPr marL="3886200" indent="-228600" algn="l" defTabSz="914400" rtl="0" eaLnBrk="1" latinLnBrk="0" hangingPunct="1">
-              <a:lnSpc>
-                <a:spcPct val="90000"/>
-              </a:lnSpc>
-              <a:spcBef>
-                <a:spcPts val="500"/>
-              </a:spcBef>
-              <a:buFont typeface="Arial" panose="020B0604020202020204" pitchFamily="34" charset="0"/>
-              <a:buChar char="•"/>
-              <a:defRPr sz="1800" kern="1200">
-                <a:solidFill>
-                  <a:schemeClr val="tx1"/>
-                </a:solidFill>
-                <a:latin typeface="+mn-lt"/>
-                <a:ea typeface="+mn-ea"/>
-                <a:cs typeface="+mn-cs"/>
-              </a:defRPr>
-            </a:lvl9pPr>
-          </a:lstStyle>
-          <a:p>
-            <a:pPr marL="0" indent="0" algn="ctr">
-              <a:buFont typeface="Arial" panose="020B0604020202020204" pitchFamily="34" charset="0"/>
-              <a:buNone/>
-            </a:pPr>
-            <a:r>
-              <a:rPr lang="en-US" u="sng" dirty="0"/>
-              <a:t>Your personal hang outs:</a:t>
-            </a:r>
-          </a:p>
-          <a:p>
-            <a:pPr marL="0" indent="0" algn="ctr">
-              <a:buFont typeface="Arial" panose="020B0604020202020204" pitchFamily="34" charset="0"/>
-              <a:buNone/>
-            </a:pPr>
-            <a:endParaRPr lang="en-US" u="sng" dirty="0"/>
-          </a:p>
-          <a:p>
-            <a:pPr marL="0" indent="0" algn="ctr">
-              <a:buFont typeface="Arial" panose="020B0604020202020204" pitchFamily="34" charset="0"/>
-              <a:buNone/>
-            </a:pPr>
-            <a:r>
-              <a:rPr lang="en-US" dirty="0"/>
-              <a:t>Play soccer on April 1st</a:t>
-            </a:r>
-          </a:p>
-        </p:txBody>
-      </p:sp>
-      <p:sp>
-        <p:nvSpPr>
-          <p:cNvPr id="9" name="Content Placeholder 2">
-            <a:extLst>
-              <a:ext uri="{FF2B5EF4-FFF2-40B4-BE49-F238E27FC236}">
-                <a16:creationId xmlns:a16="http://schemas.microsoft.com/office/drawing/2014/main" id="{F3215173-021C-4438-A1E1-AE8342D19E2F}"/>
-              </a:ext>
-            </a:extLst>
-          </p:cNvPr>
-          <p:cNvSpPr txBox="1">
-            <a:spLocks/>
-          </p:cNvSpPr>
-          <p:nvPr/>
-        </p:nvSpPr>
-        <p:spPr>
-          <a:xfrm>
-            <a:off x="289091" y="3350381"/>
-            <a:ext cx="1752581" cy="3314094"/>
-          </a:xfrm>
-          <a:prstGeom prst="rect">
-            <a:avLst/>
-          </a:prstGeom>
-          <a:solidFill>
-            <a:schemeClr val="accent1"/>
-          </a:solidFill>
-        </p:spPr>
-        <p:txBody>
-          <a:bodyPr vert="horz" lIns="91440" tIns="45720" rIns="91440" bIns="45720" rtlCol="0">
-            <a:normAutofit fontScale="55000" lnSpcReduction="20000"/>
-          </a:bodyPr>
-          <a:lstStyle>
-            <a:lvl1pPr marL="228600" indent="-228600" algn="l" defTabSz="914400" rtl="0" eaLnBrk="1" latinLnBrk="0" hangingPunct="1">
-              <a:lnSpc>
-                <a:spcPct val="90000"/>
-              </a:lnSpc>
-              <a:spcBef>
-                <a:spcPts val="1000"/>
-              </a:spcBef>
-              <a:buFont typeface="Arial" panose="020B0604020202020204" pitchFamily="34" charset="0"/>
-              <a:buChar char="•"/>
-              <a:defRPr sz="2800" kern="1200">
-                <a:solidFill>
-                  <a:schemeClr val="tx1"/>
-                </a:solidFill>
-                <a:latin typeface="+mn-lt"/>
-                <a:ea typeface="+mn-ea"/>
-                <a:cs typeface="+mn-cs"/>
-              </a:defRPr>
-            </a:lvl1pPr>
-            <a:lvl2pPr marL="685800" indent="-228600" algn="l" defTabSz="914400" rtl="0" eaLnBrk="1" latinLnBrk="0" hangingPunct="1">
-              <a:lnSpc>
-                <a:spcPct val="90000"/>
-              </a:lnSpc>
-              <a:spcBef>
-                <a:spcPts val="500"/>
-              </a:spcBef>
-              <a:buFont typeface="Arial" panose="020B0604020202020204" pitchFamily="34" charset="0"/>
-              <a:buChar char="•"/>
-              <a:defRPr sz="2400" kern="1200">
-                <a:solidFill>
-                  <a:schemeClr val="tx1"/>
-                </a:solidFill>
-                <a:latin typeface="+mn-lt"/>
-                <a:ea typeface="+mn-ea"/>
-                <a:cs typeface="+mn-cs"/>
-              </a:defRPr>
-            </a:lvl2pPr>
-            <a:lvl3pPr marL="1143000" indent="-228600" algn="l" defTabSz="914400" rtl="0" eaLnBrk="1" latinLnBrk="0" hangingPunct="1">
-              <a:lnSpc>
-                <a:spcPct val="90000"/>
-              </a:lnSpc>
-              <a:spcBef>
-                <a:spcPts val="500"/>
-              </a:spcBef>
-              <a:buFont typeface="Arial" panose="020B0604020202020204" pitchFamily="34" charset="0"/>
-              <a:buChar char="•"/>
-              <a:defRPr sz="2000" kern="1200">
-                <a:solidFill>
-                  <a:schemeClr val="tx1"/>
-                </a:solidFill>
-                <a:latin typeface="+mn-lt"/>
-                <a:ea typeface="+mn-ea"/>
-                <a:cs typeface="+mn-cs"/>
-              </a:defRPr>
-            </a:lvl3pPr>
-            <a:lvl4pPr marL="1600200" indent="-228600" algn="l" defTabSz="914400" rtl="0" eaLnBrk="1" latinLnBrk="0" hangingPunct="1">
-              <a:lnSpc>
-                <a:spcPct val="90000"/>
-              </a:lnSpc>
-              <a:spcBef>
-                <a:spcPts val="500"/>
-              </a:spcBef>
-              <a:buFont typeface="Arial" panose="020B0604020202020204" pitchFamily="34" charset="0"/>
-              <a:buChar char="•"/>
-              <a:defRPr sz="1800" kern="1200">
-                <a:solidFill>
-                  <a:schemeClr val="tx1"/>
-                </a:solidFill>
-                <a:latin typeface="+mn-lt"/>
-                <a:ea typeface="+mn-ea"/>
-                <a:cs typeface="+mn-cs"/>
-              </a:defRPr>
-            </a:lvl4pPr>
-            <a:lvl5pPr marL="2057400" indent="-228600" algn="l" defTabSz="914400" rtl="0" eaLnBrk="1" latinLnBrk="0" hangingPunct="1">
-              <a:lnSpc>
-                <a:spcPct val="90000"/>
-              </a:lnSpc>
-              <a:spcBef>
-                <a:spcPts val="500"/>
-              </a:spcBef>
-              <a:buFont typeface="Arial" panose="020B0604020202020204" pitchFamily="34" charset="0"/>
-              <a:buChar char="•"/>
-              <a:defRPr sz="1800" kern="1200">
-                <a:solidFill>
-                  <a:schemeClr val="tx1"/>
-                </a:solidFill>
-                <a:latin typeface="+mn-lt"/>
-                <a:ea typeface="+mn-ea"/>
-                <a:cs typeface="+mn-cs"/>
-              </a:defRPr>
-            </a:lvl5pPr>
-            <a:lvl6pPr marL="2514600" indent="-228600" algn="l" defTabSz="914400" rtl="0" eaLnBrk="1" latinLnBrk="0" hangingPunct="1">
-              <a:lnSpc>
-                <a:spcPct val="90000"/>
-              </a:lnSpc>
-              <a:spcBef>
-                <a:spcPts val="500"/>
-              </a:spcBef>
-              <a:buFont typeface="Arial" panose="020B0604020202020204" pitchFamily="34" charset="0"/>
-              <a:buChar char="•"/>
-              <a:defRPr sz="1800" kern="1200">
-                <a:solidFill>
-                  <a:schemeClr val="tx1"/>
-                </a:solidFill>
-                <a:latin typeface="+mn-lt"/>
-                <a:ea typeface="+mn-ea"/>
-                <a:cs typeface="+mn-cs"/>
-              </a:defRPr>
-            </a:lvl6pPr>
-            <a:lvl7pPr marL="2971800" indent="-228600" algn="l" defTabSz="914400" rtl="0" eaLnBrk="1" latinLnBrk="0" hangingPunct="1">
-              <a:lnSpc>
-                <a:spcPct val="90000"/>
-              </a:lnSpc>
-              <a:spcBef>
-                <a:spcPts val="500"/>
-              </a:spcBef>
-              <a:buFont typeface="Arial" panose="020B0604020202020204" pitchFamily="34" charset="0"/>
-              <a:buChar char="•"/>
-              <a:defRPr sz="1800" kern="1200">
-                <a:solidFill>
-                  <a:schemeClr val="tx1"/>
-                </a:solidFill>
-                <a:latin typeface="+mn-lt"/>
-                <a:ea typeface="+mn-ea"/>
-                <a:cs typeface="+mn-cs"/>
-              </a:defRPr>
-            </a:lvl7pPr>
-            <a:lvl8pPr marL="3429000" indent="-228600" algn="l" defTabSz="914400" rtl="0" eaLnBrk="1" latinLnBrk="0" hangingPunct="1">
-              <a:lnSpc>
-                <a:spcPct val="90000"/>
-              </a:lnSpc>
-              <a:spcBef>
-                <a:spcPts val="500"/>
-              </a:spcBef>
-              <a:buFont typeface="Arial" panose="020B0604020202020204" pitchFamily="34" charset="0"/>
-              <a:buChar char="•"/>
-              <a:defRPr sz="1800" kern="1200">
-                <a:solidFill>
-                  <a:schemeClr val="tx1"/>
-                </a:solidFill>
-                <a:latin typeface="+mn-lt"/>
-                <a:ea typeface="+mn-ea"/>
-                <a:cs typeface="+mn-cs"/>
-              </a:defRPr>
-            </a:lvl8pPr>
-            <a:lvl9pPr marL="3886200" indent="-228600" algn="l" defTabSz="914400" rtl="0" eaLnBrk="1" latinLnBrk="0" hangingPunct="1">
-              <a:lnSpc>
-                <a:spcPct val="90000"/>
-              </a:lnSpc>
-              <a:spcBef>
-                <a:spcPts val="500"/>
-              </a:spcBef>
-              <a:buFont typeface="Arial" panose="020B0604020202020204" pitchFamily="34" charset="0"/>
-              <a:buChar char="•"/>
-              <a:defRPr sz="1800" kern="1200">
-                <a:solidFill>
-                  <a:schemeClr val="tx1"/>
-                </a:solidFill>
-                <a:latin typeface="+mn-lt"/>
-                <a:ea typeface="+mn-ea"/>
-                <a:cs typeface="+mn-cs"/>
-              </a:defRPr>
-            </a:lvl9pPr>
-          </a:lstStyle>
-          <a:p>
-            <a:pPr marL="0" indent="0" algn="ctr">
-              <a:buFont typeface="Arial" panose="020B0604020202020204" pitchFamily="34" charset="0"/>
-              <a:buNone/>
-            </a:pPr>
-            <a:r>
-              <a:rPr lang="en-US" sz="4400" b="1" u="sng" dirty="0"/>
-              <a:t>About</a:t>
-            </a:r>
-          </a:p>
-          <a:p>
-            <a:pPr marL="0" indent="0">
-              <a:buNone/>
-            </a:pPr>
-            <a:endParaRPr lang="en-US" dirty="0"/>
-          </a:p>
-          <a:p>
-            <a:pPr marL="0" indent="0">
-              <a:buNone/>
-            </a:pPr>
-            <a:r>
-              <a:rPr lang="en-US" dirty="0"/>
-              <a:t>Lorem ipsum dolor sit </a:t>
-            </a:r>
-            <a:r>
-              <a:rPr lang="en-US" dirty="0" err="1"/>
-              <a:t>amet</a:t>
-            </a:r>
-            <a:r>
-              <a:rPr lang="en-US" dirty="0"/>
-              <a:t>, </a:t>
-            </a:r>
-            <a:r>
-              <a:rPr lang="en-US" dirty="0" err="1"/>
-              <a:t>consectetur</a:t>
-            </a:r>
-            <a:r>
-              <a:rPr lang="en-US" dirty="0"/>
-              <a:t> </a:t>
-            </a:r>
-            <a:r>
-              <a:rPr lang="en-US" dirty="0" err="1"/>
-              <a:t>adipiscing</a:t>
-            </a:r>
-            <a:r>
-              <a:rPr lang="en-US" dirty="0"/>
-              <a:t> </a:t>
-            </a:r>
-            <a:r>
-              <a:rPr lang="en-US" dirty="0" err="1"/>
-              <a:t>elit</a:t>
-            </a:r>
-            <a:r>
-              <a:rPr lang="en-US" dirty="0"/>
-              <a:t>, sed do </a:t>
-            </a:r>
-            <a:r>
-              <a:rPr lang="en-US" dirty="0" err="1"/>
-              <a:t>eiusmod</a:t>
-            </a:r>
-            <a:r>
-              <a:rPr lang="en-US" dirty="0"/>
-              <a:t> </a:t>
-            </a:r>
-            <a:r>
-              <a:rPr lang="en-US" dirty="0" err="1"/>
-              <a:t>tempor</a:t>
-            </a:r>
-            <a:r>
-              <a:rPr lang="en-US" dirty="0"/>
-              <a:t> </a:t>
-            </a:r>
-            <a:r>
-              <a:rPr lang="en-US" dirty="0" err="1"/>
-              <a:t>incididunt</a:t>
-            </a:r>
-            <a:r>
-              <a:rPr lang="en-US" dirty="0"/>
-              <a:t> </a:t>
-            </a:r>
-            <a:r>
-              <a:rPr lang="en-US" dirty="0" err="1"/>
-              <a:t>ut</a:t>
-            </a:r>
-            <a:r>
-              <a:rPr lang="en-US" dirty="0"/>
-              <a:t> </a:t>
-            </a:r>
-            <a:r>
-              <a:rPr lang="en-US" dirty="0" err="1"/>
-              <a:t>labore</a:t>
-            </a:r>
-            <a:r>
-              <a:rPr lang="en-US" dirty="0"/>
-              <a:t> et dolore magna </a:t>
-            </a:r>
-            <a:r>
-              <a:rPr lang="en-US" dirty="0" err="1"/>
-              <a:t>aliqua</a:t>
-            </a:r>
-            <a:r>
-              <a:rPr lang="en-US" dirty="0"/>
-              <a:t>. Ut </a:t>
-            </a:r>
-            <a:r>
-              <a:rPr lang="en-US" dirty="0" err="1"/>
-              <a:t>enim</a:t>
-            </a:r>
-            <a:r>
-              <a:rPr lang="en-US" dirty="0"/>
-              <a:t> ad minim </a:t>
-            </a:r>
-            <a:r>
-              <a:rPr lang="en-US" dirty="0" err="1"/>
-              <a:t>veniam</a:t>
-            </a:r>
-            <a:r>
-              <a:rPr lang="en-US" dirty="0"/>
-              <a:t>, </a:t>
-            </a:r>
-            <a:r>
-              <a:rPr lang="en-US" dirty="0" err="1"/>
-              <a:t>quis</a:t>
-            </a:r>
-            <a:r>
-              <a:rPr lang="en-US" dirty="0"/>
-              <a:t> </a:t>
-            </a:r>
-            <a:r>
-              <a:rPr lang="en-US" dirty="0" err="1"/>
-              <a:t>nostrud</a:t>
-            </a:r>
-            <a:r>
-              <a:rPr lang="en-US" dirty="0"/>
-              <a:t> exercitation </a:t>
-            </a:r>
-            <a:r>
-              <a:rPr lang="en-US" dirty="0" err="1"/>
-              <a:t>ullamco</a:t>
-            </a:r>
-            <a:r>
-              <a:rPr lang="en-US" dirty="0"/>
-              <a:t> </a:t>
-            </a:r>
-            <a:r>
-              <a:rPr lang="en-US" dirty="0" err="1"/>
-              <a:t>laboris</a:t>
-            </a:r>
-            <a:r>
-              <a:rPr lang="en-US" dirty="0"/>
-              <a:t> nisi </a:t>
-            </a:r>
-            <a:r>
-              <a:rPr lang="en-US" dirty="0" err="1"/>
-              <a:t>ut</a:t>
-            </a:r>
-            <a:r>
-              <a:rPr lang="en-US" dirty="0"/>
-              <a:t> </a:t>
-            </a:r>
-            <a:r>
-              <a:rPr lang="en-US" dirty="0" err="1"/>
-              <a:t>aliquip</a:t>
-            </a:r>
-            <a:r>
-              <a:rPr lang="en-US" dirty="0"/>
-              <a:t> ex </a:t>
-            </a:r>
-            <a:r>
-              <a:rPr lang="en-US" dirty="0" err="1"/>
-              <a:t>ea</a:t>
-            </a:r>
-            <a:r>
-              <a:rPr lang="en-US" dirty="0"/>
-              <a:t> </a:t>
-            </a:r>
-            <a:r>
-              <a:rPr lang="en-US" dirty="0" err="1"/>
-              <a:t>commodo</a:t>
-            </a:r>
-            <a:r>
-              <a:rPr lang="en-US" dirty="0"/>
-              <a:t>.</a:t>
-            </a:r>
-          </a:p>
-        </p:txBody>
-      </p:sp>
-      <p:sp>
-        <p:nvSpPr>
-          <p:cNvPr id="10" name="Content Placeholder 2">
-            <a:extLst>
-              <a:ext uri="{FF2B5EF4-FFF2-40B4-BE49-F238E27FC236}">
-                <a16:creationId xmlns:a16="http://schemas.microsoft.com/office/drawing/2014/main" id="{855051F8-B34A-4BCE-9661-4EF3AD5D5D6C}"/>
-              </a:ext>
-            </a:extLst>
-          </p:cNvPr>
-          <p:cNvSpPr txBox="1">
-            <a:spLocks/>
-          </p:cNvSpPr>
-          <p:nvPr/>
-        </p:nvSpPr>
-        <p:spPr>
-          <a:xfrm>
-            <a:off x="8068715" y="2924629"/>
-            <a:ext cx="1771973" cy="2929466"/>
-          </a:xfrm>
-          <a:prstGeom prst="rect">
-            <a:avLst/>
-          </a:prstGeom>
-          <a:solidFill>
-            <a:schemeClr val="accent1"/>
-          </a:solidFill>
-        </p:spPr>
-        <p:txBody>
-          <a:bodyPr vert="horz" lIns="91440" tIns="45720" rIns="91440" bIns="45720" rtlCol="0">
-            <a:normAutofit/>
-          </a:bodyPr>
-          <a:lstStyle>
-            <a:lvl1pPr marL="228600" indent="-228600" algn="l" defTabSz="914400" rtl="0" eaLnBrk="1" latinLnBrk="0" hangingPunct="1">
-              <a:lnSpc>
-                <a:spcPct val="90000"/>
-              </a:lnSpc>
-              <a:spcBef>
-                <a:spcPts val="1000"/>
-              </a:spcBef>
-              <a:buFont typeface="Arial" panose="020B0604020202020204" pitchFamily="34" charset="0"/>
-              <a:buChar char="•"/>
-              <a:defRPr sz="2800" kern="1200">
-                <a:solidFill>
-                  <a:schemeClr val="tx1"/>
-                </a:solidFill>
-                <a:latin typeface="+mn-lt"/>
-                <a:ea typeface="+mn-ea"/>
-                <a:cs typeface="+mn-cs"/>
-              </a:defRPr>
-            </a:lvl1pPr>
-            <a:lvl2pPr marL="685800" indent="-228600" algn="l" defTabSz="914400" rtl="0" eaLnBrk="1" latinLnBrk="0" hangingPunct="1">
-              <a:lnSpc>
-                <a:spcPct val="90000"/>
-              </a:lnSpc>
-              <a:spcBef>
-                <a:spcPts val="500"/>
-              </a:spcBef>
-              <a:buFont typeface="Arial" panose="020B0604020202020204" pitchFamily="34" charset="0"/>
-              <a:buChar char="•"/>
-              <a:defRPr sz="2400" kern="1200">
-                <a:solidFill>
-                  <a:schemeClr val="tx1"/>
-                </a:solidFill>
-                <a:latin typeface="+mn-lt"/>
-                <a:ea typeface="+mn-ea"/>
-                <a:cs typeface="+mn-cs"/>
-              </a:defRPr>
-            </a:lvl2pPr>
-            <a:lvl3pPr marL="1143000" indent="-228600" algn="l" defTabSz="914400" rtl="0" eaLnBrk="1" latinLnBrk="0" hangingPunct="1">
-              <a:lnSpc>
-                <a:spcPct val="90000"/>
-              </a:lnSpc>
-              <a:spcBef>
-                <a:spcPts val="500"/>
-              </a:spcBef>
-              <a:buFont typeface="Arial" panose="020B0604020202020204" pitchFamily="34" charset="0"/>
-              <a:buChar char="•"/>
-              <a:defRPr sz="2000" kern="1200">
-                <a:solidFill>
-                  <a:schemeClr val="tx1"/>
-                </a:solidFill>
-                <a:latin typeface="+mn-lt"/>
-                <a:ea typeface="+mn-ea"/>
-                <a:cs typeface="+mn-cs"/>
-              </a:defRPr>
-            </a:lvl3pPr>
-            <a:lvl4pPr marL="1600200" indent="-228600" algn="l" defTabSz="914400" rtl="0" eaLnBrk="1" latinLnBrk="0" hangingPunct="1">
-              <a:lnSpc>
-                <a:spcPct val="90000"/>
-              </a:lnSpc>
-              <a:spcBef>
-                <a:spcPts val="500"/>
-              </a:spcBef>
-              <a:buFont typeface="Arial" panose="020B0604020202020204" pitchFamily="34" charset="0"/>
-              <a:buChar char="•"/>
-              <a:defRPr sz="1800" kern="1200">
-                <a:solidFill>
-                  <a:schemeClr val="tx1"/>
-                </a:solidFill>
-                <a:latin typeface="+mn-lt"/>
-                <a:ea typeface="+mn-ea"/>
-                <a:cs typeface="+mn-cs"/>
-              </a:defRPr>
-            </a:lvl4pPr>
-            <a:lvl5pPr marL="2057400" indent="-228600" algn="l" defTabSz="914400" rtl="0" eaLnBrk="1" latinLnBrk="0" hangingPunct="1">
-              <a:lnSpc>
-                <a:spcPct val="90000"/>
-              </a:lnSpc>
-              <a:spcBef>
-                <a:spcPts val="500"/>
-              </a:spcBef>
-              <a:buFont typeface="Arial" panose="020B0604020202020204" pitchFamily="34" charset="0"/>
-              <a:buChar char="•"/>
-              <a:defRPr sz="1800" kern="1200">
-                <a:solidFill>
-                  <a:schemeClr val="tx1"/>
-                </a:solidFill>
-                <a:latin typeface="+mn-lt"/>
-                <a:ea typeface="+mn-ea"/>
-                <a:cs typeface="+mn-cs"/>
-              </a:defRPr>
-            </a:lvl5pPr>
-            <a:lvl6pPr marL="2514600" indent="-228600" algn="l" defTabSz="914400" rtl="0" eaLnBrk="1" latinLnBrk="0" hangingPunct="1">
-              <a:lnSpc>
-                <a:spcPct val="90000"/>
-              </a:lnSpc>
-              <a:spcBef>
-                <a:spcPts val="500"/>
-              </a:spcBef>
-              <a:buFont typeface="Arial" panose="020B0604020202020204" pitchFamily="34" charset="0"/>
-              <a:buChar char="•"/>
-              <a:defRPr sz="1800" kern="1200">
-                <a:solidFill>
-                  <a:schemeClr val="tx1"/>
-                </a:solidFill>
-                <a:latin typeface="+mn-lt"/>
-                <a:ea typeface="+mn-ea"/>
-                <a:cs typeface="+mn-cs"/>
-              </a:defRPr>
-            </a:lvl6pPr>
-            <a:lvl7pPr marL="2971800" indent="-228600" algn="l" defTabSz="914400" rtl="0" eaLnBrk="1" latinLnBrk="0" hangingPunct="1">
-              <a:lnSpc>
-                <a:spcPct val="90000"/>
-              </a:lnSpc>
-              <a:spcBef>
-                <a:spcPts val="500"/>
-              </a:spcBef>
-              <a:buFont typeface="Arial" panose="020B0604020202020204" pitchFamily="34" charset="0"/>
-              <a:buChar char="•"/>
-              <a:defRPr sz="1800" kern="1200">
-                <a:solidFill>
-                  <a:schemeClr val="tx1"/>
-                </a:solidFill>
-                <a:latin typeface="+mn-lt"/>
-                <a:ea typeface="+mn-ea"/>
-                <a:cs typeface="+mn-cs"/>
-              </a:defRPr>
-            </a:lvl7pPr>
-            <a:lvl8pPr marL="3429000" indent="-228600" algn="l" defTabSz="914400" rtl="0" eaLnBrk="1" latinLnBrk="0" hangingPunct="1">
-              <a:lnSpc>
-                <a:spcPct val="90000"/>
-              </a:lnSpc>
-              <a:spcBef>
-                <a:spcPts val="500"/>
-              </a:spcBef>
-              <a:buFont typeface="Arial" panose="020B0604020202020204" pitchFamily="34" charset="0"/>
-              <a:buChar char="•"/>
-              <a:defRPr sz="1800" kern="1200">
-                <a:solidFill>
-                  <a:schemeClr val="tx1"/>
-                </a:solidFill>
-                <a:latin typeface="+mn-lt"/>
-                <a:ea typeface="+mn-ea"/>
-                <a:cs typeface="+mn-cs"/>
-              </a:defRPr>
-            </a:lvl8pPr>
-            <a:lvl9pPr marL="3886200" indent="-228600" algn="l" defTabSz="914400" rtl="0" eaLnBrk="1" latinLnBrk="0" hangingPunct="1">
-              <a:lnSpc>
-                <a:spcPct val="90000"/>
-              </a:lnSpc>
-              <a:spcBef>
-                <a:spcPts val="500"/>
-              </a:spcBef>
-              <a:buFont typeface="Arial" panose="020B0604020202020204" pitchFamily="34" charset="0"/>
-              <a:buChar char="•"/>
-              <a:defRPr sz="1800" kern="1200">
-                <a:solidFill>
-                  <a:schemeClr val="tx1"/>
-                </a:solidFill>
-                <a:latin typeface="+mn-lt"/>
-                <a:ea typeface="+mn-ea"/>
-                <a:cs typeface="+mn-cs"/>
-              </a:defRPr>
-            </a:lvl9pPr>
-          </a:lstStyle>
-          <a:p>
-            <a:pPr marL="0" indent="0" algn="ctr">
-              <a:buNone/>
-            </a:pPr>
-            <a:r>
-              <a:rPr lang="en-US" u="sng" dirty="0" err="1"/>
-              <a:t>Hangrrs</a:t>
-            </a:r>
-            <a:endParaRPr lang="en-US" u="sng" dirty="0"/>
-          </a:p>
-          <a:p>
-            <a:pPr marL="0" indent="0" algn="ctr">
-              <a:buFont typeface="Arial" panose="020B0604020202020204" pitchFamily="34" charset="0"/>
-              <a:buNone/>
-            </a:pPr>
-            <a:endParaRPr lang="en-US" u="sng" dirty="0"/>
-          </a:p>
-          <a:p>
-            <a:pPr marL="0" indent="0" algn="ctr">
-              <a:buFont typeface="Arial" panose="020B0604020202020204" pitchFamily="34" charset="0"/>
-              <a:buNone/>
-            </a:pPr>
-            <a:r>
-              <a:rPr lang="en-US" dirty="0"/>
-              <a:t>Chace, Kiki</a:t>
-            </a:r>
-          </a:p>
-        </p:txBody>
-      </p:sp>
-      <p:sp>
-        <p:nvSpPr>
-          <p:cNvPr id="11" name="Content Placeholder 2">
-            <a:extLst>
-              <a:ext uri="{FF2B5EF4-FFF2-40B4-BE49-F238E27FC236}">
-                <a16:creationId xmlns:a16="http://schemas.microsoft.com/office/drawing/2014/main" id="{66B5434B-A1DA-48A8-A5E4-D2FEEE175390}"/>
-              </a:ext>
-            </a:extLst>
-          </p:cNvPr>
-          <p:cNvSpPr txBox="1">
-            <a:spLocks/>
-          </p:cNvSpPr>
-          <p:nvPr/>
-        </p:nvSpPr>
-        <p:spPr>
-          <a:xfrm>
-            <a:off x="279418" y="2183979"/>
-            <a:ext cx="1752581" cy="539869"/>
-          </a:xfrm>
-          <a:prstGeom prst="rect">
-            <a:avLst/>
-          </a:prstGeom>
-          <a:solidFill>
-            <a:schemeClr val="accent1"/>
-          </a:solidFill>
-        </p:spPr>
-        <p:txBody>
-          <a:bodyPr vert="horz" lIns="91440" tIns="45720" rIns="91440" bIns="45720" rtlCol="0">
-            <a:normAutofit/>
-          </a:bodyPr>
-          <a:lstStyle>
-            <a:lvl1pPr marL="228600" indent="-228600" algn="l" defTabSz="914400" rtl="0" eaLnBrk="1" latinLnBrk="0" hangingPunct="1">
-              <a:lnSpc>
-                <a:spcPct val="90000"/>
-              </a:lnSpc>
-              <a:spcBef>
-                <a:spcPts val="1000"/>
-              </a:spcBef>
-              <a:buFont typeface="Arial" panose="020B0604020202020204" pitchFamily="34" charset="0"/>
-              <a:buChar char="•"/>
-              <a:defRPr sz="2800" kern="1200">
-                <a:solidFill>
-                  <a:schemeClr val="tx1"/>
-                </a:solidFill>
-                <a:latin typeface="+mn-lt"/>
-                <a:ea typeface="+mn-ea"/>
-                <a:cs typeface="+mn-cs"/>
-              </a:defRPr>
-            </a:lvl1pPr>
-            <a:lvl2pPr marL="685800" indent="-228600" algn="l" defTabSz="914400" rtl="0" eaLnBrk="1" latinLnBrk="0" hangingPunct="1">
-              <a:lnSpc>
-                <a:spcPct val="90000"/>
-              </a:lnSpc>
-              <a:spcBef>
-                <a:spcPts val="500"/>
-              </a:spcBef>
-              <a:buFont typeface="Arial" panose="020B0604020202020204" pitchFamily="34" charset="0"/>
-              <a:buChar char="•"/>
-              <a:defRPr sz="2400" kern="1200">
-                <a:solidFill>
-                  <a:schemeClr val="tx1"/>
-                </a:solidFill>
-                <a:latin typeface="+mn-lt"/>
-                <a:ea typeface="+mn-ea"/>
-                <a:cs typeface="+mn-cs"/>
-              </a:defRPr>
-            </a:lvl2pPr>
-            <a:lvl3pPr marL="1143000" indent="-228600" algn="l" defTabSz="914400" rtl="0" eaLnBrk="1" latinLnBrk="0" hangingPunct="1">
-              <a:lnSpc>
-                <a:spcPct val="90000"/>
-              </a:lnSpc>
-              <a:spcBef>
-                <a:spcPts val="500"/>
-              </a:spcBef>
-              <a:buFont typeface="Arial" panose="020B0604020202020204" pitchFamily="34" charset="0"/>
-              <a:buChar char="•"/>
-              <a:defRPr sz="2000" kern="1200">
-                <a:solidFill>
-                  <a:schemeClr val="tx1"/>
-                </a:solidFill>
-                <a:latin typeface="+mn-lt"/>
-                <a:ea typeface="+mn-ea"/>
-                <a:cs typeface="+mn-cs"/>
-              </a:defRPr>
-            </a:lvl3pPr>
-            <a:lvl4pPr marL="1600200" indent="-228600" algn="l" defTabSz="914400" rtl="0" eaLnBrk="1" latinLnBrk="0" hangingPunct="1">
-              <a:lnSpc>
-                <a:spcPct val="90000"/>
-              </a:lnSpc>
-              <a:spcBef>
-                <a:spcPts val="500"/>
-              </a:spcBef>
-              <a:buFont typeface="Arial" panose="020B0604020202020204" pitchFamily="34" charset="0"/>
-              <a:buChar char="•"/>
-              <a:defRPr sz="1800" kern="1200">
-                <a:solidFill>
-                  <a:schemeClr val="tx1"/>
-                </a:solidFill>
-                <a:latin typeface="+mn-lt"/>
-                <a:ea typeface="+mn-ea"/>
-                <a:cs typeface="+mn-cs"/>
-              </a:defRPr>
-            </a:lvl4pPr>
-            <a:lvl5pPr marL="2057400" indent="-228600" algn="l" defTabSz="914400" rtl="0" eaLnBrk="1" latinLnBrk="0" hangingPunct="1">
-              <a:lnSpc>
-                <a:spcPct val="90000"/>
-              </a:lnSpc>
-              <a:spcBef>
-                <a:spcPts val="500"/>
-              </a:spcBef>
-              <a:buFont typeface="Arial" panose="020B0604020202020204" pitchFamily="34" charset="0"/>
-              <a:buChar char="•"/>
-              <a:defRPr sz="1800" kern="1200">
-                <a:solidFill>
-                  <a:schemeClr val="tx1"/>
-                </a:solidFill>
-                <a:latin typeface="+mn-lt"/>
-                <a:ea typeface="+mn-ea"/>
-                <a:cs typeface="+mn-cs"/>
-              </a:defRPr>
-            </a:lvl5pPr>
-            <a:lvl6pPr marL="2514600" indent="-228600" algn="l" defTabSz="914400" rtl="0" eaLnBrk="1" latinLnBrk="0" hangingPunct="1">
-              <a:lnSpc>
-                <a:spcPct val="90000"/>
-              </a:lnSpc>
-              <a:spcBef>
-                <a:spcPts val="500"/>
-              </a:spcBef>
-              <a:buFont typeface="Arial" panose="020B0604020202020204" pitchFamily="34" charset="0"/>
-              <a:buChar char="•"/>
-              <a:defRPr sz="1800" kern="1200">
-                <a:solidFill>
-                  <a:schemeClr val="tx1"/>
-                </a:solidFill>
-                <a:latin typeface="+mn-lt"/>
-                <a:ea typeface="+mn-ea"/>
-                <a:cs typeface="+mn-cs"/>
-              </a:defRPr>
-            </a:lvl6pPr>
-            <a:lvl7pPr marL="2971800" indent="-228600" algn="l" defTabSz="914400" rtl="0" eaLnBrk="1" latinLnBrk="0" hangingPunct="1">
-              <a:lnSpc>
-                <a:spcPct val="90000"/>
-              </a:lnSpc>
-              <a:spcBef>
-                <a:spcPts val="500"/>
-              </a:spcBef>
-              <a:buFont typeface="Arial" panose="020B0604020202020204" pitchFamily="34" charset="0"/>
-              <a:buChar char="•"/>
-              <a:defRPr sz="1800" kern="1200">
-                <a:solidFill>
-                  <a:schemeClr val="tx1"/>
-                </a:solidFill>
-                <a:latin typeface="+mn-lt"/>
-                <a:ea typeface="+mn-ea"/>
-                <a:cs typeface="+mn-cs"/>
-              </a:defRPr>
-            </a:lvl7pPr>
-            <a:lvl8pPr marL="3429000" indent="-228600" algn="l" defTabSz="914400" rtl="0" eaLnBrk="1" latinLnBrk="0" hangingPunct="1">
-              <a:lnSpc>
-                <a:spcPct val="90000"/>
-              </a:lnSpc>
-              <a:spcBef>
-                <a:spcPts val="500"/>
-              </a:spcBef>
-              <a:buFont typeface="Arial" panose="020B0604020202020204" pitchFamily="34" charset="0"/>
-              <a:buChar char="•"/>
-              <a:defRPr sz="1800" kern="1200">
-                <a:solidFill>
-                  <a:schemeClr val="tx1"/>
-                </a:solidFill>
-                <a:latin typeface="+mn-lt"/>
-                <a:ea typeface="+mn-ea"/>
-                <a:cs typeface="+mn-cs"/>
-              </a:defRPr>
-            </a:lvl8pPr>
-            <a:lvl9pPr marL="3886200" indent="-228600" algn="l" defTabSz="914400" rtl="0" eaLnBrk="1" latinLnBrk="0" hangingPunct="1">
-              <a:lnSpc>
-                <a:spcPct val="90000"/>
-              </a:lnSpc>
-              <a:spcBef>
-                <a:spcPts val="500"/>
-              </a:spcBef>
-              <a:buFont typeface="Arial" panose="020B0604020202020204" pitchFamily="34" charset="0"/>
-              <a:buChar char="•"/>
-              <a:defRPr sz="1800" kern="1200">
-                <a:solidFill>
-                  <a:schemeClr val="tx1"/>
-                </a:solidFill>
-                <a:latin typeface="+mn-lt"/>
-                <a:ea typeface="+mn-ea"/>
-                <a:cs typeface="+mn-cs"/>
-              </a:defRPr>
-            </a:lvl9pPr>
-          </a:lstStyle>
-          <a:p>
-            <a:pPr marL="0" indent="0" algn="ctr">
-              <a:buNone/>
-            </a:pPr>
-            <a:r>
-              <a:rPr lang="en-US" dirty="0"/>
-              <a:t>Ike</a:t>
-            </a:r>
-          </a:p>
-        </p:txBody>
-      </p:sp>
-      <p:sp>
-        <p:nvSpPr>
-          <p:cNvPr id="13" name="Content Placeholder 2">
-            <a:extLst>
-              <a:ext uri="{FF2B5EF4-FFF2-40B4-BE49-F238E27FC236}">
-                <a16:creationId xmlns:a16="http://schemas.microsoft.com/office/drawing/2014/main" id="{A0D33F2B-EA6C-4137-90C8-1A879DB49235}"/>
-              </a:ext>
-            </a:extLst>
-          </p:cNvPr>
-          <p:cNvSpPr txBox="1">
-            <a:spLocks/>
-          </p:cNvSpPr>
-          <p:nvPr/>
-        </p:nvSpPr>
-        <p:spPr>
-          <a:xfrm>
-            <a:off x="289091" y="2847392"/>
-            <a:ext cx="1752581" cy="379444"/>
-          </a:xfrm>
-          <a:prstGeom prst="rect">
-            <a:avLst/>
-          </a:prstGeom>
-          <a:solidFill>
-            <a:schemeClr val="accent3">
-              <a:lumMod val="40000"/>
-              <a:lumOff val="60000"/>
-            </a:schemeClr>
-          </a:solidFill>
-          <a:ln>
-            <a:solidFill>
-              <a:schemeClr val="accent1">
-                <a:lumMod val="75000"/>
-              </a:schemeClr>
-            </a:solidFill>
-          </a:ln>
-        </p:spPr>
-        <p:txBody>
-          <a:bodyPr vert="horz" lIns="91440" tIns="45720" rIns="91440" bIns="45720" rtlCol="0">
-            <a:normAutofit/>
-          </a:bodyPr>
-          <a:lstStyle>
-            <a:lvl1pPr marL="228600" indent="-228600" algn="l" defTabSz="914400" rtl="0" eaLnBrk="1" latinLnBrk="0" hangingPunct="1">
-              <a:lnSpc>
-                <a:spcPct val="90000"/>
-              </a:lnSpc>
-              <a:spcBef>
-                <a:spcPts val="1000"/>
-              </a:spcBef>
-              <a:buFont typeface="Arial" panose="020B0604020202020204" pitchFamily="34" charset="0"/>
-              <a:buChar char="•"/>
-              <a:defRPr sz="2800" kern="1200">
-                <a:solidFill>
-                  <a:schemeClr val="tx1"/>
-                </a:solidFill>
-                <a:latin typeface="+mn-lt"/>
-                <a:ea typeface="+mn-ea"/>
-                <a:cs typeface="+mn-cs"/>
-              </a:defRPr>
-            </a:lvl1pPr>
-            <a:lvl2pPr marL="685800" indent="-228600" algn="l" defTabSz="914400" rtl="0" eaLnBrk="1" latinLnBrk="0" hangingPunct="1">
-              <a:lnSpc>
-                <a:spcPct val="90000"/>
-              </a:lnSpc>
-              <a:spcBef>
-                <a:spcPts val="500"/>
-              </a:spcBef>
-              <a:buFont typeface="Arial" panose="020B0604020202020204" pitchFamily="34" charset="0"/>
-              <a:buChar char="•"/>
-              <a:defRPr sz="2400" kern="1200">
-                <a:solidFill>
-                  <a:schemeClr val="tx1"/>
-                </a:solidFill>
-                <a:latin typeface="+mn-lt"/>
-                <a:ea typeface="+mn-ea"/>
-                <a:cs typeface="+mn-cs"/>
-              </a:defRPr>
-            </a:lvl2pPr>
-            <a:lvl3pPr marL="1143000" indent="-228600" algn="l" defTabSz="914400" rtl="0" eaLnBrk="1" latinLnBrk="0" hangingPunct="1">
-              <a:lnSpc>
-                <a:spcPct val="90000"/>
-              </a:lnSpc>
-              <a:spcBef>
-                <a:spcPts val="500"/>
-              </a:spcBef>
-              <a:buFont typeface="Arial" panose="020B0604020202020204" pitchFamily="34" charset="0"/>
-              <a:buChar char="•"/>
-              <a:defRPr sz="2000" kern="1200">
-                <a:solidFill>
-                  <a:schemeClr val="tx1"/>
-                </a:solidFill>
-                <a:latin typeface="+mn-lt"/>
-                <a:ea typeface="+mn-ea"/>
-                <a:cs typeface="+mn-cs"/>
-              </a:defRPr>
-            </a:lvl3pPr>
-            <a:lvl4pPr marL="1600200" indent="-228600" algn="l" defTabSz="914400" rtl="0" eaLnBrk="1" latinLnBrk="0" hangingPunct="1">
-              <a:lnSpc>
-                <a:spcPct val="90000"/>
-              </a:lnSpc>
-              <a:spcBef>
-                <a:spcPts val="500"/>
-              </a:spcBef>
-              <a:buFont typeface="Arial" panose="020B0604020202020204" pitchFamily="34" charset="0"/>
-              <a:buChar char="•"/>
-              <a:defRPr sz="1800" kern="1200">
-                <a:solidFill>
-                  <a:schemeClr val="tx1"/>
-                </a:solidFill>
-                <a:latin typeface="+mn-lt"/>
-                <a:ea typeface="+mn-ea"/>
-                <a:cs typeface="+mn-cs"/>
-              </a:defRPr>
-            </a:lvl4pPr>
-            <a:lvl5pPr marL="2057400" indent="-228600" algn="l" defTabSz="914400" rtl="0" eaLnBrk="1" latinLnBrk="0" hangingPunct="1">
-              <a:lnSpc>
-                <a:spcPct val="90000"/>
-              </a:lnSpc>
-              <a:spcBef>
-                <a:spcPts val="500"/>
-              </a:spcBef>
-              <a:buFont typeface="Arial" panose="020B0604020202020204" pitchFamily="34" charset="0"/>
-              <a:buChar char="•"/>
-              <a:defRPr sz="1800" kern="1200">
-                <a:solidFill>
-                  <a:schemeClr val="tx1"/>
-                </a:solidFill>
-                <a:latin typeface="+mn-lt"/>
-                <a:ea typeface="+mn-ea"/>
-                <a:cs typeface="+mn-cs"/>
-              </a:defRPr>
-            </a:lvl5pPr>
-            <a:lvl6pPr marL="2514600" indent="-228600" algn="l" defTabSz="914400" rtl="0" eaLnBrk="1" latinLnBrk="0" hangingPunct="1">
-              <a:lnSpc>
-                <a:spcPct val="90000"/>
-              </a:lnSpc>
-              <a:spcBef>
-                <a:spcPts val="500"/>
-              </a:spcBef>
-              <a:buFont typeface="Arial" panose="020B0604020202020204" pitchFamily="34" charset="0"/>
-              <a:buChar char="•"/>
-              <a:defRPr sz="1800" kern="1200">
-                <a:solidFill>
-                  <a:schemeClr val="tx1"/>
-                </a:solidFill>
-                <a:latin typeface="+mn-lt"/>
-                <a:ea typeface="+mn-ea"/>
-                <a:cs typeface="+mn-cs"/>
-              </a:defRPr>
-            </a:lvl6pPr>
-            <a:lvl7pPr marL="2971800" indent="-228600" algn="l" defTabSz="914400" rtl="0" eaLnBrk="1" latinLnBrk="0" hangingPunct="1">
-              <a:lnSpc>
-                <a:spcPct val="90000"/>
-              </a:lnSpc>
-              <a:spcBef>
-                <a:spcPts val="500"/>
-              </a:spcBef>
-              <a:buFont typeface="Arial" panose="020B0604020202020204" pitchFamily="34" charset="0"/>
-              <a:buChar char="•"/>
-              <a:defRPr sz="1800" kern="1200">
-                <a:solidFill>
-                  <a:schemeClr val="tx1"/>
-                </a:solidFill>
-                <a:latin typeface="+mn-lt"/>
-                <a:ea typeface="+mn-ea"/>
-                <a:cs typeface="+mn-cs"/>
-              </a:defRPr>
-            </a:lvl7pPr>
-            <a:lvl8pPr marL="3429000" indent="-228600" algn="l" defTabSz="914400" rtl="0" eaLnBrk="1" latinLnBrk="0" hangingPunct="1">
-              <a:lnSpc>
-                <a:spcPct val="90000"/>
-              </a:lnSpc>
-              <a:spcBef>
-                <a:spcPts val="500"/>
-              </a:spcBef>
-              <a:buFont typeface="Arial" panose="020B0604020202020204" pitchFamily="34" charset="0"/>
-              <a:buChar char="•"/>
-              <a:defRPr sz="1800" kern="1200">
-                <a:solidFill>
-                  <a:schemeClr val="tx1"/>
-                </a:solidFill>
-                <a:latin typeface="+mn-lt"/>
-                <a:ea typeface="+mn-ea"/>
-                <a:cs typeface="+mn-cs"/>
-              </a:defRPr>
-            </a:lvl8pPr>
-            <a:lvl9pPr marL="3886200" indent="-228600" algn="l" defTabSz="914400" rtl="0" eaLnBrk="1" latinLnBrk="0" hangingPunct="1">
-              <a:lnSpc>
-                <a:spcPct val="90000"/>
-              </a:lnSpc>
-              <a:spcBef>
-                <a:spcPts val="500"/>
-              </a:spcBef>
-              <a:buFont typeface="Arial" panose="020B0604020202020204" pitchFamily="34" charset="0"/>
-              <a:buChar char="•"/>
-              <a:defRPr sz="1800" kern="1200">
-                <a:solidFill>
-                  <a:schemeClr val="tx1"/>
-                </a:solidFill>
-                <a:latin typeface="+mn-lt"/>
-                <a:ea typeface="+mn-ea"/>
-                <a:cs typeface="+mn-cs"/>
-              </a:defRPr>
-            </a:lvl9pPr>
-          </a:lstStyle>
-          <a:p>
-            <a:pPr marL="0" indent="0" algn="ctr">
-              <a:buFont typeface="Arial" panose="020B0604020202020204" pitchFamily="34" charset="0"/>
-              <a:buNone/>
-            </a:pPr>
-            <a:r>
-              <a:rPr lang="en-US" sz="2000" b="1" dirty="0"/>
-              <a:t>Message Ike</a:t>
-            </a:r>
-          </a:p>
-        </p:txBody>
-      </p:sp>
-      <p:sp>
-        <p:nvSpPr>
-          <p:cNvPr id="14" name="Content Placeholder 2">
-            <a:extLst>
-              <a:ext uri="{FF2B5EF4-FFF2-40B4-BE49-F238E27FC236}">
-                <a16:creationId xmlns:a16="http://schemas.microsoft.com/office/drawing/2014/main" id="{EBF8AC60-BB12-4DFF-8787-B04279C49B09}"/>
-              </a:ext>
-            </a:extLst>
-          </p:cNvPr>
-          <p:cNvSpPr txBox="1">
-            <a:spLocks/>
-          </p:cNvSpPr>
-          <p:nvPr/>
-        </p:nvSpPr>
-        <p:spPr>
-          <a:xfrm>
-            <a:off x="2846029" y="1401845"/>
-            <a:ext cx="6994658" cy="1172022"/>
-          </a:xfrm>
-          <a:prstGeom prst="rect">
-            <a:avLst/>
-          </a:prstGeom>
-          <a:solidFill>
-            <a:schemeClr val="accent3">
-              <a:lumMod val="40000"/>
-              <a:lumOff val="60000"/>
-            </a:schemeClr>
-          </a:solidFill>
-          <a:ln>
-            <a:solidFill>
-              <a:schemeClr val="accent1">
-                <a:lumMod val="75000"/>
-              </a:schemeClr>
-            </a:solidFill>
-          </a:ln>
-        </p:spPr>
-        <p:txBody>
-          <a:bodyPr vert="horz" lIns="91440" tIns="45720" rIns="91440" bIns="45720" rtlCol="0">
-            <a:normAutofit/>
-          </a:bodyPr>
-          <a:lstStyle>
-            <a:lvl1pPr marL="228600" indent="-228600" algn="l" defTabSz="914400" rtl="0" eaLnBrk="1" latinLnBrk="0" hangingPunct="1">
-              <a:lnSpc>
-                <a:spcPct val="90000"/>
-              </a:lnSpc>
-              <a:spcBef>
-                <a:spcPts val="1000"/>
-              </a:spcBef>
-              <a:buFont typeface="Arial" panose="020B0604020202020204" pitchFamily="34" charset="0"/>
-              <a:buChar char="•"/>
-              <a:defRPr sz="2800" kern="1200">
-                <a:solidFill>
-                  <a:schemeClr val="tx1"/>
-                </a:solidFill>
-                <a:latin typeface="+mn-lt"/>
-                <a:ea typeface="+mn-ea"/>
-                <a:cs typeface="+mn-cs"/>
-              </a:defRPr>
-            </a:lvl1pPr>
-            <a:lvl2pPr marL="685800" indent="-228600" algn="l" defTabSz="914400" rtl="0" eaLnBrk="1" latinLnBrk="0" hangingPunct="1">
-              <a:lnSpc>
-                <a:spcPct val="90000"/>
-              </a:lnSpc>
-              <a:spcBef>
-                <a:spcPts val="500"/>
-              </a:spcBef>
-              <a:buFont typeface="Arial" panose="020B0604020202020204" pitchFamily="34" charset="0"/>
-              <a:buChar char="•"/>
-              <a:defRPr sz="2400" kern="1200">
-                <a:solidFill>
-                  <a:schemeClr val="tx1"/>
-                </a:solidFill>
-                <a:latin typeface="+mn-lt"/>
-                <a:ea typeface="+mn-ea"/>
-                <a:cs typeface="+mn-cs"/>
-              </a:defRPr>
-            </a:lvl2pPr>
-            <a:lvl3pPr marL="1143000" indent="-228600" algn="l" defTabSz="914400" rtl="0" eaLnBrk="1" latinLnBrk="0" hangingPunct="1">
-              <a:lnSpc>
-                <a:spcPct val="90000"/>
-              </a:lnSpc>
-              <a:spcBef>
-                <a:spcPts val="500"/>
-              </a:spcBef>
-              <a:buFont typeface="Arial" panose="020B0604020202020204" pitchFamily="34" charset="0"/>
-              <a:buChar char="•"/>
-              <a:defRPr sz="2000" kern="1200">
-                <a:solidFill>
-                  <a:schemeClr val="tx1"/>
-                </a:solidFill>
-                <a:latin typeface="+mn-lt"/>
-                <a:ea typeface="+mn-ea"/>
-                <a:cs typeface="+mn-cs"/>
-              </a:defRPr>
-            </a:lvl3pPr>
-            <a:lvl4pPr marL="1600200" indent="-228600" algn="l" defTabSz="914400" rtl="0" eaLnBrk="1" latinLnBrk="0" hangingPunct="1">
-              <a:lnSpc>
-                <a:spcPct val="90000"/>
-              </a:lnSpc>
-              <a:spcBef>
-                <a:spcPts val="500"/>
-              </a:spcBef>
-              <a:buFont typeface="Arial" panose="020B0604020202020204" pitchFamily="34" charset="0"/>
-              <a:buChar char="•"/>
-              <a:defRPr sz="1800" kern="1200">
-                <a:solidFill>
-                  <a:schemeClr val="tx1"/>
-                </a:solidFill>
-                <a:latin typeface="+mn-lt"/>
-                <a:ea typeface="+mn-ea"/>
-                <a:cs typeface="+mn-cs"/>
-              </a:defRPr>
-            </a:lvl4pPr>
-            <a:lvl5pPr marL="2057400" indent="-228600" algn="l" defTabSz="914400" rtl="0" eaLnBrk="1" latinLnBrk="0" hangingPunct="1">
-              <a:lnSpc>
-                <a:spcPct val="90000"/>
-              </a:lnSpc>
-              <a:spcBef>
-                <a:spcPts val="500"/>
-              </a:spcBef>
-              <a:buFont typeface="Arial" panose="020B0604020202020204" pitchFamily="34" charset="0"/>
-              <a:buChar char="•"/>
-              <a:defRPr sz="1800" kern="1200">
-                <a:solidFill>
-                  <a:schemeClr val="tx1"/>
-                </a:solidFill>
-                <a:latin typeface="+mn-lt"/>
-                <a:ea typeface="+mn-ea"/>
-                <a:cs typeface="+mn-cs"/>
-              </a:defRPr>
-            </a:lvl5pPr>
-            <a:lvl6pPr marL="2514600" indent="-228600" algn="l" defTabSz="914400" rtl="0" eaLnBrk="1" latinLnBrk="0" hangingPunct="1">
-              <a:lnSpc>
-                <a:spcPct val="90000"/>
-              </a:lnSpc>
-              <a:spcBef>
-                <a:spcPts val="500"/>
-              </a:spcBef>
-              <a:buFont typeface="Arial" panose="020B0604020202020204" pitchFamily="34" charset="0"/>
-              <a:buChar char="•"/>
-              <a:defRPr sz="1800" kern="1200">
-                <a:solidFill>
-                  <a:schemeClr val="tx1"/>
-                </a:solidFill>
-                <a:latin typeface="+mn-lt"/>
-                <a:ea typeface="+mn-ea"/>
-                <a:cs typeface="+mn-cs"/>
-              </a:defRPr>
-            </a:lvl6pPr>
-            <a:lvl7pPr marL="2971800" indent="-228600" algn="l" defTabSz="914400" rtl="0" eaLnBrk="1" latinLnBrk="0" hangingPunct="1">
-              <a:lnSpc>
-                <a:spcPct val="90000"/>
-              </a:lnSpc>
-              <a:spcBef>
-                <a:spcPts val="500"/>
-              </a:spcBef>
-              <a:buFont typeface="Arial" panose="020B0604020202020204" pitchFamily="34" charset="0"/>
-              <a:buChar char="•"/>
-              <a:defRPr sz="1800" kern="1200">
-                <a:solidFill>
-                  <a:schemeClr val="tx1"/>
-                </a:solidFill>
-                <a:latin typeface="+mn-lt"/>
-                <a:ea typeface="+mn-ea"/>
-                <a:cs typeface="+mn-cs"/>
-              </a:defRPr>
-            </a:lvl7pPr>
-            <a:lvl8pPr marL="3429000" indent="-228600" algn="l" defTabSz="914400" rtl="0" eaLnBrk="1" latinLnBrk="0" hangingPunct="1">
-              <a:lnSpc>
-                <a:spcPct val="90000"/>
-              </a:lnSpc>
-              <a:spcBef>
-                <a:spcPts val="500"/>
-              </a:spcBef>
-              <a:buFont typeface="Arial" panose="020B0604020202020204" pitchFamily="34" charset="0"/>
-              <a:buChar char="•"/>
-              <a:defRPr sz="1800" kern="1200">
-                <a:solidFill>
-                  <a:schemeClr val="tx1"/>
-                </a:solidFill>
-                <a:latin typeface="+mn-lt"/>
-                <a:ea typeface="+mn-ea"/>
-                <a:cs typeface="+mn-cs"/>
-              </a:defRPr>
-            </a:lvl8pPr>
-            <a:lvl9pPr marL="3886200" indent="-228600" algn="l" defTabSz="914400" rtl="0" eaLnBrk="1" latinLnBrk="0" hangingPunct="1">
-              <a:lnSpc>
-                <a:spcPct val="90000"/>
-              </a:lnSpc>
-              <a:spcBef>
-                <a:spcPts val="500"/>
-              </a:spcBef>
-              <a:buFont typeface="Arial" panose="020B0604020202020204" pitchFamily="34" charset="0"/>
-              <a:buChar char="•"/>
-              <a:defRPr sz="1800" kern="1200">
-                <a:solidFill>
-                  <a:schemeClr val="tx1"/>
-                </a:solidFill>
-                <a:latin typeface="+mn-lt"/>
-                <a:ea typeface="+mn-ea"/>
-                <a:cs typeface="+mn-cs"/>
-              </a:defRPr>
-            </a:lvl9pPr>
-          </a:lstStyle>
-          <a:p>
-            <a:pPr marL="0" indent="0" algn="ctr">
-              <a:buFont typeface="Arial" panose="020B0604020202020204" pitchFamily="34" charset="0"/>
-              <a:buNone/>
-            </a:pPr>
-            <a:r>
-              <a:rPr lang="en-US" dirty="0"/>
-              <a:t>Popular Events Near You / Results</a:t>
-            </a:r>
-          </a:p>
-          <a:p>
-            <a:pPr marL="0" indent="0" algn="ctr">
-              <a:buFont typeface="Arial" panose="020B0604020202020204" pitchFamily="34" charset="0"/>
-              <a:buNone/>
-            </a:pPr>
-            <a:r>
-              <a:rPr lang="en-US" sz="1600" dirty="0"/>
-              <a:t>Play Tennis  *  Have coffee  *  Go to Museum</a:t>
-            </a:r>
-          </a:p>
-        </p:txBody>
-      </p:sp>
-    </p:spTree>
-    <p:extLst>
-      <p:ext uri="{BB962C8B-B14F-4D97-AF65-F5344CB8AC3E}">
-        <p14:creationId xmlns:p14="http://schemas.microsoft.com/office/powerpoint/2010/main" val="2414628719"/>
       </p:ext>
     </p:extLst>
   </p:cSld>

</xml_diff>